<commit_message>
Modif localisation objet et powerpoint
</commit_message>
<xml_diff>
--- a/Gestion projet/Projet intégration robotique – IMERIR.pptx
+++ b/Gestion projet/Projet intégration robotique – IMERIR.pptx
@@ -11,14 +11,16 @@
     <p:sldId id="265" r:id="rId5"/>
     <p:sldId id="266" r:id="rId6"/>
     <p:sldId id="267" r:id="rId7"/>
-    <p:sldId id="268" r:id="rId8"/>
-    <p:sldId id="270" r:id="rId9"/>
-    <p:sldId id="262" r:id="rId10"/>
-    <p:sldId id="260" r:id="rId11"/>
-    <p:sldId id="261" r:id="rId12"/>
-    <p:sldId id="269" r:id="rId13"/>
-    <p:sldId id="264" r:id="rId14"/>
-    <p:sldId id="258" r:id="rId15"/>
+    <p:sldId id="271" r:id="rId8"/>
+    <p:sldId id="272" r:id="rId9"/>
+    <p:sldId id="268" r:id="rId10"/>
+    <p:sldId id="270" r:id="rId11"/>
+    <p:sldId id="262" r:id="rId12"/>
+    <p:sldId id="260" r:id="rId13"/>
+    <p:sldId id="261" r:id="rId14"/>
+    <p:sldId id="269" r:id="rId15"/>
+    <p:sldId id="264" r:id="rId16"/>
+    <p:sldId id="258" r:id="rId17"/>
   </p:sldIdLst>
   <p:sldSz cx="12192000" cy="6858000"/>
   <p:notesSz cx="6858000" cy="9144000"/>
@@ -2983,6 +2985,1084 @@
       <dsp:cNvGrpSpPr/>
     </dsp:nvGrpSpPr>
     <dsp:grpSpPr/>
+    <dsp:sp modelId="{C690D0CD-7211-42BB-BA22-C909A7CA1954}">
+      <dsp:nvSpPr>
+        <dsp:cNvPr id="0" name=""/>
+        <dsp:cNvSpPr/>
+      </dsp:nvSpPr>
+      <dsp:spPr>
+        <a:xfrm>
+          <a:off x="5077836" y="1676507"/>
+          <a:ext cx="3984630" cy="592315"/>
+        </a:xfrm>
+        <a:custGeom>
+          <a:avLst/>
+          <a:gdLst/>
+          <a:ahLst/>
+          <a:cxnLst/>
+          <a:rect l="0" t="0" r="0" b="0"/>
+          <a:pathLst>
+            <a:path>
+              <a:moveTo>
+                <a:pt x="0" y="0"/>
+              </a:moveTo>
+              <a:lnTo>
+                <a:pt x="0" y="353111"/>
+              </a:lnTo>
+              <a:lnTo>
+                <a:pt x="3984630" y="353111"/>
+              </a:lnTo>
+              <a:lnTo>
+                <a:pt x="3984630" y="592315"/>
+              </a:lnTo>
+            </a:path>
+          </a:pathLst>
+        </a:custGeom>
+        <a:noFill/>
+        <a:ln w="9525" cap="rnd" cmpd="sng" algn="ctr">
+          <a:solidFill>
+            <a:schemeClr val="accent1">
+              <a:shade val="60000"/>
+              <a:hueOff val="0"/>
+              <a:satOff val="0"/>
+              <a:lumOff val="0"/>
+              <a:alphaOff val="0"/>
+            </a:schemeClr>
+          </a:solidFill>
+          <a:prstDash val="solid"/>
+        </a:ln>
+        <a:effectLst/>
+      </dsp:spPr>
+      <dsp:style>
+        <a:lnRef idx="1">
+          <a:scrgbClr r="0" g="0" b="0"/>
+        </a:lnRef>
+        <a:fillRef idx="0">
+          <a:scrgbClr r="0" g="0" b="0"/>
+        </a:fillRef>
+        <a:effectRef idx="0">
+          <a:scrgbClr r="0" g="0" b="0"/>
+        </a:effectRef>
+        <a:fontRef idx="minor"/>
+      </dsp:style>
+    </dsp:sp>
+    <dsp:sp modelId="{4A968BB4-BA07-4A5B-A53B-F2957ABC86FB}">
+      <dsp:nvSpPr>
+        <dsp:cNvPr id="0" name=""/>
+        <dsp:cNvSpPr/>
+      </dsp:nvSpPr>
+      <dsp:spPr>
+        <a:xfrm>
+          <a:off x="5077836" y="1676507"/>
+          <a:ext cx="1328210" cy="592315"/>
+        </a:xfrm>
+        <a:custGeom>
+          <a:avLst/>
+          <a:gdLst/>
+          <a:ahLst/>
+          <a:cxnLst/>
+          <a:rect l="0" t="0" r="0" b="0"/>
+          <a:pathLst>
+            <a:path>
+              <a:moveTo>
+                <a:pt x="0" y="0"/>
+              </a:moveTo>
+              <a:lnTo>
+                <a:pt x="0" y="353111"/>
+              </a:lnTo>
+              <a:lnTo>
+                <a:pt x="1328210" y="353111"/>
+              </a:lnTo>
+              <a:lnTo>
+                <a:pt x="1328210" y="592315"/>
+              </a:lnTo>
+            </a:path>
+          </a:pathLst>
+        </a:custGeom>
+        <a:noFill/>
+        <a:ln w="9525" cap="rnd" cmpd="sng" algn="ctr">
+          <a:solidFill>
+            <a:schemeClr val="accent1">
+              <a:shade val="60000"/>
+              <a:hueOff val="0"/>
+              <a:satOff val="0"/>
+              <a:lumOff val="0"/>
+              <a:alphaOff val="0"/>
+            </a:schemeClr>
+          </a:solidFill>
+          <a:prstDash val="solid"/>
+        </a:ln>
+        <a:effectLst/>
+      </dsp:spPr>
+      <dsp:style>
+        <a:lnRef idx="1">
+          <a:scrgbClr r="0" g="0" b="0"/>
+        </a:lnRef>
+        <a:fillRef idx="0">
+          <a:scrgbClr r="0" g="0" b="0"/>
+        </a:fillRef>
+        <a:effectRef idx="0">
+          <a:scrgbClr r="0" g="0" b="0"/>
+        </a:effectRef>
+        <a:fontRef idx="minor"/>
+      </dsp:style>
+    </dsp:sp>
+    <dsp:sp modelId="{31D35D76-771E-4FDE-BA75-EC484194EBC2}">
+      <dsp:nvSpPr>
+        <dsp:cNvPr id="0" name=""/>
+        <dsp:cNvSpPr/>
+      </dsp:nvSpPr>
+      <dsp:spPr>
+        <a:xfrm>
+          <a:off x="3749626" y="1676507"/>
+          <a:ext cx="1328210" cy="592315"/>
+        </a:xfrm>
+        <a:custGeom>
+          <a:avLst/>
+          <a:gdLst/>
+          <a:ahLst/>
+          <a:cxnLst/>
+          <a:rect l="0" t="0" r="0" b="0"/>
+          <a:pathLst>
+            <a:path>
+              <a:moveTo>
+                <a:pt x="1328210" y="0"/>
+              </a:moveTo>
+              <a:lnTo>
+                <a:pt x="1328210" y="353111"/>
+              </a:lnTo>
+              <a:lnTo>
+                <a:pt x="0" y="353111"/>
+              </a:lnTo>
+              <a:lnTo>
+                <a:pt x="0" y="592315"/>
+              </a:lnTo>
+            </a:path>
+          </a:pathLst>
+        </a:custGeom>
+        <a:noFill/>
+        <a:ln w="9525" cap="rnd" cmpd="sng" algn="ctr">
+          <a:solidFill>
+            <a:schemeClr val="accent1">
+              <a:shade val="60000"/>
+              <a:hueOff val="0"/>
+              <a:satOff val="0"/>
+              <a:lumOff val="0"/>
+              <a:alphaOff val="0"/>
+            </a:schemeClr>
+          </a:solidFill>
+          <a:prstDash val="solid"/>
+        </a:ln>
+        <a:effectLst/>
+      </dsp:spPr>
+      <dsp:style>
+        <a:lnRef idx="1">
+          <a:scrgbClr r="0" g="0" b="0"/>
+        </a:lnRef>
+        <a:fillRef idx="0">
+          <a:scrgbClr r="0" g="0" b="0"/>
+        </a:fillRef>
+        <a:effectRef idx="0">
+          <a:scrgbClr r="0" g="0" b="0"/>
+        </a:effectRef>
+        <a:fontRef idx="minor"/>
+      </dsp:style>
+    </dsp:sp>
+    <dsp:sp modelId="{095703D4-98CA-460D-B2F6-CA110B625919}">
+      <dsp:nvSpPr>
+        <dsp:cNvPr id="0" name=""/>
+        <dsp:cNvSpPr/>
+      </dsp:nvSpPr>
+      <dsp:spPr>
+        <a:xfrm>
+          <a:off x="1093206" y="1676507"/>
+          <a:ext cx="3984630" cy="592315"/>
+        </a:xfrm>
+        <a:custGeom>
+          <a:avLst/>
+          <a:gdLst/>
+          <a:ahLst/>
+          <a:cxnLst/>
+          <a:rect l="0" t="0" r="0" b="0"/>
+          <a:pathLst>
+            <a:path>
+              <a:moveTo>
+                <a:pt x="3984630" y="0"/>
+              </a:moveTo>
+              <a:lnTo>
+                <a:pt x="3984630" y="353111"/>
+              </a:lnTo>
+              <a:lnTo>
+                <a:pt x="0" y="353111"/>
+              </a:lnTo>
+              <a:lnTo>
+                <a:pt x="0" y="592315"/>
+              </a:lnTo>
+            </a:path>
+          </a:pathLst>
+        </a:custGeom>
+        <a:noFill/>
+        <a:ln w="9525" cap="rnd" cmpd="sng" algn="ctr">
+          <a:solidFill>
+            <a:schemeClr val="accent1">
+              <a:shade val="60000"/>
+              <a:hueOff val="0"/>
+              <a:satOff val="0"/>
+              <a:lumOff val="0"/>
+              <a:alphaOff val="0"/>
+            </a:schemeClr>
+          </a:solidFill>
+          <a:prstDash val="solid"/>
+        </a:ln>
+        <a:effectLst/>
+      </dsp:spPr>
+      <dsp:style>
+        <a:lnRef idx="1">
+          <a:scrgbClr r="0" g="0" b="0"/>
+        </a:lnRef>
+        <a:fillRef idx="0">
+          <a:scrgbClr r="0" g="0" b="0"/>
+        </a:fillRef>
+        <a:effectRef idx="0">
+          <a:scrgbClr r="0" g="0" b="0"/>
+        </a:effectRef>
+        <a:fontRef idx="minor"/>
+      </dsp:style>
+    </dsp:sp>
+    <dsp:sp modelId="{153DF482-9B63-4F22-A2E6-E0985D657AE7}">
+      <dsp:nvSpPr>
+        <dsp:cNvPr id="0" name=""/>
+        <dsp:cNvSpPr/>
+      </dsp:nvSpPr>
+      <dsp:spPr>
+        <a:xfrm>
+          <a:off x="4087831" y="651345"/>
+          <a:ext cx="1980010" cy="1025161"/>
+        </a:xfrm>
+        <a:prstGeom prst="rect">
+          <a:avLst/>
+        </a:prstGeom>
+        <a:gradFill rotWithShape="0">
+          <a:gsLst>
+            <a:gs pos="0">
+              <a:schemeClr val="accent1">
+                <a:hueOff val="0"/>
+                <a:satOff val="0"/>
+                <a:lumOff val="0"/>
+                <a:alphaOff val="0"/>
+                <a:tint val="96000"/>
+                <a:lumMod val="104000"/>
+              </a:schemeClr>
+            </a:gs>
+            <a:gs pos="100000">
+              <a:schemeClr val="accent1">
+                <a:hueOff val="0"/>
+                <a:satOff val="0"/>
+                <a:lumOff val="0"/>
+                <a:alphaOff val="0"/>
+                <a:shade val="90000"/>
+                <a:lumMod val="90000"/>
+              </a:schemeClr>
+            </a:gs>
+          </a:gsLst>
+          <a:lin ang="5400000" scaled="0"/>
+        </a:gradFill>
+        <a:ln>
+          <a:noFill/>
+        </a:ln>
+        <a:effectLst>
+          <a:outerShdw blurRad="63500" dist="25400" dir="5400000" rotWithShape="0">
+            <a:srgbClr val="000000">
+              <a:alpha val="60000"/>
+            </a:srgbClr>
+          </a:outerShdw>
+        </a:effectLst>
+      </dsp:spPr>
+      <dsp:style>
+        <a:lnRef idx="0">
+          <a:scrgbClr r="0" g="0" b="0"/>
+        </a:lnRef>
+        <a:fillRef idx="3">
+          <a:scrgbClr r="0" g="0" b="0"/>
+        </a:fillRef>
+        <a:effectRef idx="2">
+          <a:scrgbClr r="0" g="0" b="0"/>
+        </a:effectRef>
+        <a:fontRef idx="minor">
+          <a:schemeClr val="lt1"/>
+        </a:fontRef>
+      </dsp:style>
+      <dsp:txBody>
+        <a:bodyPr spcFirstLastPara="0" vert="horz" wrap="square" lIns="13970" tIns="13970" rIns="13970" bIns="144662" numCol="1" spcCol="1270" anchor="ctr" anchorCtr="0">
+          <a:noAutofit/>
+        </a:bodyPr>
+        <a:lstStyle/>
+        <a:p>
+          <a:pPr lvl="0" algn="ctr" defTabSz="977900">
+            <a:lnSpc>
+              <a:spcPct val="90000"/>
+            </a:lnSpc>
+            <a:spcBef>
+              <a:spcPct val="0"/>
+            </a:spcBef>
+            <a:spcAft>
+              <a:spcPct val="35000"/>
+            </a:spcAft>
+          </a:pPr>
+          <a:r>
+            <a:rPr lang="fr-FR" sz="2200" kern="1200"/>
+            <a:t>Chef de Projet</a:t>
+          </a:r>
+        </a:p>
+      </dsp:txBody>
+      <dsp:txXfrm>
+        <a:off x="4087831" y="651345"/>
+        <a:ext cx="1980010" cy="1025161"/>
+      </dsp:txXfrm>
+    </dsp:sp>
+    <dsp:sp modelId="{113EA813-3BA6-403B-BFBC-C6C029177D40}">
+      <dsp:nvSpPr>
+        <dsp:cNvPr id="0" name=""/>
+        <dsp:cNvSpPr/>
+      </dsp:nvSpPr>
+      <dsp:spPr>
+        <a:xfrm>
+          <a:off x="4483833" y="1448693"/>
+          <a:ext cx="1782009" cy="341720"/>
+        </a:xfrm>
+        <a:prstGeom prst="rect">
+          <a:avLst/>
+        </a:prstGeom>
+        <a:solidFill>
+          <a:schemeClr val="lt1">
+            <a:alpha val="90000"/>
+            <a:hueOff val="0"/>
+            <a:satOff val="0"/>
+            <a:lumOff val="0"/>
+            <a:alphaOff val="0"/>
+          </a:schemeClr>
+        </a:solidFill>
+        <a:ln w="9525" cap="rnd" cmpd="sng" algn="ctr">
+          <a:solidFill>
+            <a:schemeClr val="accent1">
+              <a:hueOff val="0"/>
+              <a:satOff val="0"/>
+              <a:lumOff val="0"/>
+              <a:alphaOff val="0"/>
+            </a:schemeClr>
+          </a:solidFill>
+          <a:prstDash val="solid"/>
+        </a:ln>
+        <a:effectLst/>
+      </dsp:spPr>
+      <dsp:style>
+        <a:lnRef idx="1">
+          <a:scrgbClr r="0" g="0" b="0"/>
+        </a:lnRef>
+        <a:fillRef idx="1">
+          <a:scrgbClr r="0" g="0" b="0"/>
+        </a:fillRef>
+        <a:effectRef idx="0">
+          <a:scrgbClr r="0" g="0" b="0"/>
+        </a:effectRef>
+        <a:fontRef idx="minor"/>
+      </dsp:style>
+      <dsp:txBody>
+        <a:bodyPr spcFirstLastPara="0" vert="horz" wrap="square" lIns="38100" tIns="9525" rIns="38100" bIns="9525" numCol="1" spcCol="1270" anchor="ctr" anchorCtr="0">
+          <a:noAutofit/>
+        </a:bodyPr>
+        <a:lstStyle/>
+        <a:p>
+          <a:pPr lvl="0" algn="r" defTabSz="666750">
+            <a:lnSpc>
+              <a:spcPct val="90000"/>
+            </a:lnSpc>
+            <a:spcBef>
+              <a:spcPct val="0"/>
+            </a:spcBef>
+            <a:spcAft>
+              <a:spcPct val="35000"/>
+            </a:spcAft>
+          </a:pPr>
+          <a:r>
+            <a:rPr lang="fr-FR" sz="1500" kern="1200" dirty="0"/>
+            <a:t>Cyril PY</a:t>
+          </a:r>
+        </a:p>
+      </dsp:txBody>
+      <dsp:txXfrm>
+        <a:off x="4483833" y="1448693"/>
+        <a:ext cx="1782009" cy="341720"/>
+      </dsp:txXfrm>
+    </dsp:sp>
+    <dsp:sp modelId="{5676D32F-1CE3-4176-81F2-A39E244B0416}">
+      <dsp:nvSpPr>
+        <dsp:cNvPr id="0" name=""/>
+        <dsp:cNvSpPr/>
+      </dsp:nvSpPr>
+      <dsp:spPr>
+        <a:xfrm>
+          <a:off x="103201" y="2268822"/>
+          <a:ext cx="1980010" cy="1025161"/>
+        </a:xfrm>
+        <a:prstGeom prst="rect">
+          <a:avLst/>
+        </a:prstGeom>
+        <a:gradFill rotWithShape="0">
+          <a:gsLst>
+            <a:gs pos="0">
+              <a:schemeClr val="accent1">
+                <a:hueOff val="0"/>
+                <a:satOff val="0"/>
+                <a:lumOff val="0"/>
+                <a:alphaOff val="0"/>
+                <a:tint val="96000"/>
+                <a:lumMod val="104000"/>
+              </a:schemeClr>
+            </a:gs>
+            <a:gs pos="100000">
+              <a:schemeClr val="accent1">
+                <a:hueOff val="0"/>
+                <a:satOff val="0"/>
+                <a:lumOff val="0"/>
+                <a:alphaOff val="0"/>
+                <a:shade val="90000"/>
+                <a:lumMod val="90000"/>
+              </a:schemeClr>
+            </a:gs>
+          </a:gsLst>
+          <a:lin ang="5400000" scaled="0"/>
+        </a:gradFill>
+        <a:ln>
+          <a:noFill/>
+        </a:ln>
+        <a:effectLst>
+          <a:outerShdw blurRad="63500" dist="25400" dir="5400000" rotWithShape="0">
+            <a:srgbClr val="000000">
+              <a:alpha val="60000"/>
+            </a:srgbClr>
+          </a:outerShdw>
+        </a:effectLst>
+      </dsp:spPr>
+      <dsp:style>
+        <a:lnRef idx="0">
+          <a:scrgbClr r="0" g="0" b="0"/>
+        </a:lnRef>
+        <a:fillRef idx="3">
+          <a:scrgbClr r="0" g="0" b="0"/>
+        </a:fillRef>
+        <a:effectRef idx="2">
+          <a:scrgbClr r="0" g="0" b="0"/>
+        </a:effectRef>
+        <a:fontRef idx="minor">
+          <a:schemeClr val="lt1"/>
+        </a:fontRef>
+      </dsp:style>
+      <dsp:txBody>
+        <a:bodyPr spcFirstLastPara="0" vert="horz" wrap="square" lIns="13970" tIns="13970" rIns="13970" bIns="144662" numCol="1" spcCol="1270" anchor="ctr" anchorCtr="0">
+          <a:noAutofit/>
+        </a:bodyPr>
+        <a:lstStyle/>
+        <a:p>
+          <a:pPr lvl="0" algn="ctr" defTabSz="977900">
+            <a:lnSpc>
+              <a:spcPct val="90000"/>
+            </a:lnSpc>
+            <a:spcBef>
+              <a:spcPct val="0"/>
+            </a:spcBef>
+            <a:spcAft>
+              <a:spcPct val="35000"/>
+            </a:spcAft>
+          </a:pPr>
+          <a:r>
+            <a:rPr lang="fr-FR" sz="2200" kern="1200" dirty="0" smtClean="0"/>
+            <a:t>Odométrie</a:t>
+          </a:r>
+          <a:endParaRPr lang="fr-FR" sz="2200" kern="1200" dirty="0"/>
+        </a:p>
+      </dsp:txBody>
+      <dsp:txXfrm>
+        <a:off x="103201" y="2268822"/>
+        <a:ext cx="1980010" cy="1025161"/>
+      </dsp:txXfrm>
+    </dsp:sp>
+    <dsp:sp modelId="{809562EB-4A18-496D-99D9-E0B60B4EAEA5}">
+      <dsp:nvSpPr>
+        <dsp:cNvPr id="0" name=""/>
+        <dsp:cNvSpPr/>
+      </dsp:nvSpPr>
+      <dsp:spPr>
+        <a:xfrm>
+          <a:off x="578787" y="3066170"/>
+          <a:ext cx="1782009" cy="341720"/>
+        </a:xfrm>
+        <a:prstGeom prst="rect">
+          <a:avLst/>
+        </a:prstGeom>
+        <a:solidFill>
+          <a:schemeClr val="lt1">
+            <a:alpha val="90000"/>
+            <a:hueOff val="0"/>
+            <a:satOff val="0"/>
+            <a:lumOff val="0"/>
+            <a:alphaOff val="0"/>
+          </a:schemeClr>
+        </a:solidFill>
+        <a:ln w="9525" cap="rnd" cmpd="sng" algn="ctr">
+          <a:solidFill>
+            <a:schemeClr val="accent1">
+              <a:hueOff val="0"/>
+              <a:satOff val="0"/>
+              <a:lumOff val="0"/>
+              <a:alphaOff val="0"/>
+            </a:schemeClr>
+          </a:solidFill>
+          <a:prstDash val="solid"/>
+        </a:ln>
+        <a:effectLst/>
+      </dsp:spPr>
+      <dsp:style>
+        <a:lnRef idx="1">
+          <a:scrgbClr r="0" g="0" b="0"/>
+        </a:lnRef>
+        <a:fillRef idx="1">
+          <a:scrgbClr r="0" g="0" b="0"/>
+        </a:fillRef>
+        <a:effectRef idx="0">
+          <a:scrgbClr r="0" g="0" b="0"/>
+        </a:effectRef>
+        <a:fontRef idx="minor"/>
+      </dsp:style>
+      <dsp:txBody>
+        <a:bodyPr spcFirstLastPara="0" vert="horz" wrap="square" lIns="38100" tIns="9525" rIns="38100" bIns="9525" numCol="1" spcCol="1270" anchor="ctr" anchorCtr="0">
+          <a:noAutofit/>
+        </a:bodyPr>
+        <a:lstStyle/>
+        <a:p>
+          <a:pPr lvl="0" algn="r" defTabSz="666750">
+            <a:lnSpc>
+              <a:spcPct val="90000"/>
+            </a:lnSpc>
+            <a:spcBef>
+              <a:spcPct val="0"/>
+            </a:spcBef>
+            <a:spcAft>
+              <a:spcPct val="35000"/>
+            </a:spcAft>
+          </a:pPr>
+          <a:r>
+            <a:rPr lang="fr-FR" sz="1500" kern="1200" dirty="0"/>
+            <a:t>Thomas PRAK</a:t>
+          </a:r>
+        </a:p>
+      </dsp:txBody>
+      <dsp:txXfrm>
+        <a:off x="578787" y="3066170"/>
+        <a:ext cx="1782009" cy="341720"/>
+      </dsp:txXfrm>
+    </dsp:sp>
+    <dsp:sp modelId="{F522147D-7926-4BE8-A844-0FB48C50D80C}">
+      <dsp:nvSpPr>
+        <dsp:cNvPr id="0" name=""/>
+        <dsp:cNvSpPr/>
+      </dsp:nvSpPr>
+      <dsp:spPr>
+        <a:xfrm>
+          <a:off x="2759621" y="2268822"/>
+          <a:ext cx="1980010" cy="1025161"/>
+        </a:xfrm>
+        <a:prstGeom prst="rect">
+          <a:avLst/>
+        </a:prstGeom>
+        <a:gradFill rotWithShape="0">
+          <a:gsLst>
+            <a:gs pos="0">
+              <a:schemeClr val="accent1">
+                <a:hueOff val="0"/>
+                <a:satOff val="0"/>
+                <a:lumOff val="0"/>
+                <a:alphaOff val="0"/>
+                <a:tint val="96000"/>
+                <a:lumMod val="104000"/>
+              </a:schemeClr>
+            </a:gs>
+            <a:gs pos="100000">
+              <a:schemeClr val="accent1">
+                <a:hueOff val="0"/>
+                <a:satOff val="0"/>
+                <a:lumOff val="0"/>
+                <a:alphaOff val="0"/>
+                <a:shade val="90000"/>
+                <a:lumMod val="90000"/>
+              </a:schemeClr>
+            </a:gs>
+          </a:gsLst>
+          <a:lin ang="5400000" scaled="0"/>
+        </a:gradFill>
+        <a:ln>
+          <a:noFill/>
+        </a:ln>
+        <a:effectLst>
+          <a:outerShdw blurRad="63500" dist="25400" dir="5400000" rotWithShape="0">
+            <a:srgbClr val="000000">
+              <a:alpha val="60000"/>
+            </a:srgbClr>
+          </a:outerShdw>
+        </a:effectLst>
+      </dsp:spPr>
+      <dsp:style>
+        <a:lnRef idx="0">
+          <a:scrgbClr r="0" g="0" b="0"/>
+        </a:lnRef>
+        <a:fillRef idx="3">
+          <a:scrgbClr r="0" g="0" b="0"/>
+        </a:fillRef>
+        <a:effectRef idx="2">
+          <a:scrgbClr r="0" g="0" b="0"/>
+        </a:effectRef>
+        <a:fontRef idx="minor">
+          <a:schemeClr val="lt1"/>
+        </a:fontRef>
+      </dsp:style>
+      <dsp:txBody>
+        <a:bodyPr spcFirstLastPara="0" vert="horz" wrap="square" lIns="13970" tIns="13970" rIns="13970" bIns="144662" numCol="1" spcCol="1270" anchor="ctr" anchorCtr="0">
+          <a:noAutofit/>
+        </a:bodyPr>
+        <a:lstStyle/>
+        <a:p>
+          <a:pPr lvl="0" algn="ctr" defTabSz="977900">
+            <a:lnSpc>
+              <a:spcPct val="90000"/>
+            </a:lnSpc>
+            <a:spcBef>
+              <a:spcPct val="0"/>
+            </a:spcBef>
+            <a:spcAft>
+              <a:spcPct val="35000"/>
+            </a:spcAft>
+          </a:pPr>
+          <a:r>
+            <a:rPr lang="fr-FR" sz="2200" kern="1200" dirty="0" smtClean="0"/>
+            <a:t>Client Web</a:t>
+          </a:r>
+          <a:endParaRPr lang="fr-FR" sz="2200" kern="1200" dirty="0"/>
+        </a:p>
+      </dsp:txBody>
+      <dsp:txXfrm>
+        <a:off x="2759621" y="2268822"/>
+        <a:ext cx="1980010" cy="1025161"/>
+      </dsp:txXfrm>
+    </dsp:sp>
+    <dsp:sp modelId="{BDDE5DF6-64AC-499B-A204-5D73CD5189A5}">
+      <dsp:nvSpPr>
+        <dsp:cNvPr id="0" name=""/>
+        <dsp:cNvSpPr/>
+      </dsp:nvSpPr>
+      <dsp:spPr>
+        <a:xfrm>
+          <a:off x="3155623" y="3066170"/>
+          <a:ext cx="1782009" cy="341720"/>
+        </a:xfrm>
+        <a:prstGeom prst="rect">
+          <a:avLst/>
+        </a:prstGeom>
+        <a:solidFill>
+          <a:schemeClr val="lt1">
+            <a:alpha val="90000"/>
+            <a:hueOff val="0"/>
+            <a:satOff val="0"/>
+            <a:lumOff val="0"/>
+            <a:alphaOff val="0"/>
+          </a:schemeClr>
+        </a:solidFill>
+        <a:ln w="9525" cap="rnd" cmpd="sng" algn="ctr">
+          <a:solidFill>
+            <a:schemeClr val="accent1">
+              <a:hueOff val="0"/>
+              <a:satOff val="0"/>
+              <a:lumOff val="0"/>
+              <a:alphaOff val="0"/>
+            </a:schemeClr>
+          </a:solidFill>
+          <a:prstDash val="solid"/>
+        </a:ln>
+        <a:effectLst/>
+      </dsp:spPr>
+      <dsp:style>
+        <a:lnRef idx="1">
+          <a:scrgbClr r="0" g="0" b="0"/>
+        </a:lnRef>
+        <a:fillRef idx="1">
+          <a:scrgbClr r="0" g="0" b="0"/>
+        </a:fillRef>
+        <a:effectRef idx="0">
+          <a:scrgbClr r="0" g="0" b="0"/>
+        </a:effectRef>
+        <a:fontRef idx="minor"/>
+      </dsp:style>
+      <dsp:txBody>
+        <a:bodyPr spcFirstLastPara="0" vert="horz" wrap="square" lIns="38100" tIns="9525" rIns="38100" bIns="9525" numCol="1" spcCol="1270" anchor="ctr" anchorCtr="0">
+          <a:noAutofit/>
+        </a:bodyPr>
+        <a:lstStyle/>
+        <a:p>
+          <a:pPr lvl="0" algn="r" defTabSz="666750">
+            <a:lnSpc>
+              <a:spcPct val="90000"/>
+            </a:lnSpc>
+            <a:spcBef>
+              <a:spcPct val="0"/>
+            </a:spcBef>
+            <a:spcAft>
+              <a:spcPct val="35000"/>
+            </a:spcAft>
+          </a:pPr>
+          <a:r>
+            <a:rPr lang="fr-FR" sz="1500" kern="1200" dirty="0"/>
+            <a:t>Justine SABBATIER</a:t>
+          </a:r>
+        </a:p>
+      </dsp:txBody>
+      <dsp:txXfrm>
+        <a:off x="3155623" y="3066170"/>
+        <a:ext cx="1782009" cy="341720"/>
+      </dsp:txXfrm>
+    </dsp:sp>
+    <dsp:sp modelId="{5662567F-F7A3-40C3-B265-EF28650FB1CC}">
+      <dsp:nvSpPr>
+        <dsp:cNvPr id="0" name=""/>
+        <dsp:cNvSpPr/>
+      </dsp:nvSpPr>
+      <dsp:spPr>
+        <a:xfrm>
+          <a:off x="5416041" y="2268822"/>
+          <a:ext cx="1980010" cy="1025161"/>
+        </a:xfrm>
+        <a:prstGeom prst="rect">
+          <a:avLst/>
+        </a:prstGeom>
+        <a:gradFill rotWithShape="0">
+          <a:gsLst>
+            <a:gs pos="0">
+              <a:schemeClr val="accent1">
+                <a:hueOff val="0"/>
+                <a:satOff val="0"/>
+                <a:lumOff val="0"/>
+                <a:alphaOff val="0"/>
+                <a:tint val="96000"/>
+                <a:lumMod val="104000"/>
+              </a:schemeClr>
+            </a:gs>
+            <a:gs pos="100000">
+              <a:schemeClr val="accent1">
+                <a:hueOff val="0"/>
+                <a:satOff val="0"/>
+                <a:lumOff val="0"/>
+                <a:alphaOff val="0"/>
+                <a:shade val="90000"/>
+                <a:lumMod val="90000"/>
+              </a:schemeClr>
+            </a:gs>
+          </a:gsLst>
+          <a:lin ang="5400000" scaled="0"/>
+        </a:gradFill>
+        <a:ln>
+          <a:noFill/>
+        </a:ln>
+        <a:effectLst>
+          <a:outerShdw blurRad="63500" dist="25400" dir="5400000" rotWithShape="0">
+            <a:srgbClr val="000000">
+              <a:alpha val="60000"/>
+            </a:srgbClr>
+          </a:outerShdw>
+        </a:effectLst>
+      </dsp:spPr>
+      <dsp:style>
+        <a:lnRef idx="0">
+          <a:scrgbClr r="0" g="0" b="0"/>
+        </a:lnRef>
+        <a:fillRef idx="3">
+          <a:scrgbClr r="0" g="0" b="0"/>
+        </a:fillRef>
+        <a:effectRef idx="2">
+          <a:scrgbClr r="0" g="0" b="0"/>
+        </a:effectRef>
+        <a:fontRef idx="minor">
+          <a:schemeClr val="lt1"/>
+        </a:fontRef>
+      </dsp:style>
+      <dsp:txBody>
+        <a:bodyPr spcFirstLastPara="0" vert="horz" wrap="square" lIns="13970" tIns="13970" rIns="13970" bIns="144662" numCol="1" spcCol="1270" anchor="ctr" anchorCtr="0">
+          <a:noAutofit/>
+        </a:bodyPr>
+        <a:lstStyle/>
+        <a:p>
+          <a:pPr lvl="0" algn="ctr" defTabSz="977900">
+            <a:lnSpc>
+              <a:spcPct val="90000"/>
+            </a:lnSpc>
+            <a:spcBef>
+              <a:spcPct val="0"/>
+            </a:spcBef>
+            <a:spcAft>
+              <a:spcPct val="35000"/>
+            </a:spcAft>
+          </a:pPr>
+          <a:r>
+            <a:rPr lang="fr-FR" sz="2200" kern="1200" dirty="0" smtClean="0"/>
+            <a:t>Algorithme</a:t>
+          </a:r>
+          <a:endParaRPr lang="fr-FR" sz="2200" kern="1200" dirty="0"/>
+        </a:p>
+      </dsp:txBody>
+      <dsp:txXfrm>
+        <a:off x="5416041" y="2268822"/>
+        <a:ext cx="1980010" cy="1025161"/>
+      </dsp:txXfrm>
+    </dsp:sp>
+    <dsp:sp modelId="{0E9E0690-608D-4BF4-8CCF-3E5EC47EB681}">
+      <dsp:nvSpPr>
+        <dsp:cNvPr id="0" name=""/>
+        <dsp:cNvSpPr/>
+      </dsp:nvSpPr>
+      <dsp:spPr>
+        <a:xfrm>
+          <a:off x="5812044" y="3066170"/>
+          <a:ext cx="1782009" cy="341720"/>
+        </a:xfrm>
+        <a:prstGeom prst="rect">
+          <a:avLst/>
+        </a:prstGeom>
+        <a:solidFill>
+          <a:schemeClr val="lt1">
+            <a:alpha val="90000"/>
+            <a:hueOff val="0"/>
+            <a:satOff val="0"/>
+            <a:lumOff val="0"/>
+            <a:alphaOff val="0"/>
+          </a:schemeClr>
+        </a:solidFill>
+        <a:ln w="9525" cap="rnd" cmpd="sng" algn="ctr">
+          <a:solidFill>
+            <a:schemeClr val="accent1">
+              <a:hueOff val="0"/>
+              <a:satOff val="0"/>
+              <a:lumOff val="0"/>
+              <a:alphaOff val="0"/>
+            </a:schemeClr>
+          </a:solidFill>
+          <a:prstDash val="solid"/>
+        </a:ln>
+        <a:effectLst/>
+      </dsp:spPr>
+      <dsp:style>
+        <a:lnRef idx="1">
+          <a:scrgbClr r="0" g="0" b="0"/>
+        </a:lnRef>
+        <a:fillRef idx="1">
+          <a:scrgbClr r="0" g="0" b="0"/>
+        </a:fillRef>
+        <a:effectRef idx="0">
+          <a:scrgbClr r="0" g="0" b="0"/>
+        </a:effectRef>
+        <a:fontRef idx="minor"/>
+      </dsp:style>
+      <dsp:txBody>
+        <a:bodyPr spcFirstLastPara="0" vert="horz" wrap="square" lIns="38100" tIns="9525" rIns="38100" bIns="9525" numCol="1" spcCol="1270" anchor="ctr" anchorCtr="0">
+          <a:noAutofit/>
+        </a:bodyPr>
+        <a:lstStyle/>
+        <a:p>
+          <a:pPr lvl="0" algn="r" defTabSz="666750">
+            <a:lnSpc>
+              <a:spcPct val="90000"/>
+            </a:lnSpc>
+            <a:spcBef>
+              <a:spcPct val="0"/>
+            </a:spcBef>
+            <a:spcAft>
+              <a:spcPct val="35000"/>
+            </a:spcAft>
+          </a:pPr>
+          <a:r>
+            <a:rPr lang="fr-FR" sz="1500" kern="1200"/>
+            <a:t>Mathias DA COSTA</a:t>
+          </a:r>
+        </a:p>
+      </dsp:txBody>
+      <dsp:txXfrm>
+        <a:off x="5812044" y="3066170"/>
+        <a:ext cx="1782009" cy="341720"/>
+      </dsp:txXfrm>
+    </dsp:sp>
+    <dsp:sp modelId="{96FA1259-64E4-404F-B34D-D3DE19F6B678}">
+      <dsp:nvSpPr>
+        <dsp:cNvPr id="0" name=""/>
+        <dsp:cNvSpPr/>
+      </dsp:nvSpPr>
+      <dsp:spPr>
+        <a:xfrm>
+          <a:off x="8072462" y="2268822"/>
+          <a:ext cx="1980010" cy="1025161"/>
+        </a:xfrm>
+        <a:prstGeom prst="rect">
+          <a:avLst/>
+        </a:prstGeom>
+        <a:gradFill rotWithShape="0">
+          <a:gsLst>
+            <a:gs pos="0">
+              <a:schemeClr val="accent1">
+                <a:hueOff val="0"/>
+                <a:satOff val="0"/>
+                <a:lumOff val="0"/>
+                <a:alphaOff val="0"/>
+                <a:tint val="96000"/>
+                <a:lumMod val="104000"/>
+              </a:schemeClr>
+            </a:gs>
+            <a:gs pos="100000">
+              <a:schemeClr val="accent1">
+                <a:hueOff val="0"/>
+                <a:satOff val="0"/>
+                <a:lumOff val="0"/>
+                <a:alphaOff val="0"/>
+                <a:shade val="90000"/>
+                <a:lumMod val="90000"/>
+              </a:schemeClr>
+            </a:gs>
+          </a:gsLst>
+          <a:lin ang="5400000" scaled="0"/>
+        </a:gradFill>
+        <a:ln>
+          <a:noFill/>
+        </a:ln>
+        <a:effectLst>
+          <a:outerShdw blurRad="63500" dist="25400" dir="5400000" rotWithShape="0">
+            <a:srgbClr val="000000">
+              <a:alpha val="60000"/>
+            </a:srgbClr>
+          </a:outerShdw>
+        </a:effectLst>
+      </dsp:spPr>
+      <dsp:style>
+        <a:lnRef idx="0">
+          <a:scrgbClr r="0" g="0" b="0"/>
+        </a:lnRef>
+        <a:fillRef idx="3">
+          <a:scrgbClr r="0" g="0" b="0"/>
+        </a:fillRef>
+        <a:effectRef idx="2">
+          <a:scrgbClr r="0" g="0" b="0"/>
+        </a:effectRef>
+        <a:fontRef idx="minor">
+          <a:schemeClr val="lt1"/>
+        </a:fontRef>
+      </dsp:style>
+      <dsp:txBody>
+        <a:bodyPr spcFirstLastPara="0" vert="horz" wrap="square" lIns="13970" tIns="13970" rIns="13970" bIns="144662" numCol="1" spcCol="1270" anchor="ctr" anchorCtr="0">
+          <a:noAutofit/>
+        </a:bodyPr>
+        <a:lstStyle/>
+        <a:p>
+          <a:pPr lvl="0" algn="ctr" defTabSz="977900">
+            <a:lnSpc>
+              <a:spcPct val="90000"/>
+            </a:lnSpc>
+            <a:spcBef>
+              <a:spcPct val="0"/>
+            </a:spcBef>
+            <a:spcAft>
+              <a:spcPct val="35000"/>
+            </a:spcAft>
+          </a:pPr>
+          <a:r>
+            <a:rPr lang="fr-FR" sz="2200" kern="1200" dirty="0" smtClean="0"/>
+            <a:t>Communication</a:t>
+          </a:r>
+          <a:endParaRPr lang="fr-FR" sz="2200" kern="1200" dirty="0"/>
+        </a:p>
+      </dsp:txBody>
+      <dsp:txXfrm>
+        <a:off x="8072462" y="2268822"/>
+        <a:ext cx="1980010" cy="1025161"/>
+      </dsp:txXfrm>
+    </dsp:sp>
+    <dsp:sp modelId="{A8EA838F-3B0C-4F99-BFF0-CFB047931BD1}">
+      <dsp:nvSpPr>
+        <dsp:cNvPr id="0" name=""/>
+        <dsp:cNvSpPr/>
+      </dsp:nvSpPr>
+      <dsp:spPr>
+        <a:xfrm>
+          <a:off x="8468464" y="3066170"/>
+          <a:ext cx="1782009" cy="341720"/>
+        </a:xfrm>
+        <a:prstGeom prst="rect">
+          <a:avLst/>
+        </a:prstGeom>
+        <a:solidFill>
+          <a:schemeClr val="lt1">
+            <a:alpha val="90000"/>
+            <a:hueOff val="0"/>
+            <a:satOff val="0"/>
+            <a:lumOff val="0"/>
+            <a:alphaOff val="0"/>
+          </a:schemeClr>
+        </a:solidFill>
+        <a:ln w="9525" cap="rnd" cmpd="sng" algn="ctr">
+          <a:solidFill>
+            <a:schemeClr val="accent1">
+              <a:hueOff val="0"/>
+              <a:satOff val="0"/>
+              <a:lumOff val="0"/>
+              <a:alphaOff val="0"/>
+            </a:schemeClr>
+          </a:solidFill>
+          <a:prstDash val="solid"/>
+        </a:ln>
+        <a:effectLst/>
+      </dsp:spPr>
+      <dsp:style>
+        <a:lnRef idx="1">
+          <a:scrgbClr r="0" g="0" b="0"/>
+        </a:lnRef>
+        <a:fillRef idx="1">
+          <a:scrgbClr r="0" g="0" b="0"/>
+        </a:fillRef>
+        <a:effectRef idx="0">
+          <a:scrgbClr r="0" g="0" b="0"/>
+        </a:effectRef>
+        <a:fontRef idx="minor"/>
+      </dsp:style>
+      <dsp:txBody>
+        <a:bodyPr spcFirstLastPara="0" vert="horz" wrap="square" lIns="38100" tIns="9525" rIns="38100" bIns="9525" numCol="1" spcCol="1270" anchor="ctr" anchorCtr="0">
+          <a:noAutofit/>
+        </a:bodyPr>
+        <a:lstStyle/>
+        <a:p>
+          <a:pPr lvl="0" algn="r" defTabSz="666750">
+            <a:lnSpc>
+              <a:spcPct val="90000"/>
+            </a:lnSpc>
+            <a:spcBef>
+              <a:spcPct val="0"/>
+            </a:spcBef>
+            <a:spcAft>
+              <a:spcPct val="35000"/>
+            </a:spcAft>
+          </a:pPr>
+          <a:r>
+            <a:rPr lang="fr-FR" sz="1500" kern="1200"/>
+            <a:t>Julien LOEVE</a:t>
+          </a:r>
+        </a:p>
+      </dsp:txBody>
+      <dsp:txXfrm>
+        <a:off x="8468464" y="3066170"/>
+        <a:ext cx="1782009" cy="341720"/>
+      </dsp:txXfrm>
+    </dsp:sp>
   </dsp:spTree>
 </dsp:drawing>
 </file>
@@ -2995,6 +4075,646 @@
       <dsp:cNvGrpSpPr/>
     </dsp:nvGrpSpPr>
     <dsp:grpSpPr/>
+    <dsp:sp modelId="{6A1FC33C-BD54-48D9-8848-B8051814CA7A}">
+      <dsp:nvSpPr>
+        <dsp:cNvPr id="0" name=""/>
+        <dsp:cNvSpPr/>
+      </dsp:nvSpPr>
+      <dsp:spPr>
+        <a:xfrm>
+          <a:off x="2656565" y="9048"/>
+          <a:ext cx="2412531" cy="2412899"/>
+        </a:xfrm>
+        <a:prstGeom prst="circularArrow">
+          <a:avLst>
+            <a:gd name="adj1" fmla="val 10980"/>
+            <a:gd name="adj2" fmla="val 1142322"/>
+            <a:gd name="adj3" fmla="val 4500000"/>
+            <a:gd name="adj4" fmla="val 10800000"/>
+            <a:gd name="adj5" fmla="val 12500"/>
+          </a:avLst>
+        </a:prstGeom>
+        <a:gradFill rotWithShape="0">
+          <a:gsLst>
+            <a:gs pos="0">
+              <a:schemeClr val="accent1">
+                <a:hueOff val="0"/>
+                <a:satOff val="0"/>
+                <a:lumOff val="0"/>
+                <a:alphaOff val="0"/>
+                <a:tint val="96000"/>
+                <a:lumMod val="104000"/>
+              </a:schemeClr>
+            </a:gs>
+            <a:gs pos="100000">
+              <a:schemeClr val="accent1">
+                <a:hueOff val="0"/>
+                <a:satOff val="0"/>
+                <a:lumOff val="0"/>
+                <a:alphaOff val="0"/>
+                <a:shade val="90000"/>
+                <a:lumMod val="90000"/>
+              </a:schemeClr>
+            </a:gs>
+          </a:gsLst>
+          <a:lin ang="5400000" scaled="0"/>
+        </a:gradFill>
+        <a:ln>
+          <a:noFill/>
+        </a:ln>
+        <a:effectLst>
+          <a:outerShdw blurRad="63500" dist="25400" dir="5400000" rotWithShape="0">
+            <a:srgbClr val="000000">
+              <a:alpha val="60000"/>
+            </a:srgbClr>
+          </a:outerShdw>
+        </a:effectLst>
+      </dsp:spPr>
+      <dsp:style>
+        <a:lnRef idx="0">
+          <a:scrgbClr r="0" g="0" b="0"/>
+        </a:lnRef>
+        <a:fillRef idx="3">
+          <a:scrgbClr r="0" g="0" b="0"/>
+        </a:fillRef>
+        <a:effectRef idx="2">
+          <a:scrgbClr r="0" g="0" b="0"/>
+        </a:effectRef>
+        <a:fontRef idx="minor">
+          <a:schemeClr val="lt1"/>
+        </a:fontRef>
+      </dsp:style>
+    </dsp:sp>
+    <dsp:sp modelId="{2BC33A24-C019-40DB-B4F8-D236F35960DA}">
+      <dsp:nvSpPr>
+        <dsp:cNvPr id="0" name=""/>
+        <dsp:cNvSpPr/>
+      </dsp:nvSpPr>
+      <dsp:spPr>
+        <a:xfrm>
+          <a:off x="5465248" y="601561"/>
+          <a:ext cx="3405954" cy="965360"/>
+        </a:xfrm>
+        <a:prstGeom prst="rect">
+          <a:avLst/>
+        </a:prstGeom>
+        <a:noFill/>
+        <a:ln>
+          <a:noFill/>
+        </a:ln>
+        <a:effectLst/>
+      </dsp:spPr>
+      <dsp:style>
+        <a:lnRef idx="0">
+          <a:scrgbClr r="0" g="0" b="0"/>
+        </a:lnRef>
+        <a:fillRef idx="0">
+          <a:scrgbClr r="0" g="0" b="0"/>
+        </a:fillRef>
+        <a:effectRef idx="0">
+          <a:scrgbClr r="0" g="0" b="0"/>
+        </a:effectRef>
+        <a:fontRef idx="minor"/>
+      </dsp:style>
+      <dsp:txBody>
+        <a:bodyPr spcFirstLastPara="0" vert="horz" wrap="square" lIns="15240" tIns="15240" rIns="15240" bIns="15240" numCol="1" spcCol="1270" anchor="ctr" anchorCtr="0">
+          <a:noAutofit/>
+        </a:bodyPr>
+        <a:lstStyle/>
+        <a:p>
+          <a:pPr marL="228600" lvl="1" indent="-228600" algn="l" defTabSz="1066800">
+            <a:lnSpc>
+              <a:spcPct val="90000"/>
+            </a:lnSpc>
+            <a:spcBef>
+              <a:spcPct val="0"/>
+            </a:spcBef>
+            <a:spcAft>
+              <a:spcPct val="15000"/>
+            </a:spcAft>
+            <a:buChar char="••"/>
+          </a:pPr>
+          <a:r>
+            <a:rPr lang="fr-FR" sz="2400" b="1" kern="1200" dirty="0" smtClean="0"/>
+            <a:t>Requête GET </a:t>
+          </a:r>
+          <a:endParaRPr lang="fr-FR" sz="2400" b="1" kern="1200" dirty="0"/>
+        </a:p>
+        <a:p>
+          <a:pPr marL="457200" lvl="2" indent="-228600" algn="l" defTabSz="1066800">
+            <a:lnSpc>
+              <a:spcPct val="90000"/>
+            </a:lnSpc>
+            <a:spcBef>
+              <a:spcPct val="0"/>
+            </a:spcBef>
+            <a:spcAft>
+              <a:spcPct val="15000"/>
+            </a:spcAft>
+            <a:buChar char="••"/>
+          </a:pPr>
+          <a:r>
+            <a:rPr lang="fr-FR" sz="2400" kern="1200" dirty="0" smtClean="0"/>
+            <a:t>Récupération du </a:t>
+          </a:r>
+          <a:r>
+            <a:rPr lang="fr-FR" sz="2400" kern="1200" dirty="0" err="1" smtClean="0"/>
+            <a:t>Json</a:t>
+          </a:r>
+          <a:endParaRPr lang="fr-FR" sz="2400" kern="1200" dirty="0"/>
+        </a:p>
+      </dsp:txBody>
+      <dsp:txXfrm>
+        <a:off x="5465248" y="601561"/>
+        <a:ext cx="3405954" cy="965360"/>
+      </dsp:txXfrm>
+    </dsp:sp>
+    <dsp:sp modelId="{41EA7880-1A0E-4CC2-B59F-914DDD351791}">
+      <dsp:nvSpPr>
+        <dsp:cNvPr id="0" name=""/>
+        <dsp:cNvSpPr/>
+      </dsp:nvSpPr>
+      <dsp:spPr>
+        <a:xfrm>
+          <a:off x="3162648" y="871129"/>
+          <a:ext cx="1340597" cy="670138"/>
+        </a:xfrm>
+        <a:prstGeom prst="rect">
+          <a:avLst/>
+        </a:prstGeom>
+        <a:noFill/>
+        <a:ln>
+          <a:noFill/>
+        </a:ln>
+        <a:effectLst/>
+      </dsp:spPr>
+      <dsp:style>
+        <a:lnRef idx="0">
+          <a:scrgbClr r="0" g="0" b="0"/>
+        </a:lnRef>
+        <a:fillRef idx="0">
+          <a:scrgbClr r="0" g="0" b="0"/>
+        </a:fillRef>
+        <a:effectRef idx="0">
+          <a:scrgbClr r="0" g="0" b="0"/>
+        </a:effectRef>
+        <a:fontRef idx="minor"/>
+      </dsp:style>
+      <dsp:txBody>
+        <a:bodyPr spcFirstLastPara="0" vert="horz" wrap="square" lIns="17780" tIns="17780" rIns="17780" bIns="17780" numCol="1" spcCol="1270" anchor="ctr" anchorCtr="0">
+          <a:noAutofit/>
+        </a:bodyPr>
+        <a:lstStyle/>
+        <a:p>
+          <a:pPr lvl="0" algn="ctr" defTabSz="1244600">
+            <a:lnSpc>
+              <a:spcPct val="90000"/>
+            </a:lnSpc>
+            <a:spcBef>
+              <a:spcPct val="0"/>
+            </a:spcBef>
+            <a:spcAft>
+              <a:spcPct val="35000"/>
+            </a:spcAft>
+          </a:pPr>
+          <a:r>
+            <a:rPr lang="fr-FR" sz="2800" kern="1200" dirty="0" smtClean="0"/>
+            <a:t>Ajax</a:t>
+          </a:r>
+          <a:endParaRPr lang="fr-FR" sz="2800" kern="1200" dirty="0"/>
+        </a:p>
+      </dsp:txBody>
+      <dsp:txXfrm>
+        <a:off x="3162648" y="871129"/>
+        <a:ext cx="1340597" cy="670138"/>
+      </dsp:txXfrm>
+    </dsp:sp>
+    <dsp:sp modelId="{1EAF82E5-DF36-4432-8EFB-3660BDEAF403}">
+      <dsp:nvSpPr>
+        <dsp:cNvPr id="0" name=""/>
+        <dsp:cNvSpPr/>
+      </dsp:nvSpPr>
+      <dsp:spPr>
+        <a:xfrm>
+          <a:off x="1959327" y="1386389"/>
+          <a:ext cx="2412531" cy="2412899"/>
+        </a:xfrm>
+        <a:prstGeom prst="leftCircularArrow">
+          <a:avLst>
+            <a:gd name="adj1" fmla="val 10980"/>
+            <a:gd name="adj2" fmla="val 1142322"/>
+            <a:gd name="adj3" fmla="val 6300000"/>
+            <a:gd name="adj4" fmla="val 18900000"/>
+            <a:gd name="adj5" fmla="val 12500"/>
+          </a:avLst>
+        </a:prstGeom>
+        <a:gradFill rotWithShape="0">
+          <a:gsLst>
+            <a:gs pos="0">
+              <a:schemeClr val="accent1">
+                <a:hueOff val="0"/>
+                <a:satOff val="0"/>
+                <a:lumOff val="0"/>
+                <a:alphaOff val="0"/>
+                <a:tint val="96000"/>
+                <a:lumMod val="104000"/>
+              </a:schemeClr>
+            </a:gs>
+            <a:gs pos="100000">
+              <a:schemeClr val="accent1">
+                <a:hueOff val="0"/>
+                <a:satOff val="0"/>
+                <a:lumOff val="0"/>
+                <a:alphaOff val="0"/>
+                <a:shade val="90000"/>
+                <a:lumMod val="90000"/>
+              </a:schemeClr>
+            </a:gs>
+          </a:gsLst>
+          <a:lin ang="5400000" scaled="0"/>
+        </a:gradFill>
+        <a:ln>
+          <a:noFill/>
+        </a:ln>
+        <a:effectLst>
+          <a:outerShdw blurRad="63500" dist="25400" dir="5400000" rotWithShape="0">
+            <a:srgbClr val="000000">
+              <a:alpha val="60000"/>
+            </a:srgbClr>
+          </a:outerShdw>
+        </a:effectLst>
+      </dsp:spPr>
+      <dsp:style>
+        <a:lnRef idx="0">
+          <a:scrgbClr r="0" g="0" b="0"/>
+        </a:lnRef>
+        <a:fillRef idx="3">
+          <a:scrgbClr r="0" g="0" b="0"/>
+        </a:fillRef>
+        <a:effectRef idx="2">
+          <a:scrgbClr r="0" g="0" b="0"/>
+        </a:effectRef>
+        <a:fontRef idx="minor">
+          <a:schemeClr val="lt1"/>
+        </a:fontRef>
+      </dsp:style>
+    </dsp:sp>
+    <dsp:sp modelId="{EED53FE3-01A0-4A4A-B958-999558A60657}">
+      <dsp:nvSpPr>
+        <dsp:cNvPr id="0" name=""/>
+        <dsp:cNvSpPr/>
+      </dsp:nvSpPr>
+      <dsp:spPr>
+        <a:xfrm>
+          <a:off x="4348677" y="2031293"/>
+          <a:ext cx="5643819" cy="965360"/>
+        </a:xfrm>
+        <a:prstGeom prst="rect">
+          <a:avLst/>
+        </a:prstGeom>
+        <a:noFill/>
+        <a:ln>
+          <a:noFill/>
+        </a:ln>
+        <a:effectLst/>
+      </dsp:spPr>
+      <dsp:style>
+        <a:lnRef idx="0">
+          <a:scrgbClr r="0" g="0" b="0"/>
+        </a:lnRef>
+        <a:fillRef idx="0">
+          <a:scrgbClr r="0" g="0" b="0"/>
+        </a:fillRef>
+        <a:effectRef idx="0">
+          <a:scrgbClr r="0" g="0" b="0"/>
+        </a:effectRef>
+        <a:fontRef idx="minor"/>
+      </dsp:style>
+      <dsp:txBody>
+        <a:bodyPr spcFirstLastPara="0" vert="horz" wrap="square" lIns="15240" tIns="15240" rIns="15240" bIns="15240" numCol="1" spcCol="1270" anchor="ctr" anchorCtr="0">
+          <a:noAutofit/>
+        </a:bodyPr>
+        <a:lstStyle/>
+        <a:p>
+          <a:pPr marL="228600" lvl="1" indent="-228600" algn="l" defTabSz="1066800">
+            <a:lnSpc>
+              <a:spcPct val="90000"/>
+            </a:lnSpc>
+            <a:spcBef>
+              <a:spcPct val="0"/>
+            </a:spcBef>
+            <a:spcAft>
+              <a:spcPct val="15000"/>
+            </a:spcAft>
+            <a:buChar char="••"/>
+          </a:pPr>
+          <a:r>
+            <a:rPr lang="fr-FR" sz="2400" b="1" kern="1200" dirty="0" smtClean="0"/>
+            <a:t>Nativement interprété</a:t>
+          </a:r>
+          <a:endParaRPr lang="fr-FR" sz="2400" b="1" kern="1200" dirty="0"/>
+        </a:p>
+        <a:p>
+          <a:pPr marL="457200" lvl="2" indent="-228600" algn="l" defTabSz="1066800">
+            <a:lnSpc>
+              <a:spcPct val="90000"/>
+            </a:lnSpc>
+            <a:spcBef>
+              <a:spcPct val="0"/>
+            </a:spcBef>
+            <a:spcAft>
+              <a:spcPct val="15000"/>
+            </a:spcAft>
+            <a:buChar char="••"/>
+          </a:pPr>
+          <a:r>
+            <a:rPr lang="fr-FR" sz="2400" kern="1200" dirty="0" smtClean="0"/>
+            <a:t>Extraction des données</a:t>
+          </a:r>
+          <a:endParaRPr lang="fr-FR" sz="2400" kern="1200" dirty="0"/>
+        </a:p>
+      </dsp:txBody>
+      <dsp:txXfrm>
+        <a:off x="4348677" y="2031293"/>
+        <a:ext cx="5643819" cy="965360"/>
+      </dsp:txXfrm>
+    </dsp:sp>
+    <dsp:sp modelId="{6AA25D69-5E05-40A3-9F00-9387D55331A8}">
+      <dsp:nvSpPr>
+        <dsp:cNvPr id="0" name=""/>
+        <dsp:cNvSpPr/>
+      </dsp:nvSpPr>
+      <dsp:spPr>
+        <a:xfrm>
+          <a:off x="2495294" y="2265538"/>
+          <a:ext cx="1340597" cy="670138"/>
+        </a:xfrm>
+        <a:prstGeom prst="rect">
+          <a:avLst/>
+        </a:prstGeom>
+        <a:noFill/>
+        <a:ln>
+          <a:noFill/>
+        </a:ln>
+        <a:effectLst/>
+      </dsp:spPr>
+      <dsp:style>
+        <a:lnRef idx="0">
+          <a:scrgbClr r="0" g="0" b="0"/>
+        </a:lnRef>
+        <a:fillRef idx="0">
+          <a:scrgbClr r="0" g="0" b="0"/>
+        </a:fillRef>
+        <a:effectRef idx="0">
+          <a:scrgbClr r="0" g="0" b="0"/>
+        </a:effectRef>
+        <a:fontRef idx="minor"/>
+      </dsp:style>
+      <dsp:txBody>
+        <a:bodyPr spcFirstLastPara="0" vert="horz" wrap="square" lIns="17780" tIns="17780" rIns="17780" bIns="17780" numCol="1" spcCol="1270" anchor="ctr" anchorCtr="0">
+          <a:noAutofit/>
+        </a:bodyPr>
+        <a:lstStyle/>
+        <a:p>
+          <a:pPr lvl="0" algn="ctr" defTabSz="1244600">
+            <a:lnSpc>
+              <a:spcPct val="90000"/>
+            </a:lnSpc>
+            <a:spcBef>
+              <a:spcPct val="0"/>
+            </a:spcBef>
+            <a:spcAft>
+              <a:spcPct val="35000"/>
+            </a:spcAft>
+          </a:pPr>
+          <a:r>
+            <a:rPr lang="fr-FR" sz="2800" kern="1200" dirty="0" err="1" smtClean="0"/>
+            <a:t>Jquery</a:t>
+          </a:r>
+          <a:endParaRPr lang="fr-FR" sz="2800" kern="1200" dirty="0"/>
+        </a:p>
+      </dsp:txBody>
+      <dsp:txXfrm>
+        <a:off x="2495294" y="2265538"/>
+        <a:ext cx="1340597" cy="670138"/>
+      </dsp:txXfrm>
+    </dsp:sp>
+    <dsp:sp modelId="{A7590864-E6C3-49D8-9B22-DF9210EFF756}">
+      <dsp:nvSpPr>
+        <dsp:cNvPr id="0" name=""/>
+        <dsp:cNvSpPr/>
+      </dsp:nvSpPr>
+      <dsp:spPr>
+        <a:xfrm>
+          <a:off x="2801108" y="2938684"/>
+          <a:ext cx="2072738" cy="2073569"/>
+        </a:xfrm>
+        <a:prstGeom prst="blockArc">
+          <a:avLst>
+            <a:gd name="adj1" fmla="val 13500000"/>
+            <a:gd name="adj2" fmla="val 10800000"/>
+            <a:gd name="adj3" fmla="val 12740"/>
+          </a:avLst>
+        </a:prstGeom>
+        <a:gradFill rotWithShape="0">
+          <a:gsLst>
+            <a:gs pos="0">
+              <a:schemeClr val="accent1">
+                <a:hueOff val="0"/>
+                <a:satOff val="0"/>
+                <a:lumOff val="0"/>
+                <a:alphaOff val="0"/>
+                <a:tint val="96000"/>
+                <a:lumMod val="104000"/>
+              </a:schemeClr>
+            </a:gs>
+            <a:gs pos="100000">
+              <a:schemeClr val="accent1">
+                <a:hueOff val="0"/>
+                <a:satOff val="0"/>
+                <a:lumOff val="0"/>
+                <a:alphaOff val="0"/>
+                <a:shade val="90000"/>
+                <a:lumMod val="90000"/>
+              </a:schemeClr>
+            </a:gs>
+          </a:gsLst>
+          <a:lin ang="5400000" scaled="0"/>
+        </a:gradFill>
+        <a:ln>
+          <a:noFill/>
+        </a:ln>
+        <a:effectLst>
+          <a:outerShdw blurRad="63500" dist="25400" dir="5400000" rotWithShape="0">
+            <a:srgbClr val="000000">
+              <a:alpha val="60000"/>
+            </a:srgbClr>
+          </a:outerShdw>
+        </a:effectLst>
+      </dsp:spPr>
+      <dsp:style>
+        <a:lnRef idx="0">
+          <a:scrgbClr r="0" g="0" b="0"/>
+        </a:lnRef>
+        <a:fillRef idx="3">
+          <a:scrgbClr r="0" g="0" b="0"/>
+        </a:fillRef>
+        <a:effectRef idx="2">
+          <a:scrgbClr r="0" g="0" b="0"/>
+        </a:effectRef>
+        <a:fontRef idx="minor">
+          <a:schemeClr val="lt1"/>
+        </a:fontRef>
+      </dsp:style>
+    </dsp:sp>
+    <dsp:sp modelId="{1EC2A02A-3E8D-473F-97D1-1FB993A4303A}">
+      <dsp:nvSpPr>
+        <dsp:cNvPr id="0" name=""/>
+        <dsp:cNvSpPr/>
+      </dsp:nvSpPr>
+      <dsp:spPr>
+        <a:xfrm>
+          <a:off x="5458447" y="3522663"/>
+          <a:ext cx="4534049" cy="965360"/>
+        </a:xfrm>
+        <a:prstGeom prst="rect">
+          <a:avLst/>
+        </a:prstGeom>
+        <a:noFill/>
+        <a:ln>
+          <a:noFill/>
+        </a:ln>
+        <a:effectLst/>
+      </dsp:spPr>
+      <dsp:style>
+        <a:lnRef idx="0">
+          <a:scrgbClr r="0" g="0" b="0"/>
+        </a:lnRef>
+        <a:fillRef idx="0">
+          <a:scrgbClr r="0" g="0" b="0"/>
+        </a:fillRef>
+        <a:effectRef idx="0">
+          <a:scrgbClr r="0" g="0" b="0"/>
+        </a:effectRef>
+        <a:fontRef idx="minor"/>
+      </dsp:style>
+      <dsp:txBody>
+        <a:bodyPr spcFirstLastPara="0" vert="horz" wrap="square" lIns="15240" tIns="15240" rIns="15240" bIns="15240" numCol="1" spcCol="1270" anchor="ctr" anchorCtr="0">
+          <a:noAutofit/>
+        </a:bodyPr>
+        <a:lstStyle/>
+        <a:p>
+          <a:pPr marL="228600" lvl="1" indent="-228600" algn="l" defTabSz="1066800">
+            <a:lnSpc>
+              <a:spcPct val="90000"/>
+            </a:lnSpc>
+            <a:spcBef>
+              <a:spcPct val="0"/>
+            </a:spcBef>
+            <a:spcAft>
+              <a:spcPct val="15000"/>
+            </a:spcAft>
+            <a:buChar char="••"/>
+          </a:pPr>
+          <a:r>
+            <a:rPr lang="fr-FR" sz="2400" b="1" kern="1200" dirty="0" smtClean="0"/>
+            <a:t>Balise &lt;</a:t>
+          </a:r>
+          <a:r>
+            <a:rPr lang="fr-FR" sz="2400" b="1" kern="1200" dirty="0" err="1" smtClean="0"/>
+            <a:t>canvas</a:t>
+          </a:r>
+          <a:r>
+            <a:rPr lang="fr-FR" sz="2400" b="1" kern="1200" dirty="0" smtClean="0"/>
+            <a:t>&gt;</a:t>
+          </a:r>
+          <a:endParaRPr lang="fr-FR" sz="2400" b="1" kern="1200" dirty="0"/>
+        </a:p>
+        <a:p>
+          <a:pPr marL="457200" lvl="2" indent="-228600" algn="l" defTabSz="1066800">
+            <a:lnSpc>
+              <a:spcPct val="90000"/>
+            </a:lnSpc>
+            <a:spcBef>
+              <a:spcPct val="0"/>
+            </a:spcBef>
+            <a:spcAft>
+              <a:spcPct val="15000"/>
+            </a:spcAft>
+            <a:buChar char="••"/>
+          </a:pPr>
+          <a:r>
+            <a:rPr lang="fr-FR" sz="2400" kern="1200" dirty="0" smtClean="0"/>
+            <a:t>Modélisation des obstacles</a:t>
+          </a:r>
+          <a:endParaRPr lang="fr-FR" sz="2400" kern="1200" dirty="0"/>
+        </a:p>
+      </dsp:txBody>
+      <dsp:txXfrm>
+        <a:off x="5458447" y="3522663"/>
+        <a:ext cx="4534049" cy="965360"/>
+      </dsp:txXfrm>
+    </dsp:sp>
+    <dsp:sp modelId="{7D2E6C7C-9586-4A0C-B907-A004212DF446}">
+      <dsp:nvSpPr>
+        <dsp:cNvPr id="0" name=""/>
+        <dsp:cNvSpPr/>
+      </dsp:nvSpPr>
+      <dsp:spPr>
+        <a:xfrm>
+          <a:off x="3165820" y="3661952"/>
+          <a:ext cx="1340597" cy="670138"/>
+        </a:xfrm>
+        <a:prstGeom prst="rect">
+          <a:avLst/>
+        </a:prstGeom>
+        <a:noFill/>
+        <a:ln>
+          <a:noFill/>
+        </a:ln>
+        <a:effectLst/>
+      </dsp:spPr>
+      <dsp:style>
+        <a:lnRef idx="0">
+          <a:scrgbClr r="0" g="0" b="0"/>
+        </a:lnRef>
+        <a:fillRef idx="0">
+          <a:scrgbClr r="0" g="0" b="0"/>
+        </a:fillRef>
+        <a:effectRef idx="0">
+          <a:scrgbClr r="0" g="0" b="0"/>
+        </a:effectRef>
+        <a:fontRef idx="minor"/>
+      </dsp:style>
+      <dsp:txBody>
+        <a:bodyPr spcFirstLastPara="0" vert="horz" wrap="square" lIns="17780" tIns="17780" rIns="17780" bIns="17780" numCol="1" spcCol="1270" anchor="ctr" anchorCtr="0">
+          <a:noAutofit/>
+        </a:bodyPr>
+        <a:lstStyle/>
+        <a:p>
+          <a:pPr lvl="0" algn="ctr" defTabSz="1244600">
+            <a:lnSpc>
+              <a:spcPct val="90000"/>
+            </a:lnSpc>
+            <a:spcBef>
+              <a:spcPct val="0"/>
+            </a:spcBef>
+            <a:spcAft>
+              <a:spcPct val="35000"/>
+            </a:spcAft>
+          </a:pPr>
+          <a:r>
+            <a:rPr lang="fr-FR" sz="2800" kern="1200" dirty="0" smtClean="0"/>
+            <a:t>HTML5</a:t>
+          </a:r>
+          <a:endParaRPr lang="fr-FR" sz="2800" kern="1200" dirty="0"/>
+        </a:p>
+      </dsp:txBody>
+      <dsp:txXfrm>
+        <a:off x="3165820" y="3661952"/>
+        <a:ext cx="1340597" cy="670138"/>
+      </dsp:txXfrm>
+    </dsp:sp>
   </dsp:spTree>
 </dsp:drawing>
 </file>
@@ -14450,45 +16170,54 @@
             <a:pPr algn="l"/>
             <a:r>
               <a:rPr lang="fr-FR" dirty="0" smtClean="0"/>
-              <a:t>Odométrie</a:t>
+              <a:t>Le robot – Le capteur</a:t>
             </a:r>
             <a:endParaRPr lang="fr-FR" dirty="0"/>
           </a:p>
         </p:txBody>
       </p:sp>
-      <p:sp>
-        <p:nvSpPr>
-          <p:cNvPr id="3" name="Espace réservé du contenu 2"/>
-          <p:cNvSpPr>
-            <a:spLocks noGrp="1"/>
-          </p:cNvSpPr>
-          <p:nvPr>
-            <p:ph idx="1"/>
-          </p:nvPr>
-        </p:nvSpPr>
-        <p:spPr/>
-        <p:txBody>
-          <a:bodyPr/>
-          <a:lstStyle/>
-          <a:p>
-            <a:r>
-              <a:rPr lang="fr-FR" dirty="0" smtClean="0"/>
-              <a:t>Position</a:t>
-            </a:r>
-          </a:p>
-          <a:p>
-            <a:r>
-              <a:rPr lang="fr-FR" dirty="0" smtClean="0"/>
-              <a:t>Orientation</a:t>
-            </a:r>
-            <a:endParaRPr lang="fr-FR" dirty="0"/>
-          </a:p>
-        </p:txBody>
-      </p:sp>
+      <p:pic>
+        <p:nvPicPr>
+          <p:cNvPr id="3" name="Image 2"/>
+          <p:cNvPicPr>
+            <a:picLocks noChangeAspect="1"/>
+          </p:cNvPicPr>
+          <p:nvPr/>
+        </p:nvPicPr>
+        <p:blipFill>
+          <a:blip r:embed="rId2"/>
+          <a:stretch>
+            <a:fillRect/>
+          </a:stretch>
+        </p:blipFill>
+        <p:spPr>
+          <a:xfrm>
+            <a:off x="185492" y="1468182"/>
+            <a:ext cx="11804739" cy="5209524"/>
+          </a:xfrm>
+          <a:prstGeom prst="rect">
+            <a:avLst/>
+          </a:prstGeom>
+          <a:ln w="38100" cap="sq">
+            <a:solidFill>
+              <a:srgbClr val="000000"/>
+            </a:solidFill>
+            <a:prstDash val="solid"/>
+            <a:miter lim="800000"/>
+          </a:ln>
+          <a:effectLst>
+            <a:outerShdw blurRad="50800" dist="38100" dir="2700000" algn="tl" rotWithShape="0">
+              <a:srgbClr val="000000">
+                <a:alpha val="43000"/>
+              </a:srgbClr>
+            </a:outerShdw>
+          </a:effectLst>
+        </p:spPr>
+      </p:pic>
     </p:spTree>
     <p:extLst>
       <p:ext uri="{BB962C8B-B14F-4D97-AF65-F5344CB8AC3E}">
-        <p14:creationId xmlns:p14="http://schemas.microsoft.com/office/powerpoint/2010/main" val="1194455758"/>
+        <p14:creationId xmlns:p14="http://schemas.microsoft.com/office/powerpoint/2010/main" val="3312832204"/>
       </p:ext>
     </p:extLst>
   </p:cSld>
@@ -14540,6 +16269,186 @@
             <a:pPr algn="l"/>
             <a:r>
               <a:rPr lang="fr-FR" dirty="0" smtClean="0"/>
+              <a:t>Algorithme</a:t>
+            </a:r>
+            <a:endParaRPr lang="fr-FR" dirty="0"/>
+          </a:p>
+        </p:txBody>
+      </p:sp>
+      <p:sp>
+        <p:nvSpPr>
+          <p:cNvPr id="3" name="Espace réservé du contenu 2"/>
+          <p:cNvSpPr>
+            <a:spLocks noGrp="1"/>
+          </p:cNvSpPr>
+          <p:nvPr>
+            <p:ph idx="1"/>
+          </p:nvPr>
+        </p:nvSpPr>
+        <p:spPr/>
+        <p:txBody>
+          <a:bodyPr/>
+          <a:lstStyle/>
+          <a:p>
+            <a:r>
+              <a:rPr lang="fr-FR" dirty="0" smtClean="0"/>
+              <a:t>Algorithme de la main gauche</a:t>
+            </a:r>
+          </a:p>
+          <a:p>
+            <a:r>
+              <a:rPr lang="fr-FR" dirty="0" smtClean="0"/>
+              <a:t>Machine à état</a:t>
+            </a:r>
+            <a:endParaRPr lang="fr-FR" dirty="0"/>
+          </a:p>
+        </p:txBody>
+      </p:sp>
+    </p:spTree>
+    <p:extLst>
+      <p:ext uri="{BB962C8B-B14F-4D97-AF65-F5344CB8AC3E}">
+        <p14:creationId xmlns:p14="http://schemas.microsoft.com/office/powerpoint/2010/main" val="2836795985"/>
+      </p:ext>
+    </p:extLst>
+  </p:cSld>
+  <p:clrMapOvr>
+    <a:masterClrMapping/>
+  </p:clrMapOvr>
+  <p:timing>
+    <p:tnLst>
+      <p:par>
+        <p:cTn id="1" dur="indefinite" restart="never" nodeType="tmRoot"/>
+      </p:par>
+    </p:tnLst>
+  </p:timing>
+</p:sld>
+</file>
+
+<file path=ppt/slides/slide12.xml><?xml version="1.0" encoding="utf-8"?>
+<p:sld xmlns:a="http://schemas.openxmlformats.org/drawingml/2006/main" xmlns:r="http://schemas.openxmlformats.org/officeDocument/2006/relationships" xmlns:p="http://schemas.openxmlformats.org/presentationml/2006/main">
+  <p:cSld>
+    <p:spTree>
+      <p:nvGrpSpPr>
+        <p:cNvPr id="1" name=""/>
+        <p:cNvGrpSpPr/>
+        <p:nvPr/>
+      </p:nvGrpSpPr>
+      <p:grpSpPr>
+        <a:xfrm>
+          <a:off x="0" y="0"/>
+          <a:ext cx="0" cy="0"/>
+          <a:chOff x="0" y="0"/>
+          <a:chExt cx="0" cy="0"/>
+        </a:xfrm>
+      </p:grpSpPr>
+      <p:sp>
+        <p:nvSpPr>
+          <p:cNvPr id="2" name="Titre 1"/>
+          <p:cNvSpPr>
+            <a:spLocks noGrp="1"/>
+          </p:cNvSpPr>
+          <p:nvPr>
+            <p:ph type="title"/>
+          </p:nvPr>
+        </p:nvSpPr>
+        <p:spPr/>
+        <p:txBody>
+          <a:bodyPr/>
+          <a:lstStyle/>
+          <a:p>
+            <a:pPr algn="l"/>
+            <a:r>
+              <a:rPr lang="fr-FR" dirty="0" smtClean="0"/>
+              <a:t>Odométrie</a:t>
+            </a:r>
+            <a:endParaRPr lang="fr-FR" dirty="0"/>
+          </a:p>
+        </p:txBody>
+      </p:sp>
+      <p:sp>
+        <p:nvSpPr>
+          <p:cNvPr id="3" name="Espace réservé du contenu 2"/>
+          <p:cNvSpPr>
+            <a:spLocks noGrp="1"/>
+          </p:cNvSpPr>
+          <p:nvPr>
+            <p:ph idx="1"/>
+          </p:nvPr>
+        </p:nvSpPr>
+        <p:spPr/>
+        <p:txBody>
+          <a:bodyPr/>
+          <a:lstStyle/>
+          <a:p>
+            <a:r>
+              <a:rPr lang="fr-FR" dirty="0" smtClean="0"/>
+              <a:t>Position</a:t>
+            </a:r>
+          </a:p>
+          <a:p>
+            <a:r>
+              <a:rPr lang="fr-FR" dirty="0" smtClean="0"/>
+              <a:t>Orientation</a:t>
+            </a:r>
+            <a:endParaRPr lang="fr-FR" dirty="0"/>
+          </a:p>
+        </p:txBody>
+      </p:sp>
+    </p:spTree>
+    <p:extLst>
+      <p:ext uri="{BB962C8B-B14F-4D97-AF65-F5344CB8AC3E}">
+        <p14:creationId xmlns:p14="http://schemas.microsoft.com/office/powerpoint/2010/main" val="1194455758"/>
+      </p:ext>
+    </p:extLst>
+  </p:cSld>
+  <p:clrMapOvr>
+    <a:masterClrMapping/>
+  </p:clrMapOvr>
+  <p:timing>
+    <p:tnLst>
+      <p:par>
+        <p:cTn id="1" dur="indefinite" restart="never" nodeType="tmRoot"/>
+      </p:par>
+    </p:tnLst>
+  </p:timing>
+</p:sld>
+</file>
+
+<file path=ppt/slides/slide13.xml><?xml version="1.0" encoding="utf-8"?>
+<p:sld xmlns:a="http://schemas.openxmlformats.org/drawingml/2006/main" xmlns:r="http://schemas.openxmlformats.org/officeDocument/2006/relationships" xmlns:p="http://schemas.openxmlformats.org/presentationml/2006/main">
+  <p:cSld>
+    <p:spTree>
+      <p:nvGrpSpPr>
+        <p:cNvPr id="1" name=""/>
+        <p:cNvGrpSpPr/>
+        <p:nvPr/>
+      </p:nvGrpSpPr>
+      <p:grpSpPr>
+        <a:xfrm>
+          <a:off x="0" y="0"/>
+          <a:ext cx="0" cy="0"/>
+          <a:chOff x="0" y="0"/>
+          <a:chExt cx="0" cy="0"/>
+        </a:xfrm>
+      </p:grpSpPr>
+      <p:sp>
+        <p:nvSpPr>
+          <p:cNvPr id="2" name="Titre 1"/>
+          <p:cNvSpPr>
+            <a:spLocks noGrp="1"/>
+          </p:cNvSpPr>
+          <p:nvPr>
+            <p:ph type="title"/>
+          </p:nvPr>
+        </p:nvSpPr>
+        <p:spPr/>
+        <p:txBody>
+          <a:bodyPr/>
+          <a:lstStyle/>
+          <a:p>
+            <a:pPr algn="l"/>
+            <a:r>
+              <a:rPr lang="fr-FR" dirty="0" smtClean="0"/>
               <a:t>Serveur Web</a:t>
             </a:r>
             <a:endParaRPr lang="fr-FR" dirty="0"/>
@@ -14585,7 +16494,7 @@
 </p:sld>
 </file>
 
-<file path=ppt/slides/slide12.xml><?xml version="1.0" encoding="utf-8"?>
+<file path=ppt/slides/slide14.xml><?xml version="1.0" encoding="utf-8"?>
 <p:sld xmlns:a="http://schemas.openxmlformats.org/drawingml/2006/main" xmlns:r="http://schemas.openxmlformats.org/officeDocument/2006/relationships" xmlns:p="http://schemas.openxmlformats.org/presentationml/2006/main">
   <p:cSld>
     <p:spTree>
@@ -14739,7 +16648,7 @@
 </p:sld>
 </file>
 
-<file path=ppt/slides/slide13.xml><?xml version="1.0" encoding="utf-8"?>
+<file path=ppt/slides/slide15.xml><?xml version="1.0" encoding="utf-8"?>
 <p:sld xmlns:a="http://schemas.openxmlformats.org/drawingml/2006/main" xmlns:r="http://schemas.openxmlformats.org/officeDocument/2006/relationships" xmlns:p="http://schemas.openxmlformats.org/presentationml/2006/main">
   <p:cSld>
     <p:spTree>
@@ -14823,7 +16732,7 @@
 </p:sld>
 </file>
 
-<file path=ppt/slides/slide14.xml><?xml version="1.0" encoding="utf-8"?>
+<file path=ppt/slides/slide16.xml><?xml version="1.0" encoding="utf-8"?>
 <p:sld xmlns:a="http://schemas.openxmlformats.org/drawingml/2006/main" xmlns:r="http://schemas.openxmlformats.org/officeDocument/2006/relationships" xmlns:p="http://schemas.openxmlformats.org/presentationml/2006/main">
   <p:cSld>
     <p:spTree>
@@ -15388,22 +17297,271 @@
           </a:p>
         </p:txBody>
       </p:sp>
-      <p:sp>
-        <p:nvSpPr>
-          <p:cNvPr id="3" name="Espace réservé du contenu 2"/>
-          <p:cNvSpPr>
-            <a:spLocks noGrp="1"/>
-          </p:cNvSpPr>
+      <p:pic>
+        <p:nvPicPr>
+          <p:cNvPr id="5" name="Espace réservé du contenu 4"/>
+          <p:cNvPicPr>
+            <a:picLocks noGrp="1" noChangeAspect="1"/>
+          </p:cNvPicPr>
           <p:nvPr>
             <p:ph idx="1"/>
           </p:nvPr>
+        </p:nvPicPr>
+        <p:blipFill rotWithShape="1">
+          <a:blip r:embed="rId2">
+            <a:extLst>
+              <a:ext uri="{28A0092B-C50C-407E-A947-70E740481C1C}">
+                <a14:useLocalDpi xmlns:a14="http://schemas.microsoft.com/office/drawing/2010/main" val="0"/>
+              </a:ext>
+            </a:extLst>
+          </a:blip>
+          <a:srcRect b="3642"/>
+          <a:stretch/>
+        </p:blipFill>
+        <p:spPr>
+          <a:xfrm>
+            <a:off x="1077569" y="2092041"/>
+            <a:ext cx="1295476" cy="1117257"/>
+          </a:xfrm>
+        </p:spPr>
+      </p:pic>
+      <p:sp>
+        <p:nvSpPr>
+          <p:cNvPr id="6" name="Titre 1"/>
+          <p:cNvSpPr txBox="1">
+            <a:spLocks/>
+          </p:cNvSpPr>
+          <p:nvPr/>
         </p:nvSpPr>
-        <p:spPr/>
+        <p:spPr>
+          <a:xfrm>
+            <a:off x="2772164" y="1884006"/>
+            <a:ext cx="7935834" cy="4107361"/>
+          </a:xfrm>
+          <a:prstGeom prst="rect">
+            <a:avLst/>
+          </a:prstGeom>
+          <a:effectLst>
+            <a:outerShdw blurRad="25400" dir="17880000">
+              <a:srgbClr val="000000">
+                <a:alpha val="46000"/>
+              </a:srgbClr>
+            </a:outerShdw>
+          </a:effectLst>
+        </p:spPr>
         <p:txBody>
-          <a:bodyPr/>
-          <a:lstStyle/>
-          <a:p>
-            <a:endParaRPr lang="fr-FR" dirty="0"/>
+          <a:bodyPr vert="horz" lIns="91440" tIns="45720" rIns="91440" bIns="45720" rtlCol="0" anchor="t">
+            <a:normAutofit/>
+          </a:bodyPr>
+          <a:lstStyle>
+            <a:lvl1pPr algn="ctr" defTabSz="457200" rtl="0" eaLnBrk="1" latinLnBrk="0" hangingPunct="1">
+              <a:spcBef>
+                <a:spcPct val="0"/>
+              </a:spcBef>
+              <a:buNone/>
+              <a:defRPr sz="4000" kern="1200">
+                <a:ln>
+                  <a:solidFill>
+                    <a:schemeClr val="bg1">
+                      <a:lumMod val="75000"/>
+                      <a:lumOff val="25000"/>
+                      <a:alpha val="10000"/>
+                    </a:schemeClr>
+                  </a:solidFill>
+                </a:ln>
+                <a:solidFill>
+                  <a:schemeClr val="tx2"/>
+                </a:solidFill>
+                <a:effectLst>
+                  <a:outerShdw blurRad="9525" dist="25400" dir="14640000" algn="tl" rotWithShape="0">
+                    <a:schemeClr val="bg1">
+                      <a:alpha val="30000"/>
+                    </a:schemeClr>
+                  </a:outerShdw>
+                </a:effectLst>
+                <a:latin typeface="+mj-lt"/>
+                <a:ea typeface="+mj-ea"/>
+                <a:cs typeface="Trebuchet MS"/>
+              </a:defRPr>
+            </a:lvl1pPr>
+            <a:lvl2pPr eaLnBrk="1" hangingPunct="1">
+              <a:defRPr>
+                <a:solidFill>
+                  <a:schemeClr val="tx2"/>
+                </a:solidFill>
+              </a:defRPr>
+            </a:lvl2pPr>
+            <a:lvl3pPr eaLnBrk="1" hangingPunct="1">
+              <a:defRPr>
+                <a:solidFill>
+                  <a:schemeClr val="tx2"/>
+                </a:solidFill>
+              </a:defRPr>
+            </a:lvl3pPr>
+            <a:lvl4pPr eaLnBrk="1" hangingPunct="1">
+              <a:defRPr>
+                <a:solidFill>
+                  <a:schemeClr val="tx2"/>
+                </a:solidFill>
+              </a:defRPr>
+            </a:lvl4pPr>
+            <a:lvl5pPr eaLnBrk="1" hangingPunct="1">
+              <a:defRPr>
+                <a:solidFill>
+                  <a:schemeClr val="tx2"/>
+                </a:solidFill>
+              </a:defRPr>
+            </a:lvl5pPr>
+            <a:lvl6pPr eaLnBrk="1" hangingPunct="1">
+              <a:defRPr>
+                <a:solidFill>
+                  <a:schemeClr val="tx2"/>
+                </a:solidFill>
+              </a:defRPr>
+            </a:lvl6pPr>
+            <a:lvl7pPr eaLnBrk="1" hangingPunct="1">
+              <a:defRPr>
+                <a:solidFill>
+                  <a:schemeClr val="tx2"/>
+                </a:solidFill>
+              </a:defRPr>
+            </a:lvl7pPr>
+            <a:lvl8pPr eaLnBrk="1" hangingPunct="1">
+              <a:defRPr>
+                <a:solidFill>
+                  <a:schemeClr val="tx2"/>
+                </a:solidFill>
+              </a:defRPr>
+            </a:lvl8pPr>
+            <a:lvl9pPr eaLnBrk="1" hangingPunct="1">
+              <a:defRPr>
+                <a:solidFill>
+                  <a:schemeClr val="tx2"/>
+                </a:solidFill>
+              </a:defRPr>
+            </a:lvl9pPr>
+          </a:lstStyle>
+          <a:p>
+            <a:pPr algn="l"/>
+            <a:r>
+              <a:rPr lang="fr-FR" sz="2000" dirty="0" smtClean="0"/>
+              <a:t>Moteurs pas à pas  ( </a:t>
+            </a:r>
+            <a:r>
+              <a:rPr lang="fr-FR" sz="2000" dirty="0" err="1" smtClean="0"/>
+              <a:t>MotionKing</a:t>
+            </a:r>
+            <a:r>
+              <a:rPr lang="fr-FR" sz="2000" dirty="0" smtClean="0"/>
+              <a:t> </a:t>
+            </a:r>
+            <a:r>
+              <a:rPr lang="fr-FR" sz="2000" b="1" dirty="0" smtClean="0"/>
+              <a:t>17HS3401 )</a:t>
+            </a:r>
+          </a:p>
+          <a:p>
+            <a:pPr algn="l"/>
+            <a:endParaRPr lang="fr-FR" sz="2000" b="1" dirty="0"/>
+          </a:p>
+          <a:p>
+            <a:pPr algn="l"/>
+            <a:r>
+              <a:rPr lang="fr-FR" sz="2000" dirty="0" smtClean="0">
+                <a:effectLst/>
+              </a:rPr>
+              <a:t>Angle pour 1 pas = 1,8°</a:t>
+            </a:r>
+          </a:p>
+          <a:p>
+            <a:pPr algn="l"/>
+            <a:endParaRPr lang="fr-FR" sz="2000" dirty="0" smtClean="0">
+              <a:effectLst/>
+            </a:endParaRPr>
+          </a:p>
+          <a:p>
+            <a:pPr algn="l"/>
+            <a:r>
+              <a:rPr lang="fr-FR" sz="2000" dirty="0" smtClean="0">
+                <a:effectLst/>
+              </a:rPr>
+              <a:t>Pas pour 1 tour =  200    (360°/1,8°)</a:t>
+            </a:r>
+          </a:p>
+          <a:p>
+            <a:pPr algn="l"/>
+            <a:endParaRPr lang="fr-FR" sz="2000" dirty="0" smtClean="0">
+              <a:effectLst/>
+            </a:endParaRPr>
+          </a:p>
+          <a:p>
+            <a:pPr algn="l"/>
+            <a:r>
+              <a:rPr lang="fr-FR" sz="2000" dirty="0" smtClean="0">
+                <a:effectLst/>
+              </a:rPr>
+              <a:t>Fonction de contrôle du moteur:</a:t>
+            </a:r>
+            <a:endParaRPr lang="fr-FR" sz="2000" dirty="0">
+              <a:effectLst/>
+            </a:endParaRPr>
+          </a:p>
+          <a:p>
+            <a:pPr algn="l"/>
+            <a:r>
+              <a:rPr lang="fr-FR" sz="2000" dirty="0" smtClean="0">
+                <a:effectLst/>
+              </a:rPr>
+              <a:t>	Stepper : </a:t>
+            </a:r>
+            <a:r>
+              <a:rPr lang="fr-FR" sz="2000" dirty="0" err="1" smtClean="0">
+                <a:effectLst/>
+              </a:rPr>
+              <a:t>step</a:t>
+            </a:r>
+            <a:r>
+              <a:rPr lang="fr-FR" sz="2000" dirty="0" smtClean="0">
+                <a:effectLst/>
+              </a:rPr>
+              <a:t>(</a:t>
+            </a:r>
+            <a:r>
+              <a:rPr lang="fr-FR" sz="2000" dirty="0" err="1" smtClean="0">
+                <a:effectLst/>
+              </a:rPr>
+              <a:t>steps</a:t>
+            </a:r>
+            <a:r>
+              <a:rPr lang="fr-FR" sz="2000" dirty="0" smtClean="0">
+                <a:effectLst/>
+              </a:rPr>
+              <a:t>) </a:t>
+            </a:r>
+            <a:r>
+              <a:rPr lang="fr-FR" sz="2000" dirty="0">
+                <a:effectLst/>
+              </a:rPr>
+              <a:t>-&gt; fonction bloquante</a:t>
+            </a:r>
+          </a:p>
+          <a:p>
+            <a:pPr algn="l"/>
+            <a:endParaRPr lang="fr-FR" sz="2000" dirty="0" smtClean="0">
+              <a:effectLst/>
+            </a:endParaRPr>
+          </a:p>
+          <a:p>
+            <a:pPr algn="l"/>
+            <a:r>
+              <a:rPr lang="fr-FR" sz="2000" dirty="0">
+                <a:effectLst/>
+              </a:rPr>
+              <a:t>	</a:t>
+            </a:r>
+            <a:endParaRPr lang="fr-FR" sz="2000" dirty="0" smtClean="0">
+              <a:effectLst/>
+            </a:endParaRPr>
           </a:p>
         </p:txBody>
       </p:sp>
@@ -15439,6 +17597,2052 @@
       </p:grpSpPr>
       <p:sp>
         <p:nvSpPr>
+          <p:cNvPr id="4" name="Titre 1"/>
+          <p:cNvSpPr>
+            <a:spLocks noGrp="1"/>
+          </p:cNvSpPr>
+          <p:nvPr>
+            <p:ph type="title"/>
+          </p:nvPr>
+        </p:nvSpPr>
+        <p:spPr>
+          <a:xfrm>
+            <a:off x="913795" y="568656"/>
+            <a:ext cx="10353762" cy="970450"/>
+          </a:xfrm>
+        </p:spPr>
+        <p:txBody>
+          <a:bodyPr/>
+          <a:lstStyle/>
+          <a:p>
+            <a:pPr algn="l"/>
+            <a:r>
+              <a:rPr lang="fr-FR" dirty="0" smtClean="0"/>
+              <a:t>Odométrie – Position Robot</a:t>
+            </a:r>
+            <a:endParaRPr lang="fr-FR" dirty="0"/>
+          </a:p>
+        </p:txBody>
+      </p:sp>
+      <p:sp>
+        <p:nvSpPr>
+          <p:cNvPr id="14" name="Titre 1"/>
+          <p:cNvSpPr txBox="1">
+            <a:spLocks/>
+          </p:cNvSpPr>
+          <p:nvPr/>
+        </p:nvSpPr>
+        <p:spPr>
+          <a:xfrm>
+            <a:off x="913795" y="1740397"/>
+            <a:ext cx="5828199" cy="4714994"/>
+          </a:xfrm>
+          <a:prstGeom prst="rect">
+            <a:avLst/>
+          </a:prstGeom>
+          <a:effectLst>
+            <a:outerShdw blurRad="25400" dir="17880000">
+              <a:srgbClr val="000000">
+                <a:alpha val="46000"/>
+              </a:srgbClr>
+            </a:outerShdw>
+          </a:effectLst>
+        </p:spPr>
+        <p:txBody>
+          <a:bodyPr vert="horz" lIns="91440" tIns="45720" rIns="91440" bIns="45720" rtlCol="0" anchor="t">
+            <a:normAutofit/>
+          </a:bodyPr>
+          <a:lstStyle>
+            <a:lvl1pPr algn="ctr" defTabSz="457200" rtl="0" eaLnBrk="1" latinLnBrk="0" hangingPunct="1">
+              <a:spcBef>
+                <a:spcPct val="0"/>
+              </a:spcBef>
+              <a:buNone/>
+              <a:defRPr sz="4000" kern="1200">
+                <a:ln>
+                  <a:solidFill>
+                    <a:schemeClr val="bg1">
+                      <a:lumMod val="75000"/>
+                      <a:lumOff val="25000"/>
+                      <a:alpha val="10000"/>
+                    </a:schemeClr>
+                  </a:solidFill>
+                </a:ln>
+                <a:solidFill>
+                  <a:schemeClr val="tx2"/>
+                </a:solidFill>
+                <a:effectLst>
+                  <a:outerShdw blurRad="9525" dist="25400" dir="14640000" algn="tl" rotWithShape="0">
+                    <a:schemeClr val="bg1">
+                      <a:alpha val="30000"/>
+                    </a:schemeClr>
+                  </a:outerShdw>
+                </a:effectLst>
+                <a:latin typeface="+mj-lt"/>
+                <a:ea typeface="+mj-ea"/>
+                <a:cs typeface="Trebuchet MS"/>
+              </a:defRPr>
+            </a:lvl1pPr>
+            <a:lvl2pPr eaLnBrk="1" hangingPunct="1">
+              <a:defRPr>
+                <a:solidFill>
+                  <a:schemeClr val="tx2"/>
+                </a:solidFill>
+              </a:defRPr>
+            </a:lvl2pPr>
+            <a:lvl3pPr eaLnBrk="1" hangingPunct="1">
+              <a:defRPr>
+                <a:solidFill>
+                  <a:schemeClr val="tx2"/>
+                </a:solidFill>
+              </a:defRPr>
+            </a:lvl3pPr>
+            <a:lvl4pPr eaLnBrk="1" hangingPunct="1">
+              <a:defRPr>
+                <a:solidFill>
+                  <a:schemeClr val="tx2"/>
+                </a:solidFill>
+              </a:defRPr>
+            </a:lvl4pPr>
+            <a:lvl5pPr eaLnBrk="1" hangingPunct="1">
+              <a:defRPr>
+                <a:solidFill>
+                  <a:schemeClr val="tx2"/>
+                </a:solidFill>
+              </a:defRPr>
+            </a:lvl5pPr>
+            <a:lvl6pPr eaLnBrk="1" hangingPunct="1">
+              <a:defRPr>
+                <a:solidFill>
+                  <a:schemeClr val="tx2"/>
+                </a:solidFill>
+              </a:defRPr>
+            </a:lvl6pPr>
+            <a:lvl7pPr eaLnBrk="1" hangingPunct="1">
+              <a:defRPr>
+                <a:solidFill>
+                  <a:schemeClr val="tx2"/>
+                </a:solidFill>
+              </a:defRPr>
+            </a:lvl7pPr>
+            <a:lvl8pPr eaLnBrk="1" hangingPunct="1">
+              <a:defRPr>
+                <a:solidFill>
+                  <a:schemeClr val="tx2"/>
+                </a:solidFill>
+              </a:defRPr>
+            </a:lvl8pPr>
+            <a:lvl9pPr eaLnBrk="1" hangingPunct="1">
+              <a:defRPr>
+                <a:solidFill>
+                  <a:schemeClr val="tx2"/>
+                </a:solidFill>
+              </a:defRPr>
+            </a:lvl9pPr>
+          </a:lstStyle>
+          <a:p>
+            <a:pPr algn="l"/>
+            <a:r>
+              <a:rPr lang="fr-FR" sz="2000" dirty="0" smtClean="0">
+                <a:effectLst/>
+              </a:rPr>
+              <a:t>Actions effectuées :</a:t>
+            </a:r>
+          </a:p>
+          <a:p>
+            <a:pPr algn="l"/>
+            <a:r>
+              <a:rPr lang="fr-FR" sz="2000" dirty="0" smtClean="0">
+                <a:effectLst/>
+              </a:rPr>
+              <a:t>Rotation -&gt; Calcul de l’orientation</a:t>
+            </a:r>
+          </a:p>
+          <a:p>
+            <a:pPr algn="l"/>
+            <a:r>
+              <a:rPr lang="fr-FR" sz="2000" dirty="0" smtClean="0">
+                <a:effectLst/>
+              </a:rPr>
+              <a:t>Avance/Recul -&gt; Calcul de la position </a:t>
+            </a:r>
+          </a:p>
+          <a:p>
+            <a:pPr algn="l"/>
+            <a:endParaRPr lang="fr-FR" sz="2000" dirty="0">
+              <a:effectLst/>
+            </a:endParaRPr>
+          </a:p>
+          <a:p>
+            <a:pPr algn="l"/>
+            <a:endParaRPr lang="fr-FR" sz="2000" dirty="0" smtClean="0">
+              <a:effectLst/>
+            </a:endParaRPr>
+          </a:p>
+          <a:p>
+            <a:pPr algn="l"/>
+            <a:r>
+              <a:rPr lang="fr-FR" sz="2000" dirty="0" smtClean="0">
+                <a:effectLst/>
+              </a:rPr>
+              <a:t>Repère de départ -&gt; position robot de départ</a:t>
+            </a:r>
+          </a:p>
+          <a:p>
+            <a:pPr algn="l"/>
+            <a:endParaRPr lang="fr-FR" sz="2000" dirty="0">
+              <a:effectLst/>
+            </a:endParaRPr>
+          </a:p>
+          <a:p>
+            <a:pPr algn="l"/>
+            <a:r>
+              <a:rPr lang="fr-FR" sz="2000" dirty="0" smtClean="0">
+                <a:effectLst/>
+              </a:rPr>
+              <a:t>Déplacement </a:t>
+            </a:r>
+            <a:endParaRPr lang="fr-FR" sz="2000" dirty="0">
+              <a:effectLst/>
+            </a:endParaRPr>
+          </a:p>
+          <a:p>
+            <a:pPr algn="l"/>
+            <a:endParaRPr lang="fr-FR" sz="2000" dirty="0" smtClean="0">
+              <a:effectLst/>
+            </a:endParaRPr>
+          </a:p>
+          <a:p>
+            <a:pPr algn="l"/>
+            <a:r>
+              <a:rPr lang="fr-FR" sz="2000" dirty="0">
+                <a:effectLst/>
+              </a:rPr>
+              <a:t>	</a:t>
+            </a:r>
+            <a:endParaRPr lang="fr-FR" sz="2000" dirty="0" smtClean="0">
+              <a:effectLst/>
+            </a:endParaRPr>
+          </a:p>
+        </p:txBody>
+      </p:sp>
+      <p:pic>
+        <p:nvPicPr>
+          <p:cNvPr id="26" name="Espace réservé du contenu 4"/>
+          <p:cNvPicPr>
+            <a:picLocks noChangeAspect="1"/>
+          </p:cNvPicPr>
+          <p:nvPr/>
+        </p:nvPicPr>
+        <p:blipFill>
+          <a:blip r:embed="rId2">
+            <a:extLst>
+              <a:ext uri="{28A0092B-C50C-407E-A947-70E740481C1C}">
+                <a14:useLocalDpi xmlns:a14="http://schemas.microsoft.com/office/drawing/2010/main" val="0"/>
+              </a:ext>
+            </a:extLst>
+          </a:blip>
+          <a:stretch>
+            <a:fillRect/>
+          </a:stretch>
+        </p:blipFill>
+        <p:spPr>
+          <a:xfrm rot="19698045">
+            <a:off x="10555535" y="4890408"/>
+            <a:ext cx="1091646" cy="1336174"/>
+          </a:xfrm>
+          <a:prstGeom prst="rect">
+            <a:avLst/>
+          </a:prstGeom>
+          <a:effectLst>
+            <a:outerShdw blurRad="25400" dir="17880000">
+              <a:srgbClr val="000000">
+                <a:alpha val="46000"/>
+              </a:srgbClr>
+            </a:outerShdw>
+          </a:effectLst>
+        </p:spPr>
+      </p:pic>
+      <p:pic>
+        <p:nvPicPr>
+          <p:cNvPr id="33" name="Espace réservé du contenu 4"/>
+          <p:cNvPicPr>
+            <a:picLocks noChangeAspect="1"/>
+          </p:cNvPicPr>
+          <p:nvPr/>
+        </p:nvPicPr>
+        <p:blipFill>
+          <a:blip r:embed="rId2">
+            <a:extLst>
+              <a:ext uri="{28A0092B-C50C-407E-A947-70E740481C1C}">
+                <a14:useLocalDpi xmlns:a14="http://schemas.microsoft.com/office/drawing/2010/main" val="0"/>
+              </a:ext>
+            </a:extLst>
+          </a:blip>
+          <a:stretch>
+            <a:fillRect/>
+          </a:stretch>
+        </p:blipFill>
+        <p:spPr>
+          <a:xfrm>
+            <a:off x="7893039" y="4878372"/>
+            <a:ext cx="1091646" cy="1336174"/>
+          </a:xfrm>
+          <a:prstGeom prst="rect">
+            <a:avLst/>
+          </a:prstGeom>
+          <a:effectLst>
+            <a:outerShdw blurRad="25400" dir="17880000">
+              <a:srgbClr val="000000">
+                <a:alpha val="46000"/>
+              </a:srgbClr>
+            </a:outerShdw>
+          </a:effectLst>
+        </p:spPr>
+      </p:pic>
+      <p:grpSp>
+        <p:nvGrpSpPr>
+          <p:cNvPr id="34" name="Groupe 33"/>
+          <p:cNvGrpSpPr/>
+          <p:nvPr/>
+        </p:nvGrpSpPr>
+        <p:grpSpPr>
+          <a:xfrm>
+            <a:off x="7893039" y="4629748"/>
+            <a:ext cx="586321" cy="600731"/>
+            <a:chOff x="7812726" y="4187586"/>
+            <a:chExt cx="806414" cy="768373"/>
+          </a:xfrm>
+        </p:grpSpPr>
+        <p:cxnSp>
+          <p:nvCxnSpPr>
+            <p:cNvPr id="35" name="Connecteur droit avec flèche 34"/>
+            <p:cNvCxnSpPr/>
+            <p:nvPr/>
+          </p:nvCxnSpPr>
+          <p:spPr>
+            <a:xfrm flipH="1" flipV="1">
+              <a:off x="7812726" y="4913534"/>
+              <a:ext cx="750726" cy="42425"/>
+            </a:xfrm>
+            <a:prstGeom prst="straightConnector1">
+              <a:avLst/>
+            </a:prstGeom>
+            <a:ln w="57150">
+              <a:solidFill>
+                <a:srgbClr val="7030A0"/>
+              </a:solidFill>
+              <a:tailEnd type="triangle"/>
+            </a:ln>
+          </p:spPr>
+          <p:style>
+            <a:lnRef idx="1">
+              <a:schemeClr val="accent1"/>
+            </a:lnRef>
+            <a:fillRef idx="0">
+              <a:schemeClr val="accent1"/>
+            </a:fillRef>
+            <a:effectRef idx="0">
+              <a:schemeClr val="accent1"/>
+            </a:effectRef>
+            <a:fontRef idx="minor">
+              <a:schemeClr val="tx1"/>
+            </a:fontRef>
+          </p:style>
+        </p:cxnSp>
+        <p:cxnSp>
+          <p:nvCxnSpPr>
+            <p:cNvPr id="36" name="Connecteur droit avec flèche 35"/>
+            <p:cNvCxnSpPr/>
+            <p:nvPr/>
+          </p:nvCxnSpPr>
+          <p:spPr>
+            <a:xfrm flipV="1">
+              <a:off x="8581903" y="4187586"/>
+              <a:ext cx="37237" cy="725948"/>
+            </a:xfrm>
+            <a:prstGeom prst="straightConnector1">
+              <a:avLst/>
+            </a:prstGeom>
+            <a:ln w="57150">
+              <a:solidFill>
+                <a:srgbClr val="00B0F0"/>
+              </a:solidFill>
+              <a:tailEnd type="triangle"/>
+            </a:ln>
+          </p:spPr>
+          <p:style>
+            <a:lnRef idx="1">
+              <a:schemeClr val="accent1"/>
+            </a:lnRef>
+            <a:fillRef idx="0">
+              <a:schemeClr val="accent1"/>
+            </a:fillRef>
+            <a:effectRef idx="0">
+              <a:schemeClr val="accent1"/>
+            </a:effectRef>
+            <a:fontRef idx="minor">
+              <a:schemeClr val="tx1"/>
+            </a:fontRef>
+          </p:style>
+        </p:cxnSp>
+      </p:grpSp>
+      <p:grpSp>
+        <p:nvGrpSpPr>
+          <p:cNvPr id="37" name="Groupe 36"/>
+          <p:cNvGrpSpPr/>
+          <p:nvPr/>
+        </p:nvGrpSpPr>
+        <p:grpSpPr>
+          <a:xfrm>
+            <a:off x="10369178" y="4672995"/>
+            <a:ext cx="586321" cy="600731"/>
+            <a:chOff x="7812726" y="4187586"/>
+            <a:chExt cx="806414" cy="768373"/>
+          </a:xfrm>
+        </p:grpSpPr>
+        <p:cxnSp>
+          <p:nvCxnSpPr>
+            <p:cNvPr id="38" name="Connecteur droit avec flèche 37"/>
+            <p:cNvCxnSpPr/>
+            <p:nvPr/>
+          </p:nvCxnSpPr>
+          <p:spPr>
+            <a:xfrm flipH="1" flipV="1">
+              <a:off x="7812726" y="4913534"/>
+              <a:ext cx="750726" cy="42425"/>
+            </a:xfrm>
+            <a:prstGeom prst="straightConnector1">
+              <a:avLst/>
+            </a:prstGeom>
+            <a:ln w="57150">
+              <a:solidFill>
+                <a:srgbClr val="7030A0"/>
+              </a:solidFill>
+              <a:tailEnd type="triangle"/>
+            </a:ln>
+          </p:spPr>
+          <p:style>
+            <a:lnRef idx="1">
+              <a:schemeClr val="accent1"/>
+            </a:lnRef>
+            <a:fillRef idx="0">
+              <a:schemeClr val="accent1"/>
+            </a:fillRef>
+            <a:effectRef idx="0">
+              <a:schemeClr val="accent1"/>
+            </a:effectRef>
+            <a:fontRef idx="minor">
+              <a:schemeClr val="tx1"/>
+            </a:fontRef>
+          </p:style>
+        </p:cxnSp>
+        <p:cxnSp>
+          <p:nvCxnSpPr>
+            <p:cNvPr id="39" name="Connecteur droit avec flèche 38"/>
+            <p:cNvCxnSpPr/>
+            <p:nvPr/>
+          </p:nvCxnSpPr>
+          <p:spPr>
+            <a:xfrm flipV="1">
+              <a:off x="8581903" y="4187586"/>
+              <a:ext cx="37237" cy="725948"/>
+            </a:xfrm>
+            <a:prstGeom prst="straightConnector1">
+              <a:avLst/>
+            </a:prstGeom>
+            <a:ln w="57150">
+              <a:solidFill>
+                <a:srgbClr val="00B0F0"/>
+              </a:solidFill>
+              <a:tailEnd type="triangle"/>
+            </a:ln>
+          </p:spPr>
+          <p:style>
+            <a:lnRef idx="1">
+              <a:schemeClr val="accent1"/>
+            </a:lnRef>
+            <a:fillRef idx="0">
+              <a:schemeClr val="accent1"/>
+            </a:fillRef>
+            <a:effectRef idx="0">
+              <a:schemeClr val="accent1"/>
+            </a:effectRef>
+            <a:fontRef idx="minor">
+              <a:schemeClr val="tx1"/>
+            </a:fontRef>
+          </p:style>
+        </p:cxnSp>
+      </p:grpSp>
+      <p:pic>
+        <p:nvPicPr>
+          <p:cNvPr id="41" name="Espace réservé du contenu 4"/>
+          <p:cNvPicPr>
+            <a:picLocks noChangeAspect="1"/>
+          </p:cNvPicPr>
+          <p:nvPr/>
+        </p:nvPicPr>
+        <p:blipFill>
+          <a:blip r:embed="rId2">
+            <a:extLst>
+              <a:ext uri="{28A0092B-C50C-407E-A947-70E740481C1C}">
+                <a14:useLocalDpi xmlns:a14="http://schemas.microsoft.com/office/drawing/2010/main" val="0"/>
+              </a:ext>
+            </a:extLst>
+          </a:blip>
+          <a:stretch>
+            <a:fillRect/>
+          </a:stretch>
+        </p:blipFill>
+        <p:spPr>
+          <a:xfrm rot="19698045">
+            <a:off x="9107735" y="2263274"/>
+            <a:ext cx="1091646" cy="1336174"/>
+          </a:xfrm>
+          <a:prstGeom prst="rect">
+            <a:avLst/>
+          </a:prstGeom>
+          <a:effectLst>
+            <a:outerShdw blurRad="25400" dir="17880000">
+              <a:srgbClr val="000000">
+                <a:alpha val="46000"/>
+              </a:srgbClr>
+            </a:outerShdw>
+          </a:effectLst>
+        </p:spPr>
+      </p:pic>
+      <p:sp>
+        <p:nvSpPr>
+          <p:cNvPr id="42" name="Ellipse 41"/>
+          <p:cNvSpPr/>
+          <p:nvPr/>
+        </p:nvSpPr>
+        <p:spPr>
+          <a:xfrm>
+            <a:off x="7893039" y="4708847"/>
+            <a:ext cx="1091646" cy="1154936"/>
+          </a:xfrm>
+          <a:prstGeom prst="ellipse">
+            <a:avLst/>
+          </a:prstGeom>
+          <a:noFill/>
+        </p:spPr>
+        <p:style>
+          <a:lnRef idx="2">
+            <a:schemeClr val="accent1">
+              <a:shade val="50000"/>
+            </a:schemeClr>
+          </a:lnRef>
+          <a:fillRef idx="1">
+            <a:schemeClr val="accent1"/>
+          </a:fillRef>
+          <a:effectRef idx="0">
+            <a:schemeClr val="accent1"/>
+          </a:effectRef>
+          <a:fontRef idx="minor">
+            <a:schemeClr val="lt1"/>
+          </a:fontRef>
+        </p:style>
+        <p:txBody>
+          <a:bodyPr rtlCol="0" anchor="ctr"/>
+          <a:lstStyle/>
+          <a:p>
+            <a:pPr algn="ctr"/>
+            <a:endParaRPr lang="fr-FR"/>
+          </a:p>
+        </p:txBody>
+      </p:sp>
+      <p:sp>
+        <p:nvSpPr>
+          <p:cNvPr id="44" name="Ellipse 43"/>
+          <p:cNvSpPr/>
+          <p:nvPr/>
+        </p:nvSpPr>
+        <p:spPr>
+          <a:xfrm>
+            <a:off x="10383570" y="4703266"/>
+            <a:ext cx="1091646" cy="1154936"/>
+          </a:xfrm>
+          <a:prstGeom prst="ellipse">
+            <a:avLst/>
+          </a:prstGeom>
+          <a:noFill/>
+        </p:spPr>
+        <p:style>
+          <a:lnRef idx="2">
+            <a:schemeClr val="accent1">
+              <a:shade val="50000"/>
+            </a:schemeClr>
+          </a:lnRef>
+          <a:fillRef idx="1">
+            <a:schemeClr val="accent1"/>
+          </a:fillRef>
+          <a:effectRef idx="0">
+            <a:schemeClr val="accent1"/>
+          </a:effectRef>
+          <a:fontRef idx="minor">
+            <a:schemeClr val="lt1"/>
+          </a:fontRef>
+        </p:style>
+        <p:txBody>
+          <a:bodyPr rtlCol="0" anchor="ctr"/>
+          <a:lstStyle/>
+          <a:p>
+            <a:pPr algn="ctr"/>
+            <a:endParaRPr lang="fr-FR"/>
+          </a:p>
+        </p:txBody>
+      </p:sp>
+      <p:sp>
+        <p:nvSpPr>
+          <p:cNvPr id="45" name="Arc plein 44"/>
+          <p:cNvSpPr/>
+          <p:nvPr/>
+        </p:nvSpPr>
+        <p:spPr>
+          <a:xfrm rot="16564194">
+            <a:off x="10326869" y="4788999"/>
+            <a:ext cx="1081703" cy="936282"/>
+          </a:xfrm>
+          <a:prstGeom prst="blockArc">
+            <a:avLst>
+              <a:gd name="adj1" fmla="val 19688497"/>
+              <a:gd name="adj2" fmla="val 5"/>
+              <a:gd name="adj3" fmla="val 4710"/>
+            </a:avLst>
+          </a:prstGeom>
+          <a:solidFill>
+            <a:srgbClr val="FF0000"/>
+          </a:solidFill>
+          <a:ln>
+            <a:solidFill>
+              <a:srgbClr val="FF0000"/>
+            </a:solidFill>
+          </a:ln>
+        </p:spPr>
+        <p:style>
+          <a:lnRef idx="2">
+            <a:schemeClr val="accent1">
+              <a:shade val="50000"/>
+            </a:schemeClr>
+          </a:lnRef>
+          <a:fillRef idx="1">
+            <a:schemeClr val="accent1"/>
+          </a:fillRef>
+          <a:effectRef idx="0">
+            <a:schemeClr val="accent1"/>
+          </a:effectRef>
+          <a:fontRef idx="minor">
+            <a:schemeClr val="lt1"/>
+          </a:fontRef>
+        </p:style>
+        <p:txBody>
+          <a:bodyPr rtlCol="0" anchor="ctr"/>
+          <a:lstStyle/>
+          <a:p>
+            <a:pPr algn="ctr"/>
+            <a:endParaRPr lang="fr-FR">
+              <a:solidFill>
+                <a:schemeClr val="tx1"/>
+              </a:solidFill>
+            </a:endParaRPr>
+          </a:p>
+        </p:txBody>
+      </p:sp>
+      <p:cxnSp>
+        <p:nvCxnSpPr>
+          <p:cNvPr id="47" name="Connecteur droit 46"/>
+          <p:cNvCxnSpPr>
+            <a:endCxn id="45" idx="0"/>
+          </p:cNvCxnSpPr>
+          <p:nvPr/>
+        </p:nvCxnSpPr>
+        <p:spPr>
+          <a:xfrm flipH="1" flipV="1">
+            <a:off x="10652348" y="4811393"/>
+            <a:ext cx="276077" cy="462333"/>
+          </a:xfrm>
+          <a:prstGeom prst="line">
+            <a:avLst/>
+          </a:prstGeom>
+        </p:spPr>
+        <p:style>
+          <a:lnRef idx="1">
+            <a:schemeClr val="accent1"/>
+          </a:lnRef>
+          <a:fillRef idx="0">
+            <a:schemeClr val="accent1"/>
+          </a:fillRef>
+          <a:effectRef idx="0">
+            <a:schemeClr val="accent1"/>
+          </a:effectRef>
+          <a:fontRef idx="minor">
+            <a:schemeClr val="tx1"/>
+          </a:fontRef>
+        </p:style>
+      </p:cxnSp>
+      <p:sp>
+        <p:nvSpPr>
+          <p:cNvPr id="49" name="ZoneTexte 48"/>
+          <p:cNvSpPr txBox="1"/>
+          <p:nvPr/>
+        </p:nvSpPr>
+        <p:spPr>
+          <a:xfrm>
+            <a:off x="6572708" y="5645407"/>
+            <a:ext cx="1392085" cy="738664"/>
+          </a:xfrm>
+          <a:prstGeom prst="rect">
+            <a:avLst/>
+          </a:prstGeom>
+          <a:noFill/>
+        </p:spPr>
+        <p:txBody>
+          <a:bodyPr wrap="square" rtlCol="0">
+            <a:spAutoFit/>
+          </a:bodyPr>
+          <a:lstStyle/>
+          <a:p>
+            <a:r>
+              <a:rPr lang="fr-FR" sz="1400" dirty="0" smtClean="0"/>
+              <a:t>Départ</a:t>
+            </a:r>
+          </a:p>
+          <a:p>
+            <a:r>
+              <a:rPr lang="el-GR" sz="1400" dirty="0" smtClean="0">
+                <a:latin typeface="Times New Roman" panose="02020603050405020304" pitchFamily="18" charset="0"/>
+                <a:cs typeface="Times New Roman" panose="02020603050405020304" pitchFamily="18" charset="0"/>
+              </a:rPr>
+              <a:t>α</a:t>
+            </a:r>
+            <a:r>
+              <a:rPr lang="fr-FR" sz="1400" dirty="0" smtClean="0">
+                <a:latin typeface="Times New Roman" panose="02020603050405020304" pitchFamily="18" charset="0"/>
+                <a:cs typeface="Times New Roman" panose="02020603050405020304" pitchFamily="18" charset="0"/>
+              </a:rPr>
+              <a:t>		</a:t>
+            </a:r>
+            <a:r>
+              <a:rPr lang="fr-FR" sz="1400" dirty="0" smtClean="0"/>
+              <a:t> 0°</a:t>
+            </a:r>
+          </a:p>
+          <a:p>
+            <a:r>
+              <a:rPr lang="fr-FR" sz="1400" dirty="0" smtClean="0"/>
+              <a:t>Pos 	    {0 ; 0}</a:t>
+            </a:r>
+            <a:endParaRPr lang="fr-FR" sz="1400" dirty="0"/>
+          </a:p>
+        </p:txBody>
+      </p:sp>
+      <p:sp>
+        <p:nvSpPr>
+          <p:cNvPr id="51" name="ZoneTexte 50"/>
+          <p:cNvSpPr txBox="1"/>
+          <p:nvPr/>
+        </p:nvSpPr>
+        <p:spPr>
+          <a:xfrm>
+            <a:off x="9545832" y="5716727"/>
+            <a:ext cx="1124557" cy="738664"/>
+          </a:xfrm>
+          <a:prstGeom prst="rect">
+            <a:avLst/>
+          </a:prstGeom>
+          <a:noFill/>
+        </p:spPr>
+        <p:txBody>
+          <a:bodyPr wrap="square" rtlCol="0">
+            <a:spAutoFit/>
+          </a:bodyPr>
+          <a:lstStyle/>
+          <a:p>
+            <a:r>
+              <a:rPr lang="fr-FR" sz="1400" dirty="0" smtClean="0"/>
+              <a:t>Rotation</a:t>
+            </a:r>
+          </a:p>
+          <a:p>
+            <a:r>
+              <a:rPr lang="el-GR" sz="1400" dirty="0" smtClean="0">
+                <a:latin typeface="Times New Roman" panose="02020603050405020304" pitchFamily="18" charset="0"/>
+                <a:cs typeface="Times New Roman" panose="02020603050405020304" pitchFamily="18" charset="0"/>
+              </a:rPr>
+              <a:t>α</a:t>
+            </a:r>
+            <a:r>
+              <a:rPr lang="fr-FR" sz="1400" dirty="0" smtClean="0">
+                <a:latin typeface="Times New Roman" panose="02020603050405020304" pitchFamily="18" charset="0"/>
+                <a:cs typeface="Times New Roman" panose="02020603050405020304" pitchFamily="18" charset="0"/>
+              </a:rPr>
+              <a:t>	</a:t>
+            </a:r>
+            <a:r>
+              <a:rPr lang="fr-FR" sz="1400" dirty="0" smtClean="0">
+                <a:solidFill>
+                  <a:srgbClr val="FF0000"/>
+                </a:solidFill>
+              </a:rPr>
+              <a:t> 45°</a:t>
+            </a:r>
+          </a:p>
+          <a:p>
+            <a:r>
+              <a:rPr lang="fr-FR" sz="1400" dirty="0" smtClean="0"/>
+              <a:t>Pos   {0 ; 0}</a:t>
+            </a:r>
+            <a:endParaRPr lang="fr-FR" sz="1400" dirty="0"/>
+          </a:p>
+        </p:txBody>
+      </p:sp>
+    </p:spTree>
+    <p:extLst>
+      <p:ext uri="{BB962C8B-B14F-4D97-AF65-F5344CB8AC3E}">
+        <p14:creationId xmlns:p14="http://schemas.microsoft.com/office/powerpoint/2010/main" val="1552532595"/>
+      </p:ext>
+    </p:extLst>
+  </p:cSld>
+  <p:clrMapOvr>
+    <a:masterClrMapping/>
+  </p:clrMapOvr>
+</p:sld>
+</file>
+
+<file path=ppt/slides/slide8.xml><?xml version="1.0" encoding="utf-8"?>
+<p:sld xmlns:a="http://schemas.openxmlformats.org/drawingml/2006/main" xmlns:r="http://schemas.openxmlformats.org/officeDocument/2006/relationships" xmlns:p="http://schemas.openxmlformats.org/presentationml/2006/main">
+  <p:cSld>
+    <p:spTree>
+      <p:nvGrpSpPr>
+        <p:cNvPr id="1" name=""/>
+        <p:cNvGrpSpPr/>
+        <p:nvPr/>
+      </p:nvGrpSpPr>
+      <p:grpSpPr>
+        <a:xfrm>
+          <a:off x="0" y="0"/>
+          <a:ext cx="0" cy="0"/>
+          <a:chOff x="0" y="0"/>
+          <a:chExt cx="0" cy="0"/>
+        </a:xfrm>
+      </p:grpSpPr>
+      <p:sp>
+        <p:nvSpPr>
+          <p:cNvPr id="2" name="Titre 1"/>
+          <p:cNvSpPr>
+            <a:spLocks noGrp="1"/>
+          </p:cNvSpPr>
+          <p:nvPr>
+            <p:ph type="title"/>
+          </p:nvPr>
+        </p:nvSpPr>
+        <p:spPr/>
+        <p:txBody>
+          <a:bodyPr/>
+          <a:lstStyle/>
+          <a:p>
+            <a:pPr algn="l"/>
+            <a:r>
+              <a:rPr lang="fr-FR" dirty="0" smtClean="0"/>
+              <a:t>Odométrie - Position des obstacles</a:t>
+            </a:r>
+            <a:endParaRPr lang="fr-FR" dirty="0"/>
+          </a:p>
+        </p:txBody>
+      </p:sp>
+      <p:sp>
+        <p:nvSpPr>
+          <p:cNvPr id="8" name="Ellipse 7"/>
+          <p:cNvSpPr/>
+          <p:nvPr/>
+        </p:nvSpPr>
+        <p:spPr>
+          <a:xfrm>
+            <a:off x="8419085" y="2400801"/>
+            <a:ext cx="641445" cy="617700"/>
+          </a:xfrm>
+          <a:prstGeom prst="ellipse">
+            <a:avLst/>
+          </a:prstGeom>
+        </p:spPr>
+        <p:style>
+          <a:lnRef idx="2">
+            <a:schemeClr val="accent1">
+              <a:shade val="50000"/>
+            </a:schemeClr>
+          </a:lnRef>
+          <a:fillRef idx="1">
+            <a:schemeClr val="accent1"/>
+          </a:fillRef>
+          <a:effectRef idx="0">
+            <a:schemeClr val="accent1"/>
+          </a:effectRef>
+          <a:fontRef idx="minor">
+            <a:schemeClr val="lt1"/>
+          </a:fontRef>
+        </p:style>
+        <p:txBody>
+          <a:bodyPr rtlCol="0" anchor="ctr"/>
+          <a:lstStyle/>
+          <a:p>
+            <a:pPr algn="ctr"/>
+            <a:endParaRPr lang="fr-FR"/>
+          </a:p>
+        </p:txBody>
+      </p:sp>
+      <p:grpSp>
+        <p:nvGrpSpPr>
+          <p:cNvPr id="5" name="Groupe 4"/>
+          <p:cNvGrpSpPr/>
+          <p:nvPr/>
+        </p:nvGrpSpPr>
+        <p:grpSpPr>
+          <a:xfrm>
+            <a:off x="8783358" y="5152330"/>
+            <a:ext cx="507476" cy="642656"/>
+            <a:chOff x="6985234" y="4027155"/>
+            <a:chExt cx="507476" cy="642656"/>
+          </a:xfrm>
+        </p:grpSpPr>
+        <p:cxnSp>
+          <p:nvCxnSpPr>
+            <p:cNvPr id="6" name="Connecteur droit avec flèche 5"/>
+            <p:cNvCxnSpPr/>
+            <p:nvPr/>
+          </p:nvCxnSpPr>
+          <p:spPr>
+            <a:xfrm flipV="1">
+              <a:off x="7492709" y="4027155"/>
+              <a:ext cx="1" cy="613085"/>
+            </a:xfrm>
+            <a:prstGeom prst="straightConnector1">
+              <a:avLst/>
+            </a:prstGeom>
+            <a:ln w="57150">
+              <a:solidFill>
+                <a:srgbClr val="7030A0"/>
+              </a:solidFill>
+              <a:tailEnd type="triangle"/>
+            </a:ln>
+          </p:spPr>
+          <p:style>
+            <a:lnRef idx="1">
+              <a:schemeClr val="accent1"/>
+            </a:lnRef>
+            <a:fillRef idx="0">
+              <a:schemeClr val="accent1"/>
+            </a:fillRef>
+            <a:effectRef idx="0">
+              <a:schemeClr val="accent1"/>
+            </a:effectRef>
+            <a:fontRef idx="minor">
+              <a:schemeClr val="tx1"/>
+            </a:fontRef>
+          </p:style>
+        </p:cxnSp>
+        <p:cxnSp>
+          <p:nvCxnSpPr>
+            <p:cNvPr id="7" name="Connecteur droit avec flèche 6"/>
+            <p:cNvCxnSpPr/>
+            <p:nvPr/>
+          </p:nvCxnSpPr>
+          <p:spPr>
+            <a:xfrm flipH="1" flipV="1">
+              <a:off x="6985234" y="4665570"/>
+              <a:ext cx="507476" cy="4241"/>
+            </a:xfrm>
+            <a:prstGeom prst="straightConnector1">
+              <a:avLst/>
+            </a:prstGeom>
+            <a:ln w="57150">
+              <a:solidFill>
+                <a:srgbClr val="00B0F0"/>
+              </a:solidFill>
+              <a:tailEnd type="triangle"/>
+            </a:ln>
+          </p:spPr>
+          <p:style>
+            <a:lnRef idx="1">
+              <a:schemeClr val="accent1"/>
+            </a:lnRef>
+            <a:fillRef idx="0">
+              <a:schemeClr val="accent1"/>
+            </a:fillRef>
+            <a:effectRef idx="0">
+              <a:schemeClr val="accent1"/>
+            </a:effectRef>
+            <a:fontRef idx="minor">
+              <a:schemeClr val="tx1"/>
+            </a:fontRef>
+          </p:style>
+        </p:cxnSp>
+      </p:grpSp>
+      <p:pic>
+        <p:nvPicPr>
+          <p:cNvPr id="4" name="Espace réservé du contenu 4"/>
+          <p:cNvPicPr>
+            <a:picLocks noChangeAspect="1"/>
+          </p:cNvPicPr>
+          <p:nvPr/>
+        </p:nvPicPr>
+        <p:blipFill>
+          <a:blip r:embed="rId2">
+            <a:extLst>
+              <a:ext uri="{28A0092B-C50C-407E-A947-70E740481C1C}">
+                <a14:useLocalDpi xmlns:a14="http://schemas.microsoft.com/office/drawing/2010/main" val="0"/>
+              </a:ext>
+            </a:extLst>
+          </a:blip>
+          <a:stretch>
+            <a:fillRect/>
+          </a:stretch>
+        </p:blipFill>
+        <p:spPr>
+          <a:xfrm rot="19089525">
+            <a:off x="10239397" y="4428587"/>
+            <a:ext cx="1091646" cy="1336174"/>
+          </a:xfrm>
+          <a:prstGeom prst="rect">
+            <a:avLst/>
+          </a:prstGeom>
+          <a:effectLst>
+            <a:outerShdw blurRad="25400" dir="17880000">
+              <a:srgbClr val="000000">
+                <a:alpha val="46000"/>
+              </a:srgbClr>
+            </a:outerShdw>
+          </a:effectLst>
+        </p:spPr>
+      </p:pic>
+      <p:cxnSp>
+        <p:nvCxnSpPr>
+          <p:cNvPr id="10" name="Connecteur droit 9"/>
+          <p:cNvCxnSpPr>
+            <a:endCxn id="8" idx="5"/>
+          </p:cNvCxnSpPr>
+          <p:nvPr/>
+        </p:nvCxnSpPr>
+        <p:spPr>
+          <a:xfrm flipH="1" flipV="1">
+            <a:off x="8966593" y="2928041"/>
+            <a:ext cx="1606883" cy="1910978"/>
+          </a:xfrm>
+          <a:prstGeom prst="line">
+            <a:avLst/>
+          </a:prstGeom>
+          <a:ln w="28575">
+            <a:solidFill>
+              <a:srgbClr val="FF0000"/>
+            </a:solidFill>
+            <a:prstDash val="dashDot"/>
+          </a:ln>
+        </p:spPr>
+        <p:style>
+          <a:lnRef idx="1">
+            <a:schemeClr val="accent1"/>
+          </a:lnRef>
+          <a:fillRef idx="0">
+            <a:schemeClr val="accent1"/>
+          </a:fillRef>
+          <a:effectRef idx="0">
+            <a:schemeClr val="accent1"/>
+          </a:effectRef>
+          <a:fontRef idx="minor">
+            <a:schemeClr val="tx1"/>
+          </a:fontRef>
+        </p:style>
+      </p:cxnSp>
+      <p:cxnSp>
+        <p:nvCxnSpPr>
+          <p:cNvPr id="16" name="Connecteur droit avec flèche 15"/>
+          <p:cNvCxnSpPr/>
+          <p:nvPr/>
+        </p:nvCxnSpPr>
+        <p:spPr>
+          <a:xfrm flipV="1">
+            <a:off x="10590679" y="4339987"/>
+            <a:ext cx="1" cy="502612"/>
+          </a:xfrm>
+          <a:prstGeom prst="straightConnector1">
+            <a:avLst/>
+          </a:prstGeom>
+          <a:ln w="57150">
+            <a:solidFill>
+              <a:srgbClr val="7030A0"/>
+            </a:solidFill>
+            <a:tailEnd type="triangle"/>
+          </a:ln>
+        </p:spPr>
+        <p:style>
+          <a:lnRef idx="1">
+            <a:schemeClr val="accent1"/>
+          </a:lnRef>
+          <a:fillRef idx="0">
+            <a:schemeClr val="accent1"/>
+          </a:fillRef>
+          <a:effectRef idx="0">
+            <a:schemeClr val="accent1"/>
+          </a:effectRef>
+          <a:fontRef idx="minor">
+            <a:schemeClr val="tx1"/>
+          </a:fontRef>
+        </p:style>
+      </p:cxnSp>
+      <p:cxnSp>
+        <p:nvCxnSpPr>
+          <p:cNvPr id="17" name="Connecteur droit avec flèche 16"/>
+          <p:cNvCxnSpPr/>
+          <p:nvPr/>
+        </p:nvCxnSpPr>
+        <p:spPr>
+          <a:xfrm flipH="1" flipV="1">
+            <a:off x="10126656" y="4867928"/>
+            <a:ext cx="464025" cy="4241"/>
+          </a:xfrm>
+          <a:prstGeom prst="straightConnector1">
+            <a:avLst/>
+          </a:prstGeom>
+          <a:ln w="57150">
+            <a:solidFill>
+              <a:srgbClr val="00B0F0"/>
+            </a:solidFill>
+            <a:tailEnd type="triangle"/>
+          </a:ln>
+        </p:spPr>
+        <p:style>
+          <a:lnRef idx="1">
+            <a:schemeClr val="accent1"/>
+          </a:lnRef>
+          <a:fillRef idx="0">
+            <a:schemeClr val="accent1"/>
+          </a:fillRef>
+          <a:effectRef idx="0">
+            <a:schemeClr val="accent1"/>
+          </a:effectRef>
+          <a:fontRef idx="minor">
+            <a:schemeClr val="tx1"/>
+          </a:fontRef>
+        </p:style>
+      </p:cxnSp>
+      <p:sp>
+        <p:nvSpPr>
+          <p:cNvPr id="23" name="ZoneTexte 22"/>
+          <p:cNvSpPr txBox="1"/>
+          <p:nvPr/>
+        </p:nvSpPr>
+        <p:spPr>
+          <a:xfrm>
+            <a:off x="9235871" y="5845648"/>
+            <a:ext cx="470405" cy="307777"/>
+          </a:xfrm>
+          <a:prstGeom prst="rect">
+            <a:avLst/>
+          </a:prstGeom>
+          <a:noFill/>
+        </p:spPr>
+        <p:txBody>
+          <a:bodyPr wrap="square" rtlCol="0">
+            <a:spAutoFit/>
+          </a:bodyPr>
+          <a:lstStyle/>
+          <a:p>
+            <a:r>
+              <a:rPr lang="fr-FR" sz="1400" dirty="0" smtClean="0"/>
+              <a:t>R0</a:t>
+            </a:r>
+            <a:endParaRPr lang="fr-FR" sz="1400" dirty="0"/>
+          </a:p>
+        </p:txBody>
+      </p:sp>
+      <p:sp>
+        <p:nvSpPr>
+          <p:cNvPr id="24" name="ZoneTexte 23"/>
+          <p:cNvSpPr txBox="1"/>
+          <p:nvPr/>
+        </p:nvSpPr>
+        <p:spPr>
+          <a:xfrm>
+            <a:off x="11016232" y="4685130"/>
+            <a:ext cx="461831" cy="307777"/>
+          </a:xfrm>
+          <a:prstGeom prst="rect">
+            <a:avLst/>
+          </a:prstGeom>
+          <a:noFill/>
+        </p:spPr>
+        <p:txBody>
+          <a:bodyPr wrap="square" rtlCol="0">
+            <a:spAutoFit/>
+          </a:bodyPr>
+          <a:lstStyle/>
+          <a:p>
+            <a:r>
+              <a:rPr lang="fr-FR" sz="1400" dirty="0" smtClean="0"/>
+              <a:t>R0’</a:t>
+            </a:r>
+            <a:endParaRPr lang="fr-FR" sz="1400" dirty="0"/>
+          </a:p>
+        </p:txBody>
+      </p:sp>
+      <p:sp>
+        <p:nvSpPr>
+          <p:cNvPr id="25" name="Titre 1"/>
+          <p:cNvSpPr txBox="1">
+            <a:spLocks/>
+          </p:cNvSpPr>
+          <p:nvPr/>
+        </p:nvSpPr>
+        <p:spPr>
+          <a:xfrm>
+            <a:off x="913795" y="1740397"/>
+            <a:ext cx="5828199" cy="4714994"/>
+          </a:xfrm>
+          <a:prstGeom prst="rect">
+            <a:avLst/>
+          </a:prstGeom>
+          <a:effectLst>
+            <a:outerShdw blurRad="25400" dir="17880000">
+              <a:srgbClr val="000000">
+                <a:alpha val="46000"/>
+              </a:srgbClr>
+            </a:outerShdw>
+          </a:effectLst>
+        </p:spPr>
+        <p:txBody>
+          <a:bodyPr vert="horz" lIns="91440" tIns="45720" rIns="91440" bIns="45720" rtlCol="0" anchor="t">
+            <a:normAutofit/>
+          </a:bodyPr>
+          <a:lstStyle>
+            <a:lvl1pPr algn="ctr" defTabSz="457200" rtl="0" eaLnBrk="1" latinLnBrk="0" hangingPunct="1">
+              <a:spcBef>
+                <a:spcPct val="0"/>
+              </a:spcBef>
+              <a:buNone/>
+              <a:defRPr sz="4000" kern="1200">
+                <a:ln>
+                  <a:solidFill>
+                    <a:schemeClr val="bg1">
+                      <a:lumMod val="75000"/>
+                      <a:lumOff val="25000"/>
+                      <a:alpha val="10000"/>
+                    </a:schemeClr>
+                  </a:solidFill>
+                </a:ln>
+                <a:solidFill>
+                  <a:schemeClr val="tx2"/>
+                </a:solidFill>
+                <a:effectLst>
+                  <a:outerShdw blurRad="9525" dist="25400" dir="14640000" algn="tl" rotWithShape="0">
+                    <a:schemeClr val="bg1">
+                      <a:alpha val="30000"/>
+                    </a:schemeClr>
+                  </a:outerShdw>
+                </a:effectLst>
+                <a:latin typeface="+mj-lt"/>
+                <a:ea typeface="+mj-ea"/>
+                <a:cs typeface="Trebuchet MS"/>
+              </a:defRPr>
+            </a:lvl1pPr>
+            <a:lvl2pPr eaLnBrk="1" hangingPunct="1">
+              <a:defRPr>
+                <a:solidFill>
+                  <a:schemeClr val="tx2"/>
+                </a:solidFill>
+              </a:defRPr>
+            </a:lvl2pPr>
+            <a:lvl3pPr eaLnBrk="1" hangingPunct="1">
+              <a:defRPr>
+                <a:solidFill>
+                  <a:schemeClr val="tx2"/>
+                </a:solidFill>
+              </a:defRPr>
+            </a:lvl3pPr>
+            <a:lvl4pPr eaLnBrk="1" hangingPunct="1">
+              <a:defRPr>
+                <a:solidFill>
+                  <a:schemeClr val="tx2"/>
+                </a:solidFill>
+              </a:defRPr>
+            </a:lvl4pPr>
+            <a:lvl5pPr eaLnBrk="1" hangingPunct="1">
+              <a:defRPr>
+                <a:solidFill>
+                  <a:schemeClr val="tx2"/>
+                </a:solidFill>
+              </a:defRPr>
+            </a:lvl5pPr>
+            <a:lvl6pPr eaLnBrk="1" hangingPunct="1">
+              <a:defRPr>
+                <a:solidFill>
+                  <a:schemeClr val="tx2"/>
+                </a:solidFill>
+              </a:defRPr>
+            </a:lvl6pPr>
+            <a:lvl7pPr eaLnBrk="1" hangingPunct="1">
+              <a:defRPr>
+                <a:solidFill>
+                  <a:schemeClr val="tx2"/>
+                </a:solidFill>
+              </a:defRPr>
+            </a:lvl7pPr>
+            <a:lvl8pPr eaLnBrk="1" hangingPunct="1">
+              <a:defRPr>
+                <a:solidFill>
+                  <a:schemeClr val="tx2"/>
+                </a:solidFill>
+              </a:defRPr>
+            </a:lvl8pPr>
+            <a:lvl9pPr eaLnBrk="1" hangingPunct="1">
+              <a:defRPr>
+                <a:solidFill>
+                  <a:schemeClr val="tx2"/>
+                </a:solidFill>
+              </a:defRPr>
+            </a:lvl9pPr>
+          </a:lstStyle>
+          <a:p>
+            <a:pPr algn="l"/>
+            <a:endParaRPr lang="fr-FR" sz="2000" dirty="0" smtClean="0">
+              <a:effectLst/>
+            </a:endParaRPr>
+          </a:p>
+          <a:p>
+            <a:pPr algn="l"/>
+            <a:r>
+              <a:rPr lang="fr-FR" sz="2000" dirty="0">
+                <a:effectLst/>
+              </a:rPr>
+              <a:t>	</a:t>
+            </a:r>
+            <a:endParaRPr lang="fr-FR" sz="2000" dirty="0" smtClean="0">
+              <a:effectLst/>
+            </a:endParaRPr>
+          </a:p>
+        </p:txBody>
+      </p:sp>
+      <p:sp>
+        <p:nvSpPr>
+          <p:cNvPr id="26" name="Titre 1"/>
+          <p:cNvSpPr txBox="1">
+            <a:spLocks/>
+          </p:cNvSpPr>
+          <p:nvPr/>
+        </p:nvSpPr>
+        <p:spPr>
+          <a:xfrm>
+            <a:off x="1066195" y="1892797"/>
+            <a:ext cx="5828199" cy="3758209"/>
+          </a:xfrm>
+          <a:prstGeom prst="rect">
+            <a:avLst/>
+          </a:prstGeom>
+          <a:effectLst>
+            <a:outerShdw blurRad="25400" dir="17880000">
+              <a:srgbClr val="000000">
+                <a:alpha val="46000"/>
+              </a:srgbClr>
+            </a:outerShdw>
+          </a:effectLst>
+        </p:spPr>
+        <p:txBody>
+          <a:bodyPr vert="horz" lIns="91440" tIns="45720" rIns="91440" bIns="45720" rtlCol="0" anchor="t">
+            <a:normAutofit/>
+          </a:bodyPr>
+          <a:lstStyle>
+            <a:lvl1pPr algn="ctr" defTabSz="457200" rtl="0" eaLnBrk="1" latinLnBrk="0" hangingPunct="1">
+              <a:spcBef>
+                <a:spcPct val="0"/>
+              </a:spcBef>
+              <a:buNone/>
+              <a:defRPr sz="4000" kern="1200">
+                <a:ln>
+                  <a:solidFill>
+                    <a:schemeClr val="bg1">
+                      <a:lumMod val="75000"/>
+                      <a:lumOff val="25000"/>
+                      <a:alpha val="10000"/>
+                    </a:schemeClr>
+                  </a:solidFill>
+                </a:ln>
+                <a:solidFill>
+                  <a:schemeClr val="tx2"/>
+                </a:solidFill>
+                <a:effectLst>
+                  <a:outerShdw blurRad="9525" dist="25400" dir="14640000" algn="tl" rotWithShape="0">
+                    <a:schemeClr val="bg1">
+                      <a:alpha val="30000"/>
+                    </a:schemeClr>
+                  </a:outerShdw>
+                </a:effectLst>
+                <a:latin typeface="+mj-lt"/>
+                <a:ea typeface="+mj-ea"/>
+                <a:cs typeface="Trebuchet MS"/>
+              </a:defRPr>
+            </a:lvl1pPr>
+            <a:lvl2pPr eaLnBrk="1" hangingPunct="1">
+              <a:defRPr>
+                <a:solidFill>
+                  <a:schemeClr val="tx2"/>
+                </a:solidFill>
+              </a:defRPr>
+            </a:lvl2pPr>
+            <a:lvl3pPr eaLnBrk="1" hangingPunct="1">
+              <a:defRPr>
+                <a:solidFill>
+                  <a:schemeClr val="tx2"/>
+                </a:solidFill>
+              </a:defRPr>
+            </a:lvl3pPr>
+            <a:lvl4pPr eaLnBrk="1" hangingPunct="1">
+              <a:defRPr>
+                <a:solidFill>
+                  <a:schemeClr val="tx2"/>
+                </a:solidFill>
+              </a:defRPr>
+            </a:lvl4pPr>
+            <a:lvl5pPr eaLnBrk="1" hangingPunct="1">
+              <a:defRPr>
+                <a:solidFill>
+                  <a:schemeClr val="tx2"/>
+                </a:solidFill>
+              </a:defRPr>
+            </a:lvl5pPr>
+            <a:lvl6pPr eaLnBrk="1" hangingPunct="1">
+              <a:defRPr>
+                <a:solidFill>
+                  <a:schemeClr val="tx2"/>
+                </a:solidFill>
+              </a:defRPr>
+            </a:lvl6pPr>
+            <a:lvl7pPr eaLnBrk="1" hangingPunct="1">
+              <a:defRPr>
+                <a:solidFill>
+                  <a:schemeClr val="tx2"/>
+                </a:solidFill>
+              </a:defRPr>
+            </a:lvl7pPr>
+            <a:lvl8pPr eaLnBrk="1" hangingPunct="1">
+              <a:defRPr>
+                <a:solidFill>
+                  <a:schemeClr val="tx2"/>
+                </a:solidFill>
+              </a:defRPr>
+            </a:lvl8pPr>
+            <a:lvl9pPr eaLnBrk="1" hangingPunct="1">
+              <a:defRPr>
+                <a:solidFill>
+                  <a:schemeClr val="tx2"/>
+                </a:solidFill>
+              </a:defRPr>
+            </a:lvl9pPr>
+          </a:lstStyle>
+          <a:p>
+            <a:pPr algn="l"/>
+            <a:r>
+              <a:rPr lang="fr-FR" sz="2000" dirty="0" smtClean="0">
+                <a:effectLst/>
+              </a:rPr>
+              <a:t>Balayage successif des points d’un obstacles</a:t>
+            </a:r>
+          </a:p>
+          <a:p>
+            <a:pPr algn="l"/>
+            <a:r>
+              <a:rPr lang="fr-FR" sz="2000" dirty="0">
+                <a:effectLst/>
+              </a:rPr>
+              <a:t>	</a:t>
+            </a:r>
+          </a:p>
+          <a:p>
+            <a:pPr algn="l"/>
+            <a:r>
+              <a:rPr lang="fr-FR" sz="2000" dirty="0" smtClean="0">
+                <a:effectLst/>
+              </a:rPr>
+              <a:t>Calcul de la position d’un point d’un obstacle</a:t>
+            </a:r>
+          </a:p>
+          <a:p>
+            <a:r>
+              <a:rPr lang="fr-FR" sz="2000" dirty="0">
+                <a:effectLst/>
+              </a:rPr>
+              <a:t>	</a:t>
+            </a:r>
+            <a:endParaRPr lang="fr-FR" sz="2000" dirty="0" smtClean="0">
+              <a:effectLst/>
+            </a:endParaRPr>
+          </a:p>
+          <a:p>
+            <a:r>
+              <a:rPr lang="fr-FR" sz="2000" dirty="0" err="1" smtClean="0">
+                <a:effectLst/>
+              </a:rPr>
+              <a:t>posObj</a:t>
+            </a:r>
+            <a:r>
+              <a:rPr lang="fr-FR" sz="2000" dirty="0" smtClean="0">
+                <a:effectLst/>
+              </a:rPr>
+              <a:t> X = </a:t>
+            </a:r>
+            <a:r>
+              <a:rPr lang="fr-FR" sz="2000" dirty="0" err="1" smtClean="0">
+                <a:effectLst/>
+              </a:rPr>
+              <a:t>Xr</a:t>
+            </a:r>
+            <a:r>
+              <a:rPr lang="fr-FR" sz="2000" dirty="0" smtClean="0">
+                <a:effectLst/>
+              </a:rPr>
+              <a:t> + ( d x sin (</a:t>
+            </a:r>
+            <a:r>
+              <a:rPr lang="el-GR" sz="2000" dirty="0" smtClean="0">
+                <a:latin typeface="Times New Roman" panose="02020603050405020304" pitchFamily="18" charset="0"/>
+                <a:cs typeface="Times New Roman" panose="02020603050405020304" pitchFamily="18" charset="0"/>
+              </a:rPr>
+              <a:t>α</a:t>
+            </a:r>
+            <a:r>
+              <a:rPr lang="fr-FR" sz="2000" dirty="0" smtClean="0">
+                <a:latin typeface="Times New Roman" panose="02020603050405020304" pitchFamily="18" charset="0"/>
+                <a:cs typeface="Times New Roman" panose="02020603050405020304" pitchFamily="18" charset="0"/>
+              </a:rPr>
+              <a:t>)) </a:t>
+            </a:r>
+            <a:endParaRPr lang="fr-FR" sz="2000" dirty="0" smtClean="0">
+              <a:cs typeface="Times New Roman" panose="02020603050405020304" pitchFamily="18" charset="0"/>
+            </a:endParaRPr>
+          </a:p>
+          <a:p>
+            <a:endParaRPr lang="fr-FR" sz="2000" dirty="0">
+              <a:effectLst/>
+            </a:endParaRPr>
+          </a:p>
+          <a:p>
+            <a:r>
+              <a:rPr lang="fr-FR" sz="2000" dirty="0" err="1" smtClean="0">
+                <a:effectLst/>
+              </a:rPr>
+              <a:t>posObj</a:t>
+            </a:r>
+            <a:r>
+              <a:rPr lang="fr-FR" sz="2000" dirty="0" smtClean="0">
+                <a:effectLst/>
+              </a:rPr>
+              <a:t> Y = </a:t>
+            </a:r>
+            <a:r>
+              <a:rPr lang="fr-FR" sz="2000" dirty="0" err="1" smtClean="0">
+                <a:effectLst/>
+              </a:rPr>
+              <a:t>Yr</a:t>
+            </a:r>
+            <a:r>
+              <a:rPr lang="fr-FR" sz="2000" dirty="0" smtClean="0">
+                <a:effectLst/>
+              </a:rPr>
+              <a:t> + ( d x cos</a:t>
+            </a:r>
+            <a:r>
+              <a:rPr lang="fr-FR" sz="2000" dirty="0">
+                <a:effectLst/>
+              </a:rPr>
+              <a:t> (</a:t>
+            </a:r>
+            <a:r>
+              <a:rPr lang="el-GR" sz="2000" dirty="0">
+                <a:latin typeface="Times New Roman" panose="02020603050405020304" pitchFamily="18" charset="0"/>
+                <a:cs typeface="Times New Roman" panose="02020603050405020304" pitchFamily="18" charset="0"/>
+              </a:rPr>
+              <a:t>α</a:t>
+            </a:r>
+            <a:r>
+              <a:rPr lang="fr-FR" sz="2000" dirty="0" smtClean="0">
+                <a:latin typeface="Times New Roman" panose="02020603050405020304" pitchFamily="18" charset="0"/>
+                <a:cs typeface="Times New Roman" panose="02020603050405020304" pitchFamily="18" charset="0"/>
+              </a:rPr>
+              <a:t>))</a:t>
+            </a:r>
+          </a:p>
+          <a:p>
+            <a:endParaRPr lang="fr-FR" sz="2000" dirty="0">
+              <a:effectLst/>
+              <a:latin typeface="Times New Roman" panose="02020603050405020304" pitchFamily="18" charset="0"/>
+              <a:cs typeface="Times New Roman" panose="02020603050405020304" pitchFamily="18" charset="0"/>
+            </a:endParaRPr>
+          </a:p>
+          <a:p>
+            <a:pPr algn="l"/>
+            <a:r>
+              <a:rPr lang="fr-FR" sz="1400" dirty="0">
+                <a:effectLst/>
+              </a:rPr>
+              <a:t>Position du robot 		 </a:t>
+            </a:r>
+            <a:r>
+              <a:rPr lang="fr-FR" sz="1400" dirty="0" err="1">
+                <a:effectLst/>
+              </a:rPr>
+              <a:t>posRob</a:t>
+            </a:r>
+            <a:r>
+              <a:rPr lang="fr-FR" sz="1400" dirty="0">
+                <a:effectLst/>
+              </a:rPr>
+              <a:t>{ </a:t>
+            </a:r>
+            <a:r>
+              <a:rPr lang="fr-FR" sz="1400" dirty="0" err="1">
+                <a:effectLst/>
+              </a:rPr>
+              <a:t>Xr</a:t>
+            </a:r>
+            <a:r>
+              <a:rPr lang="fr-FR" sz="1400" dirty="0">
+                <a:effectLst/>
+              </a:rPr>
+              <a:t> ; </a:t>
+            </a:r>
+            <a:r>
+              <a:rPr lang="fr-FR" sz="1400" dirty="0" err="1">
+                <a:effectLst/>
+              </a:rPr>
+              <a:t>Yr</a:t>
+            </a:r>
+            <a:r>
+              <a:rPr lang="fr-FR" sz="1400" dirty="0">
+                <a:effectLst/>
+              </a:rPr>
+              <a:t> }</a:t>
+            </a:r>
+          </a:p>
+          <a:p>
+            <a:pPr algn="l"/>
+            <a:r>
+              <a:rPr lang="fr-FR" sz="1400" dirty="0">
+                <a:effectLst/>
+              </a:rPr>
+              <a:t>Orientation du robot 	 </a:t>
+            </a:r>
+            <a:r>
+              <a:rPr lang="el-GR" sz="1400" dirty="0">
+                <a:latin typeface="Times New Roman" panose="02020603050405020304" pitchFamily="18" charset="0"/>
+                <a:cs typeface="Times New Roman" panose="02020603050405020304" pitchFamily="18" charset="0"/>
+              </a:rPr>
+              <a:t>α</a:t>
+            </a:r>
+            <a:endParaRPr lang="fr-FR" sz="1400" dirty="0">
+              <a:effectLst/>
+            </a:endParaRPr>
+          </a:p>
+          <a:p>
+            <a:pPr algn="l"/>
+            <a:r>
+              <a:rPr lang="fr-FR" sz="1400" dirty="0">
+                <a:effectLst/>
+              </a:rPr>
+              <a:t>Distance infra-rouge  	 d </a:t>
+            </a:r>
+            <a:endParaRPr lang="fr-FR" sz="1400" dirty="0" smtClean="0">
+              <a:effectLst/>
+            </a:endParaRPr>
+          </a:p>
+          <a:p>
+            <a:pPr algn="l"/>
+            <a:r>
+              <a:rPr lang="fr-FR" sz="1400" dirty="0" smtClean="0">
+                <a:effectLst/>
+              </a:rPr>
+              <a:t>Repère de base		 R0</a:t>
+            </a:r>
+            <a:endParaRPr lang="fr-FR" sz="2000" dirty="0">
+              <a:effectLst/>
+            </a:endParaRPr>
+          </a:p>
+          <a:p>
+            <a:pPr algn="l"/>
+            <a:r>
+              <a:rPr lang="fr-FR" sz="1400" dirty="0" smtClean="0">
+                <a:effectLst/>
+              </a:rPr>
+              <a:t>Repère projeté de R0	 R0’</a:t>
+            </a:r>
+            <a:endParaRPr lang="fr-FR" sz="1400" dirty="0">
+              <a:effectLst/>
+            </a:endParaRPr>
+          </a:p>
+        </p:txBody>
+      </p:sp>
+      <p:sp>
+        <p:nvSpPr>
+          <p:cNvPr id="28" name="ZoneTexte 27"/>
+          <p:cNvSpPr txBox="1"/>
+          <p:nvPr/>
+        </p:nvSpPr>
+        <p:spPr>
+          <a:xfrm>
+            <a:off x="8880885" y="1991352"/>
+            <a:ext cx="1692591" cy="307777"/>
+          </a:xfrm>
+          <a:prstGeom prst="rect">
+            <a:avLst/>
+          </a:prstGeom>
+          <a:noFill/>
+        </p:spPr>
+        <p:txBody>
+          <a:bodyPr wrap="square" rtlCol="0">
+            <a:spAutoFit/>
+          </a:bodyPr>
+          <a:lstStyle/>
+          <a:p>
+            <a:r>
+              <a:rPr lang="fr-FR" sz="1400" dirty="0" err="1" smtClean="0"/>
+              <a:t>posObj</a:t>
+            </a:r>
+            <a:r>
+              <a:rPr lang="fr-FR" sz="1400" dirty="0" smtClean="0"/>
+              <a:t> { ? ; ? }</a:t>
+            </a:r>
+            <a:endParaRPr lang="fr-FR" sz="1400" dirty="0"/>
+          </a:p>
+        </p:txBody>
+      </p:sp>
+      <p:sp>
+        <p:nvSpPr>
+          <p:cNvPr id="29" name="ZoneTexte 28"/>
+          <p:cNvSpPr txBox="1"/>
+          <p:nvPr/>
+        </p:nvSpPr>
+        <p:spPr>
+          <a:xfrm>
+            <a:off x="10345192" y="5690744"/>
+            <a:ext cx="1342081" cy="276999"/>
+          </a:xfrm>
+          <a:prstGeom prst="rect">
+            <a:avLst/>
+          </a:prstGeom>
+          <a:noFill/>
+        </p:spPr>
+        <p:txBody>
+          <a:bodyPr wrap="square" rtlCol="0">
+            <a:spAutoFit/>
+          </a:bodyPr>
+          <a:lstStyle/>
+          <a:p>
+            <a:r>
+              <a:rPr lang="fr-FR" sz="1200" dirty="0" err="1" smtClean="0"/>
+              <a:t>posRob</a:t>
+            </a:r>
+            <a:r>
+              <a:rPr lang="fr-FR" sz="1200" dirty="0" smtClean="0"/>
+              <a:t> {-50; 20 }</a:t>
+            </a:r>
+            <a:endParaRPr lang="fr-FR" sz="1200" dirty="0"/>
+          </a:p>
+        </p:txBody>
+      </p:sp>
+      <p:sp>
+        <p:nvSpPr>
+          <p:cNvPr id="35" name="Arc plein 34"/>
+          <p:cNvSpPr/>
+          <p:nvPr/>
+        </p:nvSpPr>
+        <p:spPr>
+          <a:xfrm rot="20712329">
+            <a:off x="10190278" y="4343732"/>
+            <a:ext cx="652273" cy="654275"/>
+          </a:xfrm>
+          <a:prstGeom prst="blockArc">
+            <a:avLst>
+              <a:gd name="adj1" fmla="val 14197834"/>
+              <a:gd name="adj2" fmla="val 17793518"/>
+              <a:gd name="adj3" fmla="val 2085"/>
+            </a:avLst>
+          </a:prstGeom>
+          <a:noFill/>
+          <a:ln w="3175"/>
+        </p:spPr>
+        <p:style>
+          <a:lnRef idx="2">
+            <a:schemeClr val="accent1">
+              <a:shade val="50000"/>
+            </a:schemeClr>
+          </a:lnRef>
+          <a:fillRef idx="1">
+            <a:schemeClr val="accent1"/>
+          </a:fillRef>
+          <a:effectRef idx="0">
+            <a:schemeClr val="accent1"/>
+          </a:effectRef>
+          <a:fontRef idx="minor">
+            <a:schemeClr val="lt1"/>
+          </a:fontRef>
+        </p:style>
+        <p:txBody>
+          <a:bodyPr rtlCol="0" anchor="ctr"/>
+          <a:lstStyle/>
+          <a:p>
+            <a:pPr algn="ctr"/>
+            <a:endParaRPr lang="fr-FR">
+              <a:solidFill>
+                <a:schemeClr val="tx1"/>
+              </a:solidFill>
+            </a:endParaRPr>
+          </a:p>
+        </p:txBody>
+      </p:sp>
+      <p:sp>
+        <p:nvSpPr>
+          <p:cNvPr id="36" name="ZoneTexte 35"/>
+          <p:cNvSpPr txBox="1"/>
+          <p:nvPr/>
+        </p:nvSpPr>
+        <p:spPr>
+          <a:xfrm>
+            <a:off x="9219302" y="3698864"/>
+            <a:ext cx="327546" cy="369332"/>
+          </a:xfrm>
+          <a:prstGeom prst="rect">
+            <a:avLst/>
+          </a:prstGeom>
+          <a:noFill/>
+        </p:spPr>
+        <p:txBody>
+          <a:bodyPr wrap="square" rtlCol="0">
+            <a:spAutoFit/>
+          </a:bodyPr>
+          <a:lstStyle/>
+          <a:p>
+            <a:r>
+              <a:rPr lang="fr-FR" dirty="0" smtClean="0"/>
+              <a:t>d</a:t>
+            </a:r>
+            <a:endParaRPr lang="fr-FR" dirty="0"/>
+          </a:p>
+        </p:txBody>
+      </p:sp>
+      <p:sp>
+        <p:nvSpPr>
+          <p:cNvPr id="37" name="ZoneTexte 36"/>
+          <p:cNvSpPr txBox="1"/>
+          <p:nvPr/>
+        </p:nvSpPr>
+        <p:spPr>
+          <a:xfrm>
+            <a:off x="10238445" y="4049419"/>
+            <a:ext cx="327546" cy="369332"/>
+          </a:xfrm>
+          <a:prstGeom prst="rect">
+            <a:avLst/>
+          </a:prstGeom>
+          <a:noFill/>
+        </p:spPr>
+        <p:txBody>
+          <a:bodyPr wrap="square" rtlCol="0">
+            <a:spAutoFit/>
+          </a:bodyPr>
+          <a:lstStyle/>
+          <a:p>
+            <a:r>
+              <a:rPr lang="el-GR" dirty="0" smtClean="0">
+                <a:latin typeface="Times New Roman" panose="02020603050405020304" pitchFamily="18" charset="0"/>
+                <a:cs typeface="Times New Roman" panose="02020603050405020304" pitchFamily="18" charset="0"/>
+              </a:rPr>
+              <a:t>α</a:t>
+            </a:r>
+            <a:endParaRPr lang="fr-FR" dirty="0"/>
+          </a:p>
+        </p:txBody>
+      </p:sp>
+      <p:cxnSp>
+        <p:nvCxnSpPr>
+          <p:cNvPr id="39" name="Connecteur droit 38"/>
+          <p:cNvCxnSpPr>
+            <a:stCxn id="4" idx="0"/>
+          </p:cNvCxnSpPr>
+          <p:nvPr/>
+        </p:nvCxnSpPr>
+        <p:spPr>
+          <a:xfrm flipH="1" flipV="1">
+            <a:off x="9041472" y="2744293"/>
+            <a:ext cx="1298088" cy="1854659"/>
+          </a:xfrm>
+          <a:prstGeom prst="line">
+            <a:avLst/>
+          </a:prstGeom>
+          <a:ln w="28575">
+            <a:solidFill>
+              <a:srgbClr val="FF0000"/>
+            </a:solidFill>
+            <a:prstDash val="dashDot"/>
+          </a:ln>
+        </p:spPr>
+        <p:style>
+          <a:lnRef idx="1">
+            <a:schemeClr val="accent1"/>
+          </a:lnRef>
+          <a:fillRef idx="0">
+            <a:schemeClr val="accent1"/>
+          </a:fillRef>
+          <a:effectRef idx="0">
+            <a:schemeClr val="accent1"/>
+          </a:effectRef>
+          <a:fontRef idx="minor">
+            <a:schemeClr val="tx1"/>
+          </a:fontRef>
+        </p:style>
+      </p:cxnSp>
+      <p:cxnSp>
+        <p:nvCxnSpPr>
+          <p:cNvPr id="42" name="Connecteur droit 41"/>
+          <p:cNvCxnSpPr>
+            <a:stCxn id="4" idx="0"/>
+          </p:cNvCxnSpPr>
+          <p:nvPr/>
+        </p:nvCxnSpPr>
+        <p:spPr>
+          <a:xfrm flipH="1" flipV="1">
+            <a:off x="8783358" y="2973107"/>
+            <a:ext cx="1556202" cy="1625845"/>
+          </a:xfrm>
+          <a:prstGeom prst="line">
+            <a:avLst/>
+          </a:prstGeom>
+          <a:ln w="28575">
+            <a:solidFill>
+              <a:srgbClr val="FF0000"/>
+            </a:solidFill>
+            <a:prstDash val="dashDot"/>
+          </a:ln>
+        </p:spPr>
+        <p:style>
+          <a:lnRef idx="1">
+            <a:schemeClr val="accent1"/>
+          </a:lnRef>
+          <a:fillRef idx="0">
+            <a:schemeClr val="accent1"/>
+          </a:fillRef>
+          <a:effectRef idx="0">
+            <a:schemeClr val="accent1"/>
+          </a:effectRef>
+          <a:fontRef idx="minor">
+            <a:schemeClr val="tx1"/>
+          </a:fontRef>
+        </p:style>
+      </p:cxnSp>
+      <p:sp>
+        <p:nvSpPr>
+          <p:cNvPr id="44" name="ZoneTexte 43"/>
+          <p:cNvSpPr txBox="1"/>
+          <p:nvPr/>
+        </p:nvSpPr>
+        <p:spPr>
+          <a:xfrm>
+            <a:off x="8467049" y="5651006"/>
+            <a:ext cx="340619" cy="338554"/>
+          </a:xfrm>
+          <a:prstGeom prst="rect">
+            <a:avLst/>
+          </a:prstGeom>
+          <a:noFill/>
+        </p:spPr>
+        <p:txBody>
+          <a:bodyPr wrap="square" rtlCol="0">
+            <a:spAutoFit/>
+          </a:bodyPr>
+          <a:lstStyle/>
+          <a:p>
+            <a:r>
+              <a:rPr lang="fr-FR" sz="1600" b="1" dirty="0" smtClean="0">
+                <a:solidFill>
+                  <a:srgbClr val="0070C0"/>
+                </a:solidFill>
+              </a:rPr>
+              <a:t>X</a:t>
+            </a:r>
+            <a:endParaRPr lang="fr-FR" sz="1600" b="1" dirty="0">
+              <a:solidFill>
+                <a:srgbClr val="0070C0"/>
+              </a:solidFill>
+            </a:endParaRPr>
+          </a:p>
+        </p:txBody>
+      </p:sp>
+      <p:sp>
+        <p:nvSpPr>
+          <p:cNvPr id="45" name="ZoneTexte 44"/>
+          <p:cNvSpPr txBox="1"/>
+          <p:nvPr/>
+        </p:nvSpPr>
+        <p:spPr>
+          <a:xfrm>
+            <a:off x="9109139" y="4754923"/>
+            <a:ext cx="340619" cy="338554"/>
+          </a:xfrm>
+          <a:prstGeom prst="rect">
+            <a:avLst/>
+          </a:prstGeom>
+          <a:noFill/>
+        </p:spPr>
+        <p:txBody>
+          <a:bodyPr wrap="square" rtlCol="0">
+            <a:spAutoFit/>
+          </a:bodyPr>
+          <a:lstStyle/>
+          <a:p>
+            <a:r>
+              <a:rPr lang="fr-FR" sz="1600" b="1" dirty="0" smtClean="0">
+                <a:solidFill>
+                  <a:srgbClr val="7030A0"/>
+                </a:solidFill>
+              </a:rPr>
+              <a:t>Y</a:t>
+            </a:r>
+            <a:endParaRPr lang="fr-FR" sz="1600" b="1" dirty="0">
+              <a:solidFill>
+                <a:srgbClr val="7030A0"/>
+              </a:solidFill>
+            </a:endParaRPr>
+          </a:p>
+        </p:txBody>
+      </p:sp>
+    </p:spTree>
+    <p:extLst>
+      <p:ext uri="{BB962C8B-B14F-4D97-AF65-F5344CB8AC3E}">
+        <p14:creationId xmlns:p14="http://schemas.microsoft.com/office/powerpoint/2010/main" val="1964165358"/>
+      </p:ext>
+    </p:extLst>
+  </p:cSld>
+  <p:clrMapOvr>
+    <a:masterClrMapping/>
+  </p:clrMapOvr>
+</p:sld>
+</file>
+
+<file path=ppt/slides/slide9.xml><?xml version="1.0" encoding="utf-8"?>
+<p:sld xmlns:a="http://schemas.openxmlformats.org/drawingml/2006/main" xmlns:r="http://schemas.openxmlformats.org/officeDocument/2006/relationships" xmlns:p="http://schemas.openxmlformats.org/presentationml/2006/main">
+  <p:cSld>
+    <p:spTree>
+      <p:nvGrpSpPr>
+        <p:cNvPr id="1" name=""/>
+        <p:cNvGrpSpPr/>
+        <p:nvPr/>
+      </p:nvGrpSpPr>
+      <p:grpSpPr>
+        <a:xfrm>
+          <a:off x="0" y="0"/>
+          <a:ext cx="0" cy="0"/>
+          <a:chOff x="0" y="0"/>
+          <a:chExt cx="0" cy="0"/>
+        </a:xfrm>
+      </p:grpSpPr>
+      <p:sp>
+        <p:nvSpPr>
           <p:cNvPr id="2" name="Titre 1"/>
           <p:cNvSpPr>
             <a:spLocks noGrp="1"/>
@@ -15548,13 +19752,7 @@
               <a:rPr lang="fr-FR" dirty="0" smtClean="0">
                 <a:sym typeface="Wingdings" panose="05000000000000000000" pitchFamily="2" charset="2"/>
               </a:rPr>
-              <a:t>Nécessité de </a:t>
-            </a:r>
-            <a:r>
-              <a:rPr lang="fr-FR" dirty="0" smtClean="0">
-                <a:sym typeface="Wingdings" panose="05000000000000000000" pitchFamily="2" charset="2"/>
-              </a:rPr>
-              <a:t>faire un étalonnage</a:t>
+              <a:t>Nécessité de faire un étalonnage</a:t>
             </a:r>
             <a:endParaRPr lang="fr-FR" dirty="0"/>
           </a:p>
@@ -15731,195 +19929,6 @@
     <p:extLst>
       <p:ext uri="{BB962C8B-B14F-4D97-AF65-F5344CB8AC3E}">
         <p14:creationId xmlns:p14="http://schemas.microsoft.com/office/powerpoint/2010/main" val="307979065"/>
-      </p:ext>
-    </p:extLst>
-  </p:cSld>
-  <p:clrMapOvr>
-    <a:masterClrMapping/>
-  </p:clrMapOvr>
-  <p:timing>
-    <p:tnLst>
-      <p:par>
-        <p:cTn id="1" dur="indefinite" restart="never" nodeType="tmRoot"/>
-      </p:par>
-    </p:tnLst>
-  </p:timing>
-</p:sld>
-</file>
-
-<file path=ppt/slides/slide8.xml><?xml version="1.0" encoding="utf-8"?>
-<p:sld xmlns:a="http://schemas.openxmlformats.org/drawingml/2006/main" xmlns:r="http://schemas.openxmlformats.org/officeDocument/2006/relationships" xmlns:p="http://schemas.openxmlformats.org/presentationml/2006/main">
-  <p:cSld>
-    <p:spTree>
-      <p:nvGrpSpPr>
-        <p:cNvPr id="1" name=""/>
-        <p:cNvGrpSpPr/>
-        <p:nvPr/>
-      </p:nvGrpSpPr>
-      <p:grpSpPr>
-        <a:xfrm>
-          <a:off x="0" y="0"/>
-          <a:ext cx="0" cy="0"/>
-          <a:chOff x="0" y="0"/>
-          <a:chExt cx="0" cy="0"/>
-        </a:xfrm>
-      </p:grpSpPr>
-      <p:sp>
-        <p:nvSpPr>
-          <p:cNvPr id="2" name="Titre 1"/>
-          <p:cNvSpPr>
-            <a:spLocks noGrp="1"/>
-          </p:cNvSpPr>
-          <p:nvPr>
-            <p:ph type="title"/>
-          </p:nvPr>
-        </p:nvSpPr>
-        <p:spPr/>
-        <p:txBody>
-          <a:bodyPr/>
-          <a:lstStyle/>
-          <a:p>
-            <a:pPr algn="l"/>
-            <a:r>
-              <a:rPr lang="fr-FR" dirty="0" smtClean="0"/>
-              <a:t>Le robot – Le capteur</a:t>
-            </a:r>
-            <a:endParaRPr lang="fr-FR" dirty="0"/>
-          </a:p>
-        </p:txBody>
-      </p:sp>
-      <p:pic>
-        <p:nvPicPr>
-          <p:cNvPr id="3" name="Image 2"/>
-          <p:cNvPicPr>
-            <a:picLocks noChangeAspect="1"/>
-          </p:cNvPicPr>
-          <p:nvPr/>
-        </p:nvPicPr>
-        <p:blipFill>
-          <a:blip r:embed="rId2"/>
-          <a:stretch>
-            <a:fillRect/>
-          </a:stretch>
-        </p:blipFill>
-        <p:spPr>
-          <a:xfrm>
-            <a:off x="185492" y="1468182"/>
-            <a:ext cx="11804739" cy="5209524"/>
-          </a:xfrm>
-          <a:prstGeom prst="rect">
-            <a:avLst/>
-          </a:prstGeom>
-          <a:ln w="38100" cap="sq">
-            <a:solidFill>
-              <a:srgbClr val="000000"/>
-            </a:solidFill>
-            <a:prstDash val="solid"/>
-            <a:miter lim="800000"/>
-          </a:ln>
-          <a:effectLst>
-            <a:outerShdw blurRad="50800" dist="38100" dir="2700000" algn="tl" rotWithShape="0">
-              <a:srgbClr val="000000">
-                <a:alpha val="43000"/>
-              </a:srgbClr>
-            </a:outerShdw>
-          </a:effectLst>
-        </p:spPr>
-      </p:pic>
-    </p:spTree>
-    <p:extLst>
-      <p:ext uri="{BB962C8B-B14F-4D97-AF65-F5344CB8AC3E}">
-        <p14:creationId xmlns:p14="http://schemas.microsoft.com/office/powerpoint/2010/main" val="3312832204"/>
-      </p:ext>
-    </p:extLst>
-  </p:cSld>
-  <p:clrMapOvr>
-    <a:masterClrMapping/>
-  </p:clrMapOvr>
-  <p:timing>
-    <p:tnLst>
-      <p:par>
-        <p:cTn id="1" dur="indefinite" restart="never" nodeType="tmRoot"/>
-      </p:par>
-    </p:tnLst>
-  </p:timing>
-</p:sld>
-</file>
-
-<file path=ppt/slides/slide9.xml><?xml version="1.0" encoding="utf-8"?>
-<p:sld xmlns:a="http://schemas.openxmlformats.org/drawingml/2006/main" xmlns:r="http://schemas.openxmlformats.org/officeDocument/2006/relationships" xmlns:p="http://schemas.openxmlformats.org/presentationml/2006/main">
-  <p:cSld>
-    <p:spTree>
-      <p:nvGrpSpPr>
-        <p:cNvPr id="1" name=""/>
-        <p:cNvGrpSpPr/>
-        <p:nvPr/>
-      </p:nvGrpSpPr>
-      <p:grpSpPr>
-        <a:xfrm>
-          <a:off x="0" y="0"/>
-          <a:ext cx="0" cy="0"/>
-          <a:chOff x="0" y="0"/>
-          <a:chExt cx="0" cy="0"/>
-        </a:xfrm>
-      </p:grpSpPr>
-      <p:sp>
-        <p:nvSpPr>
-          <p:cNvPr id="2" name="Titre 1"/>
-          <p:cNvSpPr>
-            <a:spLocks noGrp="1"/>
-          </p:cNvSpPr>
-          <p:nvPr>
-            <p:ph type="title"/>
-          </p:nvPr>
-        </p:nvSpPr>
-        <p:spPr/>
-        <p:txBody>
-          <a:bodyPr/>
-          <a:lstStyle/>
-          <a:p>
-            <a:pPr algn="l"/>
-            <a:r>
-              <a:rPr lang="fr-FR" dirty="0" smtClean="0"/>
-              <a:t>Algorithme</a:t>
-            </a:r>
-            <a:endParaRPr lang="fr-FR" dirty="0"/>
-          </a:p>
-        </p:txBody>
-      </p:sp>
-      <p:sp>
-        <p:nvSpPr>
-          <p:cNvPr id="3" name="Espace réservé du contenu 2"/>
-          <p:cNvSpPr>
-            <a:spLocks noGrp="1"/>
-          </p:cNvSpPr>
-          <p:nvPr>
-            <p:ph idx="1"/>
-          </p:nvPr>
-        </p:nvSpPr>
-        <p:spPr/>
-        <p:txBody>
-          <a:bodyPr/>
-          <a:lstStyle/>
-          <a:p>
-            <a:r>
-              <a:rPr lang="fr-FR" dirty="0" smtClean="0"/>
-              <a:t>Algorithme de la main gauche</a:t>
-            </a:r>
-          </a:p>
-          <a:p>
-            <a:r>
-              <a:rPr lang="fr-FR" dirty="0" smtClean="0"/>
-              <a:t>Machine à état</a:t>
-            </a:r>
-            <a:endParaRPr lang="fr-FR" dirty="0"/>
-          </a:p>
-        </p:txBody>
-      </p:sp>
-    </p:spTree>
-    <p:extLst>
-      <p:ext uri="{BB962C8B-B14F-4D97-AF65-F5344CB8AC3E}">
-        <p14:creationId xmlns:p14="http://schemas.microsoft.com/office/powerpoint/2010/main" val="2836795985"/>
       </p:ext>
     </p:extLst>
   </p:cSld>

</xml_diff>

<commit_message>
Maj pp re odometrie
</commit_message>
<xml_diff>
--- a/Gestion projet/Projet intégration robotique – IMERIR.pptx
+++ b/Gestion projet/Projet intégration robotique – IMERIR.pptx
@@ -21,7 +21,7 @@
     <p:sldId id="283" r:id="rId15"/>
     <p:sldId id="287" r:id="rId16"/>
     <p:sldId id="288" r:id="rId17"/>
-    <p:sldId id="289" r:id="rId18"/>
+    <p:sldId id="291" r:id="rId18"/>
     <p:sldId id="284" r:id="rId19"/>
     <p:sldId id="261" r:id="rId20"/>
     <p:sldId id="285" r:id="rId21"/>
@@ -2993,1084 +2993,6 @@
       <dsp:cNvGrpSpPr/>
     </dsp:nvGrpSpPr>
     <dsp:grpSpPr/>
-    <dsp:sp modelId="{C690D0CD-7211-42BB-BA22-C909A7CA1954}">
-      <dsp:nvSpPr>
-        <dsp:cNvPr id="0" name=""/>
-        <dsp:cNvSpPr/>
-      </dsp:nvSpPr>
-      <dsp:spPr>
-        <a:xfrm>
-          <a:off x="5077836" y="1676507"/>
-          <a:ext cx="3984630" cy="592315"/>
-        </a:xfrm>
-        <a:custGeom>
-          <a:avLst/>
-          <a:gdLst/>
-          <a:ahLst/>
-          <a:cxnLst/>
-          <a:rect l="0" t="0" r="0" b="0"/>
-          <a:pathLst>
-            <a:path>
-              <a:moveTo>
-                <a:pt x="0" y="0"/>
-              </a:moveTo>
-              <a:lnTo>
-                <a:pt x="0" y="353111"/>
-              </a:lnTo>
-              <a:lnTo>
-                <a:pt x="3984630" y="353111"/>
-              </a:lnTo>
-              <a:lnTo>
-                <a:pt x="3984630" y="592315"/>
-              </a:lnTo>
-            </a:path>
-          </a:pathLst>
-        </a:custGeom>
-        <a:noFill/>
-        <a:ln w="9525" cap="rnd" cmpd="sng" algn="ctr">
-          <a:solidFill>
-            <a:schemeClr val="accent1">
-              <a:shade val="60000"/>
-              <a:hueOff val="0"/>
-              <a:satOff val="0"/>
-              <a:lumOff val="0"/>
-              <a:alphaOff val="0"/>
-            </a:schemeClr>
-          </a:solidFill>
-          <a:prstDash val="solid"/>
-        </a:ln>
-        <a:effectLst/>
-      </dsp:spPr>
-      <dsp:style>
-        <a:lnRef idx="1">
-          <a:scrgbClr r="0" g="0" b="0"/>
-        </a:lnRef>
-        <a:fillRef idx="0">
-          <a:scrgbClr r="0" g="0" b="0"/>
-        </a:fillRef>
-        <a:effectRef idx="0">
-          <a:scrgbClr r="0" g="0" b="0"/>
-        </a:effectRef>
-        <a:fontRef idx="minor"/>
-      </dsp:style>
-    </dsp:sp>
-    <dsp:sp modelId="{4A968BB4-BA07-4A5B-A53B-F2957ABC86FB}">
-      <dsp:nvSpPr>
-        <dsp:cNvPr id="0" name=""/>
-        <dsp:cNvSpPr/>
-      </dsp:nvSpPr>
-      <dsp:spPr>
-        <a:xfrm>
-          <a:off x="5077836" y="1676507"/>
-          <a:ext cx="1328210" cy="592315"/>
-        </a:xfrm>
-        <a:custGeom>
-          <a:avLst/>
-          <a:gdLst/>
-          <a:ahLst/>
-          <a:cxnLst/>
-          <a:rect l="0" t="0" r="0" b="0"/>
-          <a:pathLst>
-            <a:path>
-              <a:moveTo>
-                <a:pt x="0" y="0"/>
-              </a:moveTo>
-              <a:lnTo>
-                <a:pt x="0" y="353111"/>
-              </a:lnTo>
-              <a:lnTo>
-                <a:pt x="1328210" y="353111"/>
-              </a:lnTo>
-              <a:lnTo>
-                <a:pt x="1328210" y="592315"/>
-              </a:lnTo>
-            </a:path>
-          </a:pathLst>
-        </a:custGeom>
-        <a:noFill/>
-        <a:ln w="9525" cap="rnd" cmpd="sng" algn="ctr">
-          <a:solidFill>
-            <a:schemeClr val="accent1">
-              <a:shade val="60000"/>
-              <a:hueOff val="0"/>
-              <a:satOff val="0"/>
-              <a:lumOff val="0"/>
-              <a:alphaOff val="0"/>
-            </a:schemeClr>
-          </a:solidFill>
-          <a:prstDash val="solid"/>
-        </a:ln>
-        <a:effectLst/>
-      </dsp:spPr>
-      <dsp:style>
-        <a:lnRef idx="1">
-          <a:scrgbClr r="0" g="0" b="0"/>
-        </a:lnRef>
-        <a:fillRef idx="0">
-          <a:scrgbClr r="0" g="0" b="0"/>
-        </a:fillRef>
-        <a:effectRef idx="0">
-          <a:scrgbClr r="0" g="0" b="0"/>
-        </a:effectRef>
-        <a:fontRef idx="minor"/>
-      </dsp:style>
-    </dsp:sp>
-    <dsp:sp modelId="{31D35D76-771E-4FDE-BA75-EC484194EBC2}">
-      <dsp:nvSpPr>
-        <dsp:cNvPr id="0" name=""/>
-        <dsp:cNvSpPr/>
-      </dsp:nvSpPr>
-      <dsp:spPr>
-        <a:xfrm>
-          <a:off x="3749626" y="1676507"/>
-          <a:ext cx="1328210" cy="592315"/>
-        </a:xfrm>
-        <a:custGeom>
-          <a:avLst/>
-          <a:gdLst/>
-          <a:ahLst/>
-          <a:cxnLst/>
-          <a:rect l="0" t="0" r="0" b="0"/>
-          <a:pathLst>
-            <a:path>
-              <a:moveTo>
-                <a:pt x="1328210" y="0"/>
-              </a:moveTo>
-              <a:lnTo>
-                <a:pt x="1328210" y="353111"/>
-              </a:lnTo>
-              <a:lnTo>
-                <a:pt x="0" y="353111"/>
-              </a:lnTo>
-              <a:lnTo>
-                <a:pt x="0" y="592315"/>
-              </a:lnTo>
-            </a:path>
-          </a:pathLst>
-        </a:custGeom>
-        <a:noFill/>
-        <a:ln w="9525" cap="rnd" cmpd="sng" algn="ctr">
-          <a:solidFill>
-            <a:schemeClr val="accent1">
-              <a:shade val="60000"/>
-              <a:hueOff val="0"/>
-              <a:satOff val="0"/>
-              <a:lumOff val="0"/>
-              <a:alphaOff val="0"/>
-            </a:schemeClr>
-          </a:solidFill>
-          <a:prstDash val="solid"/>
-        </a:ln>
-        <a:effectLst/>
-      </dsp:spPr>
-      <dsp:style>
-        <a:lnRef idx="1">
-          <a:scrgbClr r="0" g="0" b="0"/>
-        </a:lnRef>
-        <a:fillRef idx="0">
-          <a:scrgbClr r="0" g="0" b="0"/>
-        </a:fillRef>
-        <a:effectRef idx="0">
-          <a:scrgbClr r="0" g="0" b="0"/>
-        </a:effectRef>
-        <a:fontRef idx="minor"/>
-      </dsp:style>
-    </dsp:sp>
-    <dsp:sp modelId="{095703D4-98CA-460D-B2F6-CA110B625919}">
-      <dsp:nvSpPr>
-        <dsp:cNvPr id="0" name=""/>
-        <dsp:cNvSpPr/>
-      </dsp:nvSpPr>
-      <dsp:spPr>
-        <a:xfrm>
-          <a:off x="1093206" y="1676507"/>
-          <a:ext cx="3984630" cy="592315"/>
-        </a:xfrm>
-        <a:custGeom>
-          <a:avLst/>
-          <a:gdLst/>
-          <a:ahLst/>
-          <a:cxnLst/>
-          <a:rect l="0" t="0" r="0" b="0"/>
-          <a:pathLst>
-            <a:path>
-              <a:moveTo>
-                <a:pt x="3984630" y="0"/>
-              </a:moveTo>
-              <a:lnTo>
-                <a:pt x="3984630" y="353111"/>
-              </a:lnTo>
-              <a:lnTo>
-                <a:pt x="0" y="353111"/>
-              </a:lnTo>
-              <a:lnTo>
-                <a:pt x="0" y="592315"/>
-              </a:lnTo>
-            </a:path>
-          </a:pathLst>
-        </a:custGeom>
-        <a:noFill/>
-        <a:ln w="9525" cap="rnd" cmpd="sng" algn="ctr">
-          <a:solidFill>
-            <a:schemeClr val="accent1">
-              <a:shade val="60000"/>
-              <a:hueOff val="0"/>
-              <a:satOff val="0"/>
-              <a:lumOff val="0"/>
-              <a:alphaOff val="0"/>
-            </a:schemeClr>
-          </a:solidFill>
-          <a:prstDash val="solid"/>
-        </a:ln>
-        <a:effectLst/>
-      </dsp:spPr>
-      <dsp:style>
-        <a:lnRef idx="1">
-          <a:scrgbClr r="0" g="0" b="0"/>
-        </a:lnRef>
-        <a:fillRef idx="0">
-          <a:scrgbClr r="0" g="0" b="0"/>
-        </a:fillRef>
-        <a:effectRef idx="0">
-          <a:scrgbClr r="0" g="0" b="0"/>
-        </a:effectRef>
-        <a:fontRef idx="minor"/>
-      </dsp:style>
-    </dsp:sp>
-    <dsp:sp modelId="{153DF482-9B63-4F22-A2E6-E0985D657AE7}">
-      <dsp:nvSpPr>
-        <dsp:cNvPr id="0" name=""/>
-        <dsp:cNvSpPr/>
-      </dsp:nvSpPr>
-      <dsp:spPr>
-        <a:xfrm>
-          <a:off x="4087831" y="651345"/>
-          <a:ext cx="1980010" cy="1025161"/>
-        </a:xfrm>
-        <a:prstGeom prst="rect">
-          <a:avLst/>
-        </a:prstGeom>
-        <a:gradFill rotWithShape="0">
-          <a:gsLst>
-            <a:gs pos="0">
-              <a:schemeClr val="accent1">
-                <a:hueOff val="0"/>
-                <a:satOff val="0"/>
-                <a:lumOff val="0"/>
-                <a:alphaOff val="0"/>
-                <a:tint val="96000"/>
-                <a:lumMod val="104000"/>
-              </a:schemeClr>
-            </a:gs>
-            <a:gs pos="100000">
-              <a:schemeClr val="accent1">
-                <a:hueOff val="0"/>
-                <a:satOff val="0"/>
-                <a:lumOff val="0"/>
-                <a:alphaOff val="0"/>
-                <a:shade val="90000"/>
-                <a:lumMod val="90000"/>
-              </a:schemeClr>
-            </a:gs>
-          </a:gsLst>
-          <a:lin ang="5400000" scaled="0"/>
-        </a:gradFill>
-        <a:ln>
-          <a:noFill/>
-        </a:ln>
-        <a:effectLst>
-          <a:outerShdw blurRad="63500" dist="25400" dir="5400000" rotWithShape="0">
-            <a:srgbClr val="000000">
-              <a:alpha val="60000"/>
-            </a:srgbClr>
-          </a:outerShdw>
-        </a:effectLst>
-      </dsp:spPr>
-      <dsp:style>
-        <a:lnRef idx="0">
-          <a:scrgbClr r="0" g="0" b="0"/>
-        </a:lnRef>
-        <a:fillRef idx="3">
-          <a:scrgbClr r="0" g="0" b="0"/>
-        </a:fillRef>
-        <a:effectRef idx="2">
-          <a:scrgbClr r="0" g="0" b="0"/>
-        </a:effectRef>
-        <a:fontRef idx="minor">
-          <a:schemeClr val="lt1"/>
-        </a:fontRef>
-      </dsp:style>
-      <dsp:txBody>
-        <a:bodyPr spcFirstLastPara="0" vert="horz" wrap="square" lIns="13970" tIns="13970" rIns="13970" bIns="144662" numCol="1" spcCol="1270" anchor="ctr" anchorCtr="0">
-          <a:noAutofit/>
-        </a:bodyPr>
-        <a:lstStyle/>
-        <a:p>
-          <a:pPr lvl="0" algn="ctr" defTabSz="977900">
-            <a:lnSpc>
-              <a:spcPct val="90000"/>
-            </a:lnSpc>
-            <a:spcBef>
-              <a:spcPct val="0"/>
-            </a:spcBef>
-            <a:spcAft>
-              <a:spcPct val="35000"/>
-            </a:spcAft>
-          </a:pPr>
-          <a:r>
-            <a:rPr lang="fr-FR" sz="2200" kern="1200"/>
-            <a:t>Chef de Projet</a:t>
-          </a:r>
-        </a:p>
-      </dsp:txBody>
-      <dsp:txXfrm>
-        <a:off x="4087831" y="651345"/>
-        <a:ext cx="1980010" cy="1025161"/>
-      </dsp:txXfrm>
-    </dsp:sp>
-    <dsp:sp modelId="{113EA813-3BA6-403B-BFBC-C6C029177D40}">
-      <dsp:nvSpPr>
-        <dsp:cNvPr id="0" name=""/>
-        <dsp:cNvSpPr/>
-      </dsp:nvSpPr>
-      <dsp:spPr>
-        <a:xfrm>
-          <a:off x="4483833" y="1448693"/>
-          <a:ext cx="1782009" cy="341720"/>
-        </a:xfrm>
-        <a:prstGeom prst="rect">
-          <a:avLst/>
-        </a:prstGeom>
-        <a:solidFill>
-          <a:schemeClr val="lt1">
-            <a:alpha val="90000"/>
-            <a:hueOff val="0"/>
-            <a:satOff val="0"/>
-            <a:lumOff val="0"/>
-            <a:alphaOff val="0"/>
-          </a:schemeClr>
-        </a:solidFill>
-        <a:ln w="9525" cap="rnd" cmpd="sng" algn="ctr">
-          <a:solidFill>
-            <a:schemeClr val="accent1">
-              <a:hueOff val="0"/>
-              <a:satOff val="0"/>
-              <a:lumOff val="0"/>
-              <a:alphaOff val="0"/>
-            </a:schemeClr>
-          </a:solidFill>
-          <a:prstDash val="solid"/>
-        </a:ln>
-        <a:effectLst/>
-      </dsp:spPr>
-      <dsp:style>
-        <a:lnRef idx="1">
-          <a:scrgbClr r="0" g="0" b="0"/>
-        </a:lnRef>
-        <a:fillRef idx="1">
-          <a:scrgbClr r="0" g="0" b="0"/>
-        </a:fillRef>
-        <a:effectRef idx="0">
-          <a:scrgbClr r="0" g="0" b="0"/>
-        </a:effectRef>
-        <a:fontRef idx="minor"/>
-      </dsp:style>
-      <dsp:txBody>
-        <a:bodyPr spcFirstLastPara="0" vert="horz" wrap="square" lIns="38100" tIns="9525" rIns="38100" bIns="9525" numCol="1" spcCol="1270" anchor="ctr" anchorCtr="0">
-          <a:noAutofit/>
-        </a:bodyPr>
-        <a:lstStyle/>
-        <a:p>
-          <a:pPr lvl="0" algn="r" defTabSz="666750">
-            <a:lnSpc>
-              <a:spcPct val="90000"/>
-            </a:lnSpc>
-            <a:spcBef>
-              <a:spcPct val="0"/>
-            </a:spcBef>
-            <a:spcAft>
-              <a:spcPct val="35000"/>
-            </a:spcAft>
-          </a:pPr>
-          <a:r>
-            <a:rPr lang="fr-FR" sz="1500" kern="1200" dirty="0"/>
-            <a:t>Cyril PY</a:t>
-          </a:r>
-        </a:p>
-      </dsp:txBody>
-      <dsp:txXfrm>
-        <a:off x="4483833" y="1448693"/>
-        <a:ext cx="1782009" cy="341720"/>
-      </dsp:txXfrm>
-    </dsp:sp>
-    <dsp:sp modelId="{5676D32F-1CE3-4176-81F2-A39E244B0416}">
-      <dsp:nvSpPr>
-        <dsp:cNvPr id="0" name=""/>
-        <dsp:cNvSpPr/>
-      </dsp:nvSpPr>
-      <dsp:spPr>
-        <a:xfrm>
-          <a:off x="103201" y="2268822"/>
-          <a:ext cx="1980010" cy="1025161"/>
-        </a:xfrm>
-        <a:prstGeom prst="rect">
-          <a:avLst/>
-        </a:prstGeom>
-        <a:gradFill rotWithShape="0">
-          <a:gsLst>
-            <a:gs pos="0">
-              <a:schemeClr val="accent1">
-                <a:hueOff val="0"/>
-                <a:satOff val="0"/>
-                <a:lumOff val="0"/>
-                <a:alphaOff val="0"/>
-                <a:tint val="96000"/>
-                <a:lumMod val="104000"/>
-              </a:schemeClr>
-            </a:gs>
-            <a:gs pos="100000">
-              <a:schemeClr val="accent1">
-                <a:hueOff val="0"/>
-                <a:satOff val="0"/>
-                <a:lumOff val="0"/>
-                <a:alphaOff val="0"/>
-                <a:shade val="90000"/>
-                <a:lumMod val="90000"/>
-              </a:schemeClr>
-            </a:gs>
-          </a:gsLst>
-          <a:lin ang="5400000" scaled="0"/>
-        </a:gradFill>
-        <a:ln>
-          <a:noFill/>
-        </a:ln>
-        <a:effectLst>
-          <a:outerShdw blurRad="63500" dist="25400" dir="5400000" rotWithShape="0">
-            <a:srgbClr val="000000">
-              <a:alpha val="60000"/>
-            </a:srgbClr>
-          </a:outerShdw>
-        </a:effectLst>
-      </dsp:spPr>
-      <dsp:style>
-        <a:lnRef idx="0">
-          <a:scrgbClr r="0" g="0" b="0"/>
-        </a:lnRef>
-        <a:fillRef idx="3">
-          <a:scrgbClr r="0" g="0" b="0"/>
-        </a:fillRef>
-        <a:effectRef idx="2">
-          <a:scrgbClr r="0" g="0" b="0"/>
-        </a:effectRef>
-        <a:fontRef idx="minor">
-          <a:schemeClr val="lt1"/>
-        </a:fontRef>
-      </dsp:style>
-      <dsp:txBody>
-        <a:bodyPr spcFirstLastPara="0" vert="horz" wrap="square" lIns="13970" tIns="13970" rIns="13970" bIns="144662" numCol="1" spcCol="1270" anchor="ctr" anchorCtr="0">
-          <a:noAutofit/>
-        </a:bodyPr>
-        <a:lstStyle/>
-        <a:p>
-          <a:pPr lvl="0" algn="ctr" defTabSz="977900">
-            <a:lnSpc>
-              <a:spcPct val="90000"/>
-            </a:lnSpc>
-            <a:spcBef>
-              <a:spcPct val="0"/>
-            </a:spcBef>
-            <a:spcAft>
-              <a:spcPct val="35000"/>
-            </a:spcAft>
-          </a:pPr>
-          <a:r>
-            <a:rPr lang="fr-FR" sz="2200" kern="1200" dirty="0" smtClean="0"/>
-            <a:t>Odométrie</a:t>
-          </a:r>
-          <a:endParaRPr lang="fr-FR" sz="2200" kern="1200" dirty="0"/>
-        </a:p>
-      </dsp:txBody>
-      <dsp:txXfrm>
-        <a:off x="103201" y="2268822"/>
-        <a:ext cx="1980010" cy="1025161"/>
-      </dsp:txXfrm>
-    </dsp:sp>
-    <dsp:sp modelId="{809562EB-4A18-496D-99D9-E0B60B4EAEA5}">
-      <dsp:nvSpPr>
-        <dsp:cNvPr id="0" name=""/>
-        <dsp:cNvSpPr/>
-      </dsp:nvSpPr>
-      <dsp:spPr>
-        <a:xfrm>
-          <a:off x="578787" y="3066170"/>
-          <a:ext cx="1782009" cy="341720"/>
-        </a:xfrm>
-        <a:prstGeom prst="rect">
-          <a:avLst/>
-        </a:prstGeom>
-        <a:solidFill>
-          <a:schemeClr val="lt1">
-            <a:alpha val="90000"/>
-            <a:hueOff val="0"/>
-            <a:satOff val="0"/>
-            <a:lumOff val="0"/>
-            <a:alphaOff val="0"/>
-          </a:schemeClr>
-        </a:solidFill>
-        <a:ln w="9525" cap="rnd" cmpd="sng" algn="ctr">
-          <a:solidFill>
-            <a:schemeClr val="accent1">
-              <a:hueOff val="0"/>
-              <a:satOff val="0"/>
-              <a:lumOff val="0"/>
-              <a:alphaOff val="0"/>
-            </a:schemeClr>
-          </a:solidFill>
-          <a:prstDash val="solid"/>
-        </a:ln>
-        <a:effectLst/>
-      </dsp:spPr>
-      <dsp:style>
-        <a:lnRef idx="1">
-          <a:scrgbClr r="0" g="0" b="0"/>
-        </a:lnRef>
-        <a:fillRef idx="1">
-          <a:scrgbClr r="0" g="0" b="0"/>
-        </a:fillRef>
-        <a:effectRef idx="0">
-          <a:scrgbClr r="0" g="0" b="0"/>
-        </a:effectRef>
-        <a:fontRef idx="minor"/>
-      </dsp:style>
-      <dsp:txBody>
-        <a:bodyPr spcFirstLastPara="0" vert="horz" wrap="square" lIns="38100" tIns="9525" rIns="38100" bIns="9525" numCol="1" spcCol="1270" anchor="ctr" anchorCtr="0">
-          <a:noAutofit/>
-        </a:bodyPr>
-        <a:lstStyle/>
-        <a:p>
-          <a:pPr lvl="0" algn="r" defTabSz="666750">
-            <a:lnSpc>
-              <a:spcPct val="90000"/>
-            </a:lnSpc>
-            <a:spcBef>
-              <a:spcPct val="0"/>
-            </a:spcBef>
-            <a:spcAft>
-              <a:spcPct val="35000"/>
-            </a:spcAft>
-          </a:pPr>
-          <a:r>
-            <a:rPr lang="fr-FR" sz="1500" kern="1200" dirty="0"/>
-            <a:t>Thomas PRAK</a:t>
-          </a:r>
-        </a:p>
-      </dsp:txBody>
-      <dsp:txXfrm>
-        <a:off x="578787" y="3066170"/>
-        <a:ext cx="1782009" cy="341720"/>
-      </dsp:txXfrm>
-    </dsp:sp>
-    <dsp:sp modelId="{F522147D-7926-4BE8-A844-0FB48C50D80C}">
-      <dsp:nvSpPr>
-        <dsp:cNvPr id="0" name=""/>
-        <dsp:cNvSpPr/>
-      </dsp:nvSpPr>
-      <dsp:spPr>
-        <a:xfrm>
-          <a:off x="2759621" y="2268822"/>
-          <a:ext cx="1980010" cy="1025161"/>
-        </a:xfrm>
-        <a:prstGeom prst="rect">
-          <a:avLst/>
-        </a:prstGeom>
-        <a:gradFill rotWithShape="0">
-          <a:gsLst>
-            <a:gs pos="0">
-              <a:schemeClr val="accent1">
-                <a:hueOff val="0"/>
-                <a:satOff val="0"/>
-                <a:lumOff val="0"/>
-                <a:alphaOff val="0"/>
-                <a:tint val="96000"/>
-                <a:lumMod val="104000"/>
-              </a:schemeClr>
-            </a:gs>
-            <a:gs pos="100000">
-              <a:schemeClr val="accent1">
-                <a:hueOff val="0"/>
-                <a:satOff val="0"/>
-                <a:lumOff val="0"/>
-                <a:alphaOff val="0"/>
-                <a:shade val="90000"/>
-                <a:lumMod val="90000"/>
-              </a:schemeClr>
-            </a:gs>
-          </a:gsLst>
-          <a:lin ang="5400000" scaled="0"/>
-        </a:gradFill>
-        <a:ln>
-          <a:noFill/>
-        </a:ln>
-        <a:effectLst>
-          <a:outerShdw blurRad="63500" dist="25400" dir="5400000" rotWithShape="0">
-            <a:srgbClr val="000000">
-              <a:alpha val="60000"/>
-            </a:srgbClr>
-          </a:outerShdw>
-        </a:effectLst>
-      </dsp:spPr>
-      <dsp:style>
-        <a:lnRef idx="0">
-          <a:scrgbClr r="0" g="0" b="0"/>
-        </a:lnRef>
-        <a:fillRef idx="3">
-          <a:scrgbClr r="0" g="0" b="0"/>
-        </a:fillRef>
-        <a:effectRef idx="2">
-          <a:scrgbClr r="0" g="0" b="0"/>
-        </a:effectRef>
-        <a:fontRef idx="minor">
-          <a:schemeClr val="lt1"/>
-        </a:fontRef>
-      </dsp:style>
-      <dsp:txBody>
-        <a:bodyPr spcFirstLastPara="0" vert="horz" wrap="square" lIns="13970" tIns="13970" rIns="13970" bIns="144662" numCol="1" spcCol="1270" anchor="ctr" anchorCtr="0">
-          <a:noAutofit/>
-        </a:bodyPr>
-        <a:lstStyle/>
-        <a:p>
-          <a:pPr lvl="0" algn="ctr" defTabSz="977900">
-            <a:lnSpc>
-              <a:spcPct val="90000"/>
-            </a:lnSpc>
-            <a:spcBef>
-              <a:spcPct val="0"/>
-            </a:spcBef>
-            <a:spcAft>
-              <a:spcPct val="35000"/>
-            </a:spcAft>
-          </a:pPr>
-          <a:r>
-            <a:rPr lang="fr-FR" sz="2200" kern="1200" dirty="0" smtClean="0"/>
-            <a:t>Client Web</a:t>
-          </a:r>
-          <a:endParaRPr lang="fr-FR" sz="2200" kern="1200" dirty="0"/>
-        </a:p>
-      </dsp:txBody>
-      <dsp:txXfrm>
-        <a:off x="2759621" y="2268822"/>
-        <a:ext cx="1980010" cy="1025161"/>
-      </dsp:txXfrm>
-    </dsp:sp>
-    <dsp:sp modelId="{BDDE5DF6-64AC-499B-A204-5D73CD5189A5}">
-      <dsp:nvSpPr>
-        <dsp:cNvPr id="0" name=""/>
-        <dsp:cNvSpPr/>
-      </dsp:nvSpPr>
-      <dsp:spPr>
-        <a:xfrm>
-          <a:off x="3155623" y="3066170"/>
-          <a:ext cx="1782009" cy="341720"/>
-        </a:xfrm>
-        <a:prstGeom prst="rect">
-          <a:avLst/>
-        </a:prstGeom>
-        <a:solidFill>
-          <a:schemeClr val="lt1">
-            <a:alpha val="90000"/>
-            <a:hueOff val="0"/>
-            <a:satOff val="0"/>
-            <a:lumOff val="0"/>
-            <a:alphaOff val="0"/>
-          </a:schemeClr>
-        </a:solidFill>
-        <a:ln w="9525" cap="rnd" cmpd="sng" algn="ctr">
-          <a:solidFill>
-            <a:schemeClr val="accent1">
-              <a:hueOff val="0"/>
-              <a:satOff val="0"/>
-              <a:lumOff val="0"/>
-              <a:alphaOff val="0"/>
-            </a:schemeClr>
-          </a:solidFill>
-          <a:prstDash val="solid"/>
-        </a:ln>
-        <a:effectLst/>
-      </dsp:spPr>
-      <dsp:style>
-        <a:lnRef idx="1">
-          <a:scrgbClr r="0" g="0" b="0"/>
-        </a:lnRef>
-        <a:fillRef idx="1">
-          <a:scrgbClr r="0" g="0" b="0"/>
-        </a:fillRef>
-        <a:effectRef idx="0">
-          <a:scrgbClr r="0" g="0" b="0"/>
-        </a:effectRef>
-        <a:fontRef idx="minor"/>
-      </dsp:style>
-      <dsp:txBody>
-        <a:bodyPr spcFirstLastPara="0" vert="horz" wrap="square" lIns="38100" tIns="9525" rIns="38100" bIns="9525" numCol="1" spcCol="1270" anchor="ctr" anchorCtr="0">
-          <a:noAutofit/>
-        </a:bodyPr>
-        <a:lstStyle/>
-        <a:p>
-          <a:pPr lvl="0" algn="r" defTabSz="666750">
-            <a:lnSpc>
-              <a:spcPct val="90000"/>
-            </a:lnSpc>
-            <a:spcBef>
-              <a:spcPct val="0"/>
-            </a:spcBef>
-            <a:spcAft>
-              <a:spcPct val="35000"/>
-            </a:spcAft>
-          </a:pPr>
-          <a:r>
-            <a:rPr lang="fr-FR" sz="1500" kern="1200" dirty="0"/>
-            <a:t>Justine SABBATIER</a:t>
-          </a:r>
-        </a:p>
-      </dsp:txBody>
-      <dsp:txXfrm>
-        <a:off x="3155623" y="3066170"/>
-        <a:ext cx="1782009" cy="341720"/>
-      </dsp:txXfrm>
-    </dsp:sp>
-    <dsp:sp modelId="{5662567F-F7A3-40C3-B265-EF28650FB1CC}">
-      <dsp:nvSpPr>
-        <dsp:cNvPr id="0" name=""/>
-        <dsp:cNvSpPr/>
-      </dsp:nvSpPr>
-      <dsp:spPr>
-        <a:xfrm>
-          <a:off x="5416041" y="2268822"/>
-          <a:ext cx="1980010" cy="1025161"/>
-        </a:xfrm>
-        <a:prstGeom prst="rect">
-          <a:avLst/>
-        </a:prstGeom>
-        <a:gradFill rotWithShape="0">
-          <a:gsLst>
-            <a:gs pos="0">
-              <a:schemeClr val="accent1">
-                <a:hueOff val="0"/>
-                <a:satOff val="0"/>
-                <a:lumOff val="0"/>
-                <a:alphaOff val="0"/>
-                <a:tint val="96000"/>
-                <a:lumMod val="104000"/>
-              </a:schemeClr>
-            </a:gs>
-            <a:gs pos="100000">
-              <a:schemeClr val="accent1">
-                <a:hueOff val="0"/>
-                <a:satOff val="0"/>
-                <a:lumOff val="0"/>
-                <a:alphaOff val="0"/>
-                <a:shade val="90000"/>
-                <a:lumMod val="90000"/>
-              </a:schemeClr>
-            </a:gs>
-          </a:gsLst>
-          <a:lin ang="5400000" scaled="0"/>
-        </a:gradFill>
-        <a:ln>
-          <a:noFill/>
-        </a:ln>
-        <a:effectLst>
-          <a:outerShdw blurRad="63500" dist="25400" dir="5400000" rotWithShape="0">
-            <a:srgbClr val="000000">
-              <a:alpha val="60000"/>
-            </a:srgbClr>
-          </a:outerShdw>
-        </a:effectLst>
-      </dsp:spPr>
-      <dsp:style>
-        <a:lnRef idx="0">
-          <a:scrgbClr r="0" g="0" b="0"/>
-        </a:lnRef>
-        <a:fillRef idx="3">
-          <a:scrgbClr r="0" g="0" b="0"/>
-        </a:fillRef>
-        <a:effectRef idx="2">
-          <a:scrgbClr r="0" g="0" b="0"/>
-        </a:effectRef>
-        <a:fontRef idx="minor">
-          <a:schemeClr val="lt1"/>
-        </a:fontRef>
-      </dsp:style>
-      <dsp:txBody>
-        <a:bodyPr spcFirstLastPara="0" vert="horz" wrap="square" lIns="13970" tIns="13970" rIns="13970" bIns="144662" numCol="1" spcCol="1270" anchor="ctr" anchorCtr="0">
-          <a:noAutofit/>
-        </a:bodyPr>
-        <a:lstStyle/>
-        <a:p>
-          <a:pPr lvl="0" algn="ctr" defTabSz="977900">
-            <a:lnSpc>
-              <a:spcPct val="90000"/>
-            </a:lnSpc>
-            <a:spcBef>
-              <a:spcPct val="0"/>
-            </a:spcBef>
-            <a:spcAft>
-              <a:spcPct val="35000"/>
-            </a:spcAft>
-          </a:pPr>
-          <a:r>
-            <a:rPr lang="fr-FR" sz="2200" kern="1200" dirty="0" smtClean="0"/>
-            <a:t>Algorithme</a:t>
-          </a:r>
-          <a:endParaRPr lang="fr-FR" sz="2200" kern="1200" dirty="0"/>
-        </a:p>
-      </dsp:txBody>
-      <dsp:txXfrm>
-        <a:off x="5416041" y="2268822"/>
-        <a:ext cx="1980010" cy="1025161"/>
-      </dsp:txXfrm>
-    </dsp:sp>
-    <dsp:sp modelId="{0E9E0690-608D-4BF4-8CCF-3E5EC47EB681}">
-      <dsp:nvSpPr>
-        <dsp:cNvPr id="0" name=""/>
-        <dsp:cNvSpPr/>
-      </dsp:nvSpPr>
-      <dsp:spPr>
-        <a:xfrm>
-          <a:off x="5812044" y="3066170"/>
-          <a:ext cx="1782009" cy="341720"/>
-        </a:xfrm>
-        <a:prstGeom prst="rect">
-          <a:avLst/>
-        </a:prstGeom>
-        <a:solidFill>
-          <a:schemeClr val="lt1">
-            <a:alpha val="90000"/>
-            <a:hueOff val="0"/>
-            <a:satOff val="0"/>
-            <a:lumOff val="0"/>
-            <a:alphaOff val="0"/>
-          </a:schemeClr>
-        </a:solidFill>
-        <a:ln w="9525" cap="rnd" cmpd="sng" algn="ctr">
-          <a:solidFill>
-            <a:schemeClr val="accent1">
-              <a:hueOff val="0"/>
-              <a:satOff val="0"/>
-              <a:lumOff val="0"/>
-              <a:alphaOff val="0"/>
-            </a:schemeClr>
-          </a:solidFill>
-          <a:prstDash val="solid"/>
-        </a:ln>
-        <a:effectLst/>
-      </dsp:spPr>
-      <dsp:style>
-        <a:lnRef idx="1">
-          <a:scrgbClr r="0" g="0" b="0"/>
-        </a:lnRef>
-        <a:fillRef idx="1">
-          <a:scrgbClr r="0" g="0" b="0"/>
-        </a:fillRef>
-        <a:effectRef idx="0">
-          <a:scrgbClr r="0" g="0" b="0"/>
-        </a:effectRef>
-        <a:fontRef idx="minor"/>
-      </dsp:style>
-      <dsp:txBody>
-        <a:bodyPr spcFirstLastPara="0" vert="horz" wrap="square" lIns="38100" tIns="9525" rIns="38100" bIns="9525" numCol="1" spcCol="1270" anchor="ctr" anchorCtr="0">
-          <a:noAutofit/>
-        </a:bodyPr>
-        <a:lstStyle/>
-        <a:p>
-          <a:pPr lvl="0" algn="r" defTabSz="666750">
-            <a:lnSpc>
-              <a:spcPct val="90000"/>
-            </a:lnSpc>
-            <a:spcBef>
-              <a:spcPct val="0"/>
-            </a:spcBef>
-            <a:spcAft>
-              <a:spcPct val="35000"/>
-            </a:spcAft>
-          </a:pPr>
-          <a:r>
-            <a:rPr lang="fr-FR" sz="1500" kern="1200"/>
-            <a:t>Mathias DA COSTA</a:t>
-          </a:r>
-        </a:p>
-      </dsp:txBody>
-      <dsp:txXfrm>
-        <a:off x="5812044" y="3066170"/>
-        <a:ext cx="1782009" cy="341720"/>
-      </dsp:txXfrm>
-    </dsp:sp>
-    <dsp:sp modelId="{96FA1259-64E4-404F-B34D-D3DE19F6B678}">
-      <dsp:nvSpPr>
-        <dsp:cNvPr id="0" name=""/>
-        <dsp:cNvSpPr/>
-      </dsp:nvSpPr>
-      <dsp:spPr>
-        <a:xfrm>
-          <a:off x="8072462" y="2268822"/>
-          <a:ext cx="1980010" cy="1025161"/>
-        </a:xfrm>
-        <a:prstGeom prst="rect">
-          <a:avLst/>
-        </a:prstGeom>
-        <a:gradFill rotWithShape="0">
-          <a:gsLst>
-            <a:gs pos="0">
-              <a:schemeClr val="accent1">
-                <a:hueOff val="0"/>
-                <a:satOff val="0"/>
-                <a:lumOff val="0"/>
-                <a:alphaOff val="0"/>
-                <a:tint val="96000"/>
-                <a:lumMod val="104000"/>
-              </a:schemeClr>
-            </a:gs>
-            <a:gs pos="100000">
-              <a:schemeClr val="accent1">
-                <a:hueOff val="0"/>
-                <a:satOff val="0"/>
-                <a:lumOff val="0"/>
-                <a:alphaOff val="0"/>
-                <a:shade val="90000"/>
-                <a:lumMod val="90000"/>
-              </a:schemeClr>
-            </a:gs>
-          </a:gsLst>
-          <a:lin ang="5400000" scaled="0"/>
-        </a:gradFill>
-        <a:ln>
-          <a:noFill/>
-        </a:ln>
-        <a:effectLst>
-          <a:outerShdw blurRad="63500" dist="25400" dir="5400000" rotWithShape="0">
-            <a:srgbClr val="000000">
-              <a:alpha val="60000"/>
-            </a:srgbClr>
-          </a:outerShdw>
-        </a:effectLst>
-      </dsp:spPr>
-      <dsp:style>
-        <a:lnRef idx="0">
-          <a:scrgbClr r="0" g="0" b="0"/>
-        </a:lnRef>
-        <a:fillRef idx="3">
-          <a:scrgbClr r="0" g="0" b="0"/>
-        </a:fillRef>
-        <a:effectRef idx="2">
-          <a:scrgbClr r="0" g="0" b="0"/>
-        </a:effectRef>
-        <a:fontRef idx="minor">
-          <a:schemeClr val="lt1"/>
-        </a:fontRef>
-      </dsp:style>
-      <dsp:txBody>
-        <a:bodyPr spcFirstLastPara="0" vert="horz" wrap="square" lIns="13970" tIns="13970" rIns="13970" bIns="144662" numCol="1" spcCol="1270" anchor="ctr" anchorCtr="0">
-          <a:noAutofit/>
-        </a:bodyPr>
-        <a:lstStyle/>
-        <a:p>
-          <a:pPr lvl="0" algn="ctr" defTabSz="977900">
-            <a:lnSpc>
-              <a:spcPct val="90000"/>
-            </a:lnSpc>
-            <a:spcBef>
-              <a:spcPct val="0"/>
-            </a:spcBef>
-            <a:spcAft>
-              <a:spcPct val="35000"/>
-            </a:spcAft>
-          </a:pPr>
-          <a:r>
-            <a:rPr lang="fr-FR" sz="2200" kern="1200" dirty="0" smtClean="0"/>
-            <a:t>Communication</a:t>
-          </a:r>
-          <a:endParaRPr lang="fr-FR" sz="2200" kern="1200" dirty="0"/>
-        </a:p>
-      </dsp:txBody>
-      <dsp:txXfrm>
-        <a:off x="8072462" y="2268822"/>
-        <a:ext cx="1980010" cy="1025161"/>
-      </dsp:txXfrm>
-    </dsp:sp>
-    <dsp:sp modelId="{A8EA838F-3B0C-4F99-BFF0-CFB047931BD1}">
-      <dsp:nvSpPr>
-        <dsp:cNvPr id="0" name=""/>
-        <dsp:cNvSpPr/>
-      </dsp:nvSpPr>
-      <dsp:spPr>
-        <a:xfrm>
-          <a:off x="8468464" y="3066170"/>
-          <a:ext cx="1782009" cy="341720"/>
-        </a:xfrm>
-        <a:prstGeom prst="rect">
-          <a:avLst/>
-        </a:prstGeom>
-        <a:solidFill>
-          <a:schemeClr val="lt1">
-            <a:alpha val="90000"/>
-            <a:hueOff val="0"/>
-            <a:satOff val="0"/>
-            <a:lumOff val="0"/>
-            <a:alphaOff val="0"/>
-          </a:schemeClr>
-        </a:solidFill>
-        <a:ln w="9525" cap="rnd" cmpd="sng" algn="ctr">
-          <a:solidFill>
-            <a:schemeClr val="accent1">
-              <a:hueOff val="0"/>
-              <a:satOff val="0"/>
-              <a:lumOff val="0"/>
-              <a:alphaOff val="0"/>
-            </a:schemeClr>
-          </a:solidFill>
-          <a:prstDash val="solid"/>
-        </a:ln>
-        <a:effectLst/>
-      </dsp:spPr>
-      <dsp:style>
-        <a:lnRef idx="1">
-          <a:scrgbClr r="0" g="0" b="0"/>
-        </a:lnRef>
-        <a:fillRef idx="1">
-          <a:scrgbClr r="0" g="0" b="0"/>
-        </a:fillRef>
-        <a:effectRef idx="0">
-          <a:scrgbClr r="0" g="0" b="0"/>
-        </a:effectRef>
-        <a:fontRef idx="minor"/>
-      </dsp:style>
-      <dsp:txBody>
-        <a:bodyPr spcFirstLastPara="0" vert="horz" wrap="square" lIns="38100" tIns="9525" rIns="38100" bIns="9525" numCol="1" spcCol="1270" anchor="ctr" anchorCtr="0">
-          <a:noAutofit/>
-        </a:bodyPr>
-        <a:lstStyle/>
-        <a:p>
-          <a:pPr lvl="0" algn="r" defTabSz="666750">
-            <a:lnSpc>
-              <a:spcPct val="90000"/>
-            </a:lnSpc>
-            <a:spcBef>
-              <a:spcPct val="0"/>
-            </a:spcBef>
-            <a:spcAft>
-              <a:spcPct val="35000"/>
-            </a:spcAft>
-          </a:pPr>
-          <a:r>
-            <a:rPr lang="fr-FR" sz="1500" kern="1200"/>
-            <a:t>Julien LOEVE</a:t>
-          </a:r>
-        </a:p>
-      </dsp:txBody>
-      <dsp:txXfrm>
-        <a:off x="8468464" y="3066170"/>
-        <a:ext cx="1782009" cy="341720"/>
-      </dsp:txXfrm>
-    </dsp:sp>
   </dsp:spTree>
 </dsp:drawing>
 </file>
@@ -4083,646 +3005,6 @@
       <dsp:cNvGrpSpPr/>
     </dsp:nvGrpSpPr>
     <dsp:grpSpPr/>
-    <dsp:sp modelId="{6A1FC33C-BD54-48D9-8848-B8051814CA7A}">
-      <dsp:nvSpPr>
-        <dsp:cNvPr id="0" name=""/>
-        <dsp:cNvSpPr/>
-      </dsp:nvSpPr>
-      <dsp:spPr>
-        <a:xfrm>
-          <a:off x="2656565" y="9048"/>
-          <a:ext cx="2412531" cy="2412899"/>
-        </a:xfrm>
-        <a:prstGeom prst="circularArrow">
-          <a:avLst>
-            <a:gd name="adj1" fmla="val 10980"/>
-            <a:gd name="adj2" fmla="val 1142322"/>
-            <a:gd name="adj3" fmla="val 4500000"/>
-            <a:gd name="adj4" fmla="val 10800000"/>
-            <a:gd name="adj5" fmla="val 12500"/>
-          </a:avLst>
-        </a:prstGeom>
-        <a:gradFill rotWithShape="0">
-          <a:gsLst>
-            <a:gs pos="0">
-              <a:schemeClr val="accent1">
-                <a:hueOff val="0"/>
-                <a:satOff val="0"/>
-                <a:lumOff val="0"/>
-                <a:alphaOff val="0"/>
-                <a:tint val="96000"/>
-                <a:lumMod val="104000"/>
-              </a:schemeClr>
-            </a:gs>
-            <a:gs pos="100000">
-              <a:schemeClr val="accent1">
-                <a:hueOff val="0"/>
-                <a:satOff val="0"/>
-                <a:lumOff val="0"/>
-                <a:alphaOff val="0"/>
-                <a:shade val="90000"/>
-                <a:lumMod val="90000"/>
-              </a:schemeClr>
-            </a:gs>
-          </a:gsLst>
-          <a:lin ang="5400000" scaled="0"/>
-        </a:gradFill>
-        <a:ln>
-          <a:noFill/>
-        </a:ln>
-        <a:effectLst>
-          <a:outerShdw blurRad="63500" dist="25400" dir="5400000" rotWithShape="0">
-            <a:srgbClr val="000000">
-              <a:alpha val="60000"/>
-            </a:srgbClr>
-          </a:outerShdw>
-        </a:effectLst>
-      </dsp:spPr>
-      <dsp:style>
-        <a:lnRef idx="0">
-          <a:scrgbClr r="0" g="0" b="0"/>
-        </a:lnRef>
-        <a:fillRef idx="3">
-          <a:scrgbClr r="0" g="0" b="0"/>
-        </a:fillRef>
-        <a:effectRef idx="2">
-          <a:scrgbClr r="0" g="0" b="0"/>
-        </a:effectRef>
-        <a:fontRef idx="minor">
-          <a:schemeClr val="lt1"/>
-        </a:fontRef>
-      </dsp:style>
-    </dsp:sp>
-    <dsp:sp modelId="{2BC33A24-C019-40DB-B4F8-D236F35960DA}">
-      <dsp:nvSpPr>
-        <dsp:cNvPr id="0" name=""/>
-        <dsp:cNvSpPr/>
-      </dsp:nvSpPr>
-      <dsp:spPr>
-        <a:xfrm>
-          <a:off x="5465248" y="601561"/>
-          <a:ext cx="3405954" cy="965360"/>
-        </a:xfrm>
-        <a:prstGeom prst="rect">
-          <a:avLst/>
-        </a:prstGeom>
-        <a:noFill/>
-        <a:ln>
-          <a:noFill/>
-        </a:ln>
-        <a:effectLst/>
-      </dsp:spPr>
-      <dsp:style>
-        <a:lnRef idx="0">
-          <a:scrgbClr r="0" g="0" b="0"/>
-        </a:lnRef>
-        <a:fillRef idx="0">
-          <a:scrgbClr r="0" g="0" b="0"/>
-        </a:fillRef>
-        <a:effectRef idx="0">
-          <a:scrgbClr r="0" g="0" b="0"/>
-        </a:effectRef>
-        <a:fontRef idx="minor"/>
-      </dsp:style>
-      <dsp:txBody>
-        <a:bodyPr spcFirstLastPara="0" vert="horz" wrap="square" lIns="15240" tIns="15240" rIns="15240" bIns="15240" numCol="1" spcCol="1270" anchor="ctr" anchorCtr="0">
-          <a:noAutofit/>
-        </a:bodyPr>
-        <a:lstStyle/>
-        <a:p>
-          <a:pPr marL="228600" lvl="1" indent="-228600" algn="l" defTabSz="1066800">
-            <a:lnSpc>
-              <a:spcPct val="90000"/>
-            </a:lnSpc>
-            <a:spcBef>
-              <a:spcPct val="0"/>
-            </a:spcBef>
-            <a:spcAft>
-              <a:spcPct val="15000"/>
-            </a:spcAft>
-            <a:buChar char="••"/>
-          </a:pPr>
-          <a:r>
-            <a:rPr lang="fr-FR" sz="2400" b="1" kern="1200" dirty="0" smtClean="0"/>
-            <a:t>Requête GET </a:t>
-          </a:r>
-          <a:endParaRPr lang="fr-FR" sz="2400" b="1" kern="1200" dirty="0"/>
-        </a:p>
-        <a:p>
-          <a:pPr marL="457200" lvl="2" indent="-228600" algn="l" defTabSz="1066800">
-            <a:lnSpc>
-              <a:spcPct val="90000"/>
-            </a:lnSpc>
-            <a:spcBef>
-              <a:spcPct val="0"/>
-            </a:spcBef>
-            <a:spcAft>
-              <a:spcPct val="15000"/>
-            </a:spcAft>
-            <a:buChar char="••"/>
-          </a:pPr>
-          <a:r>
-            <a:rPr lang="fr-FR" sz="2400" kern="1200" dirty="0" smtClean="0"/>
-            <a:t>Récupération du </a:t>
-          </a:r>
-          <a:r>
-            <a:rPr lang="fr-FR" sz="2400" kern="1200" dirty="0" err="1" smtClean="0"/>
-            <a:t>Json</a:t>
-          </a:r>
-          <a:endParaRPr lang="fr-FR" sz="2400" kern="1200" dirty="0"/>
-        </a:p>
-      </dsp:txBody>
-      <dsp:txXfrm>
-        <a:off x="5465248" y="601561"/>
-        <a:ext cx="3405954" cy="965360"/>
-      </dsp:txXfrm>
-    </dsp:sp>
-    <dsp:sp modelId="{41EA7880-1A0E-4CC2-B59F-914DDD351791}">
-      <dsp:nvSpPr>
-        <dsp:cNvPr id="0" name=""/>
-        <dsp:cNvSpPr/>
-      </dsp:nvSpPr>
-      <dsp:spPr>
-        <a:xfrm>
-          <a:off x="3162648" y="871129"/>
-          <a:ext cx="1340597" cy="670138"/>
-        </a:xfrm>
-        <a:prstGeom prst="rect">
-          <a:avLst/>
-        </a:prstGeom>
-        <a:noFill/>
-        <a:ln>
-          <a:noFill/>
-        </a:ln>
-        <a:effectLst/>
-      </dsp:spPr>
-      <dsp:style>
-        <a:lnRef idx="0">
-          <a:scrgbClr r="0" g="0" b="0"/>
-        </a:lnRef>
-        <a:fillRef idx="0">
-          <a:scrgbClr r="0" g="0" b="0"/>
-        </a:fillRef>
-        <a:effectRef idx="0">
-          <a:scrgbClr r="0" g="0" b="0"/>
-        </a:effectRef>
-        <a:fontRef idx="minor"/>
-      </dsp:style>
-      <dsp:txBody>
-        <a:bodyPr spcFirstLastPara="0" vert="horz" wrap="square" lIns="17780" tIns="17780" rIns="17780" bIns="17780" numCol="1" spcCol="1270" anchor="ctr" anchorCtr="0">
-          <a:noAutofit/>
-        </a:bodyPr>
-        <a:lstStyle/>
-        <a:p>
-          <a:pPr lvl="0" algn="ctr" defTabSz="1244600">
-            <a:lnSpc>
-              <a:spcPct val="90000"/>
-            </a:lnSpc>
-            <a:spcBef>
-              <a:spcPct val="0"/>
-            </a:spcBef>
-            <a:spcAft>
-              <a:spcPct val="35000"/>
-            </a:spcAft>
-          </a:pPr>
-          <a:r>
-            <a:rPr lang="fr-FR" sz="2800" kern="1200" dirty="0" smtClean="0"/>
-            <a:t>Ajax</a:t>
-          </a:r>
-          <a:endParaRPr lang="fr-FR" sz="2800" kern="1200" dirty="0"/>
-        </a:p>
-      </dsp:txBody>
-      <dsp:txXfrm>
-        <a:off x="3162648" y="871129"/>
-        <a:ext cx="1340597" cy="670138"/>
-      </dsp:txXfrm>
-    </dsp:sp>
-    <dsp:sp modelId="{1EAF82E5-DF36-4432-8EFB-3660BDEAF403}">
-      <dsp:nvSpPr>
-        <dsp:cNvPr id="0" name=""/>
-        <dsp:cNvSpPr/>
-      </dsp:nvSpPr>
-      <dsp:spPr>
-        <a:xfrm>
-          <a:off x="1959327" y="1386389"/>
-          <a:ext cx="2412531" cy="2412899"/>
-        </a:xfrm>
-        <a:prstGeom prst="leftCircularArrow">
-          <a:avLst>
-            <a:gd name="adj1" fmla="val 10980"/>
-            <a:gd name="adj2" fmla="val 1142322"/>
-            <a:gd name="adj3" fmla="val 6300000"/>
-            <a:gd name="adj4" fmla="val 18900000"/>
-            <a:gd name="adj5" fmla="val 12500"/>
-          </a:avLst>
-        </a:prstGeom>
-        <a:gradFill rotWithShape="0">
-          <a:gsLst>
-            <a:gs pos="0">
-              <a:schemeClr val="accent1">
-                <a:hueOff val="0"/>
-                <a:satOff val="0"/>
-                <a:lumOff val="0"/>
-                <a:alphaOff val="0"/>
-                <a:tint val="96000"/>
-                <a:lumMod val="104000"/>
-              </a:schemeClr>
-            </a:gs>
-            <a:gs pos="100000">
-              <a:schemeClr val="accent1">
-                <a:hueOff val="0"/>
-                <a:satOff val="0"/>
-                <a:lumOff val="0"/>
-                <a:alphaOff val="0"/>
-                <a:shade val="90000"/>
-                <a:lumMod val="90000"/>
-              </a:schemeClr>
-            </a:gs>
-          </a:gsLst>
-          <a:lin ang="5400000" scaled="0"/>
-        </a:gradFill>
-        <a:ln>
-          <a:noFill/>
-        </a:ln>
-        <a:effectLst>
-          <a:outerShdw blurRad="63500" dist="25400" dir="5400000" rotWithShape="0">
-            <a:srgbClr val="000000">
-              <a:alpha val="60000"/>
-            </a:srgbClr>
-          </a:outerShdw>
-        </a:effectLst>
-      </dsp:spPr>
-      <dsp:style>
-        <a:lnRef idx="0">
-          <a:scrgbClr r="0" g="0" b="0"/>
-        </a:lnRef>
-        <a:fillRef idx="3">
-          <a:scrgbClr r="0" g="0" b="0"/>
-        </a:fillRef>
-        <a:effectRef idx="2">
-          <a:scrgbClr r="0" g="0" b="0"/>
-        </a:effectRef>
-        <a:fontRef idx="minor">
-          <a:schemeClr val="lt1"/>
-        </a:fontRef>
-      </dsp:style>
-    </dsp:sp>
-    <dsp:sp modelId="{EED53FE3-01A0-4A4A-B958-999558A60657}">
-      <dsp:nvSpPr>
-        <dsp:cNvPr id="0" name=""/>
-        <dsp:cNvSpPr/>
-      </dsp:nvSpPr>
-      <dsp:spPr>
-        <a:xfrm>
-          <a:off x="4348677" y="2031293"/>
-          <a:ext cx="5643819" cy="965360"/>
-        </a:xfrm>
-        <a:prstGeom prst="rect">
-          <a:avLst/>
-        </a:prstGeom>
-        <a:noFill/>
-        <a:ln>
-          <a:noFill/>
-        </a:ln>
-        <a:effectLst/>
-      </dsp:spPr>
-      <dsp:style>
-        <a:lnRef idx="0">
-          <a:scrgbClr r="0" g="0" b="0"/>
-        </a:lnRef>
-        <a:fillRef idx="0">
-          <a:scrgbClr r="0" g="0" b="0"/>
-        </a:fillRef>
-        <a:effectRef idx="0">
-          <a:scrgbClr r="0" g="0" b="0"/>
-        </a:effectRef>
-        <a:fontRef idx="minor"/>
-      </dsp:style>
-      <dsp:txBody>
-        <a:bodyPr spcFirstLastPara="0" vert="horz" wrap="square" lIns="15240" tIns="15240" rIns="15240" bIns="15240" numCol="1" spcCol="1270" anchor="ctr" anchorCtr="0">
-          <a:noAutofit/>
-        </a:bodyPr>
-        <a:lstStyle/>
-        <a:p>
-          <a:pPr marL="228600" lvl="1" indent="-228600" algn="l" defTabSz="1066800">
-            <a:lnSpc>
-              <a:spcPct val="90000"/>
-            </a:lnSpc>
-            <a:spcBef>
-              <a:spcPct val="0"/>
-            </a:spcBef>
-            <a:spcAft>
-              <a:spcPct val="15000"/>
-            </a:spcAft>
-            <a:buChar char="••"/>
-          </a:pPr>
-          <a:r>
-            <a:rPr lang="fr-FR" sz="2400" b="1" kern="1200" dirty="0" smtClean="0"/>
-            <a:t>Nativement interprété</a:t>
-          </a:r>
-          <a:endParaRPr lang="fr-FR" sz="2400" b="1" kern="1200" dirty="0"/>
-        </a:p>
-        <a:p>
-          <a:pPr marL="457200" lvl="2" indent="-228600" algn="l" defTabSz="1066800">
-            <a:lnSpc>
-              <a:spcPct val="90000"/>
-            </a:lnSpc>
-            <a:spcBef>
-              <a:spcPct val="0"/>
-            </a:spcBef>
-            <a:spcAft>
-              <a:spcPct val="15000"/>
-            </a:spcAft>
-            <a:buChar char="••"/>
-          </a:pPr>
-          <a:r>
-            <a:rPr lang="fr-FR" sz="2400" kern="1200" dirty="0" smtClean="0"/>
-            <a:t>Extraction des données</a:t>
-          </a:r>
-          <a:endParaRPr lang="fr-FR" sz="2400" kern="1200" dirty="0"/>
-        </a:p>
-      </dsp:txBody>
-      <dsp:txXfrm>
-        <a:off x="4348677" y="2031293"/>
-        <a:ext cx="5643819" cy="965360"/>
-      </dsp:txXfrm>
-    </dsp:sp>
-    <dsp:sp modelId="{6AA25D69-5E05-40A3-9F00-9387D55331A8}">
-      <dsp:nvSpPr>
-        <dsp:cNvPr id="0" name=""/>
-        <dsp:cNvSpPr/>
-      </dsp:nvSpPr>
-      <dsp:spPr>
-        <a:xfrm>
-          <a:off x="2495294" y="2265538"/>
-          <a:ext cx="1340597" cy="670138"/>
-        </a:xfrm>
-        <a:prstGeom prst="rect">
-          <a:avLst/>
-        </a:prstGeom>
-        <a:noFill/>
-        <a:ln>
-          <a:noFill/>
-        </a:ln>
-        <a:effectLst/>
-      </dsp:spPr>
-      <dsp:style>
-        <a:lnRef idx="0">
-          <a:scrgbClr r="0" g="0" b="0"/>
-        </a:lnRef>
-        <a:fillRef idx="0">
-          <a:scrgbClr r="0" g="0" b="0"/>
-        </a:fillRef>
-        <a:effectRef idx="0">
-          <a:scrgbClr r="0" g="0" b="0"/>
-        </a:effectRef>
-        <a:fontRef idx="minor"/>
-      </dsp:style>
-      <dsp:txBody>
-        <a:bodyPr spcFirstLastPara="0" vert="horz" wrap="square" lIns="17780" tIns="17780" rIns="17780" bIns="17780" numCol="1" spcCol="1270" anchor="ctr" anchorCtr="0">
-          <a:noAutofit/>
-        </a:bodyPr>
-        <a:lstStyle/>
-        <a:p>
-          <a:pPr lvl="0" algn="ctr" defTabSz="1244600">
-            <a:lnSpc>
-              <a:spcPct val="90000"/>
-            </a:lnSpc>
-            <a:spcBef>
-              <a:spcPct val="0"/>
-            </a:spcBef>
-            <a:spcAft>
-              <a:spcPct val="35000"/>
-            </a:spcAft>
-          </a:pPr>
-          <a:r>
-            <a:rPr lang="fr-FR" sz="2800" kern="1200" dirty="0" err="1" smtClean="0"/>
-            <a:t>Jquery</a:t>
-          </a:r>
-          <a:endParaRPr lang="fr-FR" sz="2800" kern="1200" dirty="0"/>
-        </a:p>
-      </dsp:txBody>
-      <dsp:txXfrm>
-        <a:off x="2495294" y="2265538"/>
-        <a:ext cx="1340597" cy="670138"/>
-      </dsp:txXfrm>
-    </dsp:sp>
-    <dsp:sp modelId="{A7590864-E6C3-49D8-9B22-DF9210EFF756}">
-      <dsp:nvSpPr>
-        <dsp:cNvPr id="0" name=""/>
-        <dsp:cNvSpPr/>
-      </dsp:nvSpPr>
-      <dsp:spPr>
-        <a:xfrm>
-          <a:off x="2801108" y="2938684"/>
-          <a:ext cx="2072738" cy="2073569"/>
-        </a:xfrm>
-        <a:prstGeom prst="blockArc">
-          <a:avLst>
-            <a:gd name="adj1" fmla="val 13500000"/>
-            <a:gd name="adj2" fmla="val 10800000"/>
-            <a:gd name="adj3" fmla="val 12740"/>
-          </a:avLst>
-        </a:prstGeom>
-        <a:gradFill rotWithShape="0">
-          <a:gsLst>
-            <a:gs pos="0">
-              <a:schemeClr val="accent1">
-                <a:hueOff val="0"/>
-                <a:satOff val="0"/>
-                <a:lumOff val="0"/>
-                <a:alphaOff val="0"/>
-                <a:tint val="96000"/>
-                <a:lumMod val="104000"/>
-              </a:schemeClr>
-            </a:gs>
-            <a:gs pos="100000">
-              <a:schemeClr val="accent1">
-                <a:hueOff val="0"/>
-                <a:satOff val="0"/>
-                <a:lumOff val="0"/>
-                <a:alphaOff val="0"/>
-                <a:shade val="90000"/>
-                <a:lumMod val="90000"/>
-              </a:schemeClr>
-            </a:gs>
-          </a:gsLst>
-          <a:lin ang="5400000" scaled="0"/>
-        </a:gradFill>
-        <a:ln>
-          <a:noFill/>
-        </a:ln>
-        <a:effectLst>
-          <a:outerShdw blurRad="63500" dist="25400" dir="5400000" rotWithShape="0">
-            <a:srgbClr val="000000">
-              <a:alpha val="60000"/>
-            </a:srgbClr>
-          </a:outerShdw>
-        </a:effectLst>
-      </dsp:spPr>
-      <dsp:style>
-        <a:lnRef idx="0">
-          <a:scrgbClr r="0" g="0" b="0"/>
-        </a:lnRef>
-        <a:fillRef idx="3">
-          <a:scrgbClr r="0" g="0" b="0"/>
-        </a:fillRef>
-        <a:effectRef idx="2">
-          <a:scrgbClr r="0" g="0" b="0"/>
-        </a:effectRef>
-        <a:fontRef idx="minor">
-          <a:schemeClr val="lt1"/>
-        </a:fontRef>
-      </dsp:style>
-    </dsp:sp>
-    <dsp:sp modelId="{1EC2A02A-3E8D-473F-97D1-1FB993A4303A}">
-      <dsp:nvSpPr>
-        <dsp:cNvPr id="0" name=""/>
-        <dsp:cNvSpPr/>
-      </dsp:nvSpPr>
-      <dsp:spPr>
-        <a:xfrm>
-          <a:off x="5458447" y="3522663"/>
-          <a:ext cx="4534049" cy="965360"/>
-        </a:xfrm>
-        <a:prstGeom prst="rect">
-          <a:avLst/>
-        </a:prstGeom>
-        <a:noFill/>
-        <a:ln>
-          <a:noFill/>
-        </a:ln>
-        <a:effectLst/>
-      </dsp:spPr>
-      <dsp:style>
-        <a:lnRef idx="0">
-          <a:scrgbClr r="0" g="0" b="0"/>
-        </a:lnRef>
-        <a:fillRef idx="0">
-          <a:scrgbClr r="0" g="0" b="0"/>
-        </a:fillRef>
-        <a:effectRef idx="0">
-          <a:scrgbClr r="0" g="0" b="0"/>
-        </a:effectRef>
-        <a:fontRef idx="minor"/>
-      </dsp:style>
-      <dsp:txBody>
-        <a:bodyPr spcFirstLastPara="0" vert="horz" wrap="square" lIns="15240" tIns="15240" rIns="15240" bIns="15240" numCol="1" spcCol="1270" anchor="ctr" anchorCtr="0">
-          <a:noAutofit/>
-        </a:bodyPr>
-        <a:lstStyle/>
-        <a:p>
-          <a:pPr marL="228600" lvl="1" indent="-228600" algn="l" defTabSz="1066800">
-            <a:lnSpc>
-              <a:spcPct val="90000"/>
-            </a:lnSpc>
-            <a:spcBef>
-              <a:spcPct val="0"/>
-            </a:spcBef>
-            <a:spcAft>
-              <a:spcPct val="15000"/>
-            </a:spcAft>
-            <a:buChar char="••"/>
-          </a:pPr>
-          <a:r>
-            <a:rPr lang="fr-FR" sz="2400" b="1" kern="1200" dirty="0" smtClean="0"/>
-            <a:t>Balise &lt;</a:t>
-          </a:r>
-          <a:r>
-            <a:rPr lang="fr-FR" sz="2400" b="1" kern="1200" dirty="0" err="1" smtClean="0"/>
-            <a:t>canvas</a:t>
-          </a:r>
-          <a:r>
-            <a:rPr lang="fr-FR" sz="2400" b="1" kern="1200" dirty="0" smtClean="0"/>
-            <a:t>&gt;</a:t>
-          </a:r>
-          <a:endParaRPr lang="fr-FR" sz="2400" b="1" kern="1200" dirty="0"/>
-        </a:p>
-        <a:p>
-          <a:pPr marL="457200" lvl="2" indent="-228600" algn="l" defTabSz="1066800">
-            <a:lnSpc>
-              <a:spcPct val="90000"/>
-            </a:lnSpc>
-            <a:spcBef>
-              <a:spcPct val="0"/>
-            </a:spcBef>
-            <a:spcAft>
-              <a:spcPct val="15000"/>
-            </a:spcAft>
-            <a:buChar char="••"/>
-          </a:pPr>
-          <a:r>
-            <a:rPr lang="fr-FR" sz="2400" kern="1200" dirty="0" smtClean="0"/>
-            <a:t>Modélisation des obstacles</a:t>
-          </a:r>
-          <a:endParaRPr lang="fr-FR" sz="2400" kern="1200" dirty="0"/>
-        </a:p>
-      </dsp:txBody>
-      <dsp:txXfrm>
-        <a:off x="5458447" y="3522663"/>
-        <a:ext cx="4534049" cy="965360"/>
-      </dsp:txXfrm>
-    </dsp:sp>
-    <dsp:sp modelId="{7D2E6C7C-9586-4A0C-B907-A004212DF446}">
-      <dsp:nvSpPr>
-        <dsp:cNvPr id="0" name=""/>
-        <dsp:cNvSpPr/>
-      </dsp:nvSpPr>
-      <dsp:spPr>
-        <a:xfrm>
-          <a:off x="3165820" y="3661952"/>
-          <a:ext cx="1340597" cy="670138"/>
-        </a:xfrm>
-        <a:prstGeom prst="rect">
-          <a:avLst/>
-        </a:prstGeom>
-        <a:noFill/>
-        <a:ln>
-          <a:noFill/>
-        </a:ln>
-        <a:effectLst/>
-      </dsp:spPr>
-      <dsp:style>
-        <a:lnRef idx="0">
-          <a:scrgbClr r="0" g="0" b="0"/>
-        </a:lnRef>
-        <a:fillRef idx="0">
-          <a:scrgbClr r="0" g="0" b="0"/>
-        </a:fillRef>
-        <a:effectRef idx="0">
-          <a:scrgbClr r="0" g="0" b="0"/>
-        </a:effectRef>
-        <a:fontRef idx="minor"/>
-      </dsp:style>
-      <dsp:txBody>
-        <a:bodyPr spcFirstLastPara="0" vert="horz" wrap="square" lIns="17780" tIns="17780" rIns="17780" bIns="17780" numCol="1" spcCol="1270" anchor="ctr" anchorCtr="0">
-          <a:noAutofit/>
-        </a:bodyPr>
-        <a:lstStyle/>
-        <a:p>
-          <a:pPr lvl="0" algn="ctr" defTabSz="1244600">
-            <a:lnSpc>
-              <a:spcPct val="90000"/>
-            </a:lnSpc>
-            <a:spcBef>
-              <a:spcPct val="0"/>
-            </a:spcBef>
-            <a:spcAft>
-              <a:spcPct val="35000"/>
-            </a:spcAft>
-          </a:pPr>
-          <a:r>
-            <a:rPr lang="fr-FR" sz="2800" kern="1200" dirty="0" smtClean="0"/>
-            <a:t>HTML5</a:t>
-          </a:r>
-          <a:endParaRPr lang="fr-FR" sz="2800" kern="1200" dirty="0"/>
-        </a:p>
-      </dsp:txBody>
-      <dsp:txXfrm>
-        <a:off x="3165820" y="3661952"/>
-        <a:ext cx="1340597" cy="670138"/>
-      </dsp:txXfrm>
-    </dsp:sp>
   </dsp:spTree>
 </dsp:drawing>
 </file>
@@ -20188,479 +18470,482 @@
           </a:p>
         </p:txBody>
       </p:sp>
-      <p:sp>
-        <p:nvSpPr>
-          <p:cNvPr id="3" name="Espace réservé du contenu 2"/>
-          <p:cNvSpPr>
-            <a:spLocks noGrp="1"/>
-          </p:cNvSpPr>
+      <p:graphicFrame>
+        <p:nvGraphicFramePr>
+          <p:cNvPr id="5" name="Tableau 4"/>
+          <p:cNvGraphicFramePr>
+            <a:graphicFrameLocks noGrp="1"/>
+          </p:cNvGraphicFramePr>
           <p:nvPr>
-            <p:ph idx="1"/>
+            <p:extLst/>
           </p:nvPr>
-        </p:nvSpPr>
-        <p:spPr>
-          <a:xfrm>
-            <a:off x="913794" y="1855279"/>
-            <a:ext cx="4695435" cy="4058751"/>
-          </a:xfrm>
-        </p:spPr>
-        <p:txBody>
-          <a:bodyPr>
-            <a:normAutofit/>
-          </a:bodyPr>
-          <a:lstStyle/>
-          <a:p>
-            <a:r>
-              <a:rPr lang="fr-FR" dirty="0" smtClean="0"/>
-              <a:t>Accumulation des imprécisions:</a:t>
-            </a:r>
-          </a:p>
-          <a:p>
-            <a:pPr lvl="1">
-              <a:buFontTx/>
-              <a:buChar char="-"/>
-            </a:pPr>
-            <a:r>
-              <a:rPr lang="fr-FR" dirty="0" smtClean="0"/>
-              <a:t>frottement mécanique </a:t>
-            </a:r>
-          </a:p>
-          <a:p>
-            <a:pPr lvl="1">
-              <a:buFontTx/>
-              <a:buChar char="-"/>
-            </a:pPr>
-            <a:r>
-              <a:rPr lang="fr-FR" dirty="0" smtClean="0"/>
-              <a:t> imprécision du capteur infrarouge </a:t>
-            </a:r>
-          </a:p>
-          <a:p>
-            <a:pPr marL="450000" lvl="1" indent="0">
-              <a:buNone/>
-            </a:pPr>
-            <a:endParaRPr lang="fr-FR" dirty="0" smtClean="0"/>
-          </a:p>
-          <a:p>
-            <a:pPr marL="450000" lvl="1" indent="0">
-              <a:buNone/>
-            </a:pPr>
-            <a:endParaRPr lang="fr-FR" dirty="0"/>
-          </a:p>
-        </p:txBody>
-      </p:sp>
-      <p:sp>
-        <p:nvSpPr>
-          <p:cNvPr id="4" name="Espace réservé du contenu 2"/>
-          <p:cNvSpPr txBox="1">
-            <a:spLocks/>
-          </p:cNvSpPr>
-          <p:nvPr/>
-        </p:nvSpPr>
-        <p:spPr>
-          <a:xfrm>
-            <a:off x="6490840" y="1855279"/>
-            <a:ext cx="4959631" cy="4058751"/>
-          </a:xfrm>
-          <a:prstGeom prst="rect">
-            <a:avLst/>
-          </a:prstGeom>
-          <a:effectLst>
-            <a:outerShdw blurRad="25400" dir="17880000">
-              <a:srgbClr val="000000">
-                <a:alpha val="46000"/>
-              </a:srgbClr>
-            </a:outerShdw>
-          </a:effectLst>
-        </p:spPr>
-        <p:txBody>
-          <a:bodyPr vert="horz" lIns="91440" tIns="45720" rIns="91440" bIns="45720" rtlCol="0" anchor="t">
-            <a:normAutofit/>
-          </a:bodyPr>
-          <a:lstStyle>
-            <a:lvl1pPr marL="342900" indent="-306000" algn="l" defTabSz="457200" rtl="0" eaLnBrk="1" latinLnBrk="0" hangingPunct="1">
-              <a:spcBef>
-                <a:spcPct val="20000"/>
-              </a:spcBef>
-              <a:spcAft>
-                <a:spcPts val="600"/>
-              </a:spcAft>
-              <a:buClr>
-                <a:schemeClr val="tx2"/>
-              </a:buClr>
-              <a:buSzPct val="70000"/>
-              <a:buFont typeface="Wingdings 2" charset="2"/>
-              <a:buChar char=""/>
-              <a:defRPr sz="2000" kern="1200">
-                <a:ln>
-                  <a:solidFill>
-                    <a:schemeClr val="bg1">
-                      <a:lumMod val="75000"/>
-                      <a:lumOff val="25000"/>
-                      <a:alpha val="10000"/>
-                    </a:schemeClr>
-                  </a:solidFill>
-                </a:ln>
-                <a:solidFill>
-                  <a:schemeClr val="tx2"/>
-                </a:solidFill>
-                <a:effectLst>
-                  <a:outerShdw blurRad="9525" dist="25400" dir="14640000" algn="tl" rotWithShape="0">
-                    <a:schemeClr val="bg1">
-                      <a:alpha val="30000"/>
-                    </a:schemeClr>
-                  </a:outerShdw>
-                </a:effectLst>
-                <a:latin typeface="+mn-lt"/>
-                <a:ea typeface="+mn-ea"/>
-                <a:cs typeface="+mn-cs"/>
-              </a:defRPr>
-            </a:lvl1pPr>
-            <a:lvl2pPr marL="720000" indent="-270000" algn="l" defTabSz="457200" rtl="0" eaLnBrk="1" latinLnBrk="0" hangingPunct="1">
-              <a:spcBef>
-                <a:spcPct val="20000"/>
-              </a:spcBef>
-              <a:spcAft>
-                <a:spcPts val="600"/>
-              </a:spcAft>
-              <a:buClr>
-                <a:schemeClr val="tx2"/>
-              </a:buClr>
-              <a:buSzPct val="70000"/>
-              <a:buFont typeface="Wingdings 2" charset="2"/>
-              <a:buChar char=""/>
-              <a:defRPr sz="1800" kern="1200">
-                <a:ln>
-                  <a:solidFill>
-                    <a:schemeClr val="bg1">
-                      <a:lumMod val="75000"/>
-                      <a:lumOff val="25000"/>
-                      <a:alpha val="10000"/>
-                    </a:schemeClr>
-                  </a:solidFill>
-                </a:ln>
-                <a:solidFill>
-                  <a:schemeClr val="tx2"/>
-                </a:solidFill>
-                <a:effectLst>
-                  <a:outerShdw blurRad="9525" dist="25400" dir="14640000" algn="tl" rotWithShape="0">
-                    <a:schemeClr val="bg1">
-                      <a:alpha val="30000"/>
-                    </a:schemeClr>
-                  </a:outerShdw>
-                </a:effectLst>
-                <a:latin typeface="+mn-lt"/>
-                <a:ea typeface="+mn-ea"/>
-                <a:cs typeface="+mn-cs"/>
-              </a:defRPr>
-            </a:lvl2pPr>
-            <a:lvl3pPr marL="1026000" indent="-216000" algn="l" defTabSz="457200" rtl="0" eaLnBrk="1" latinLnBrk="0" hangingPunct="1">
-              <a:spcBef>
-                <a:spcPct val="20000"/>
-              </a:spcBef>
-              <a:spcAft>
-                <a:spcPts val="600"/>
-              </a:spcAft>
-              <a:buClr>
-                <a:schemeClr val="tx2"/>
-              </a:buClr>
-              <a:buSzPct val="70000"/>
-              <a:buFont typeface="Wingdings 2" charset="2"/>
-              <a:buChar char=""/>
-              <a:defRPr sz="1600" kern="1200">
-                <a:ln>
-                  <a:solidFill>
-                    <a:schemeClr val="bg1">
-                      <a:lumMod val="75000"/>
-                      <a:lumOff val="25000"/>
-                      <a:alpha val="10000"/>
-                    </a:schemeClr>
-                  </a:solidFill>
-                </a:ln>
-                <a:solidFill>
-                  <a:schemeClr val="tx2"/>
-                </a:solidFill>
-                <a:effectLst>
-                  <a:outerShdw blurRad="9525" dist="25400" dir="14640000" algn="tl" rotWithShape="0">
-                    <a:schemeClr val="bg1">
-                      <a:alpha val="30000"/>
-                    </a:schemeClr>
-                  </a:outerShdw>
-                </a:effectLst>
-                <a:latin typeface="+mn-lt"/>
-                <a:ea typeface="+mn-ea"/>
-                <a:cs typeface="+mn-cs"/>
-              </a:defRPr>
-            </a:lvl3pPr>
-            <a:lvl4pPr marL="1386000" indent="-216000" algn="l" defTabSz="457200" rtl="0" eaLnBrk="1" latinLnBrk="0" hangingPunct="1">
-              <a:spcBef>
-                <a:spcPct val="20000"/>
-              </a:spcBef>
-              <a:spcAft>
-                <a:spcPts val="600"/>
-              </a:spcAft>
-              <a:buClr>
-                <a:schemeClr val="tx2"/>
-              </a:buClr>
-              <a:buSzPct val="70000"/>
-              <a:buFont typeface="Wingdings 2" charset="2"/>
-              <a:buChar char=""/>
-              <a:defRPr sz="1400" kern="1200">
-                <a:ln>
-                  <a:solidFill>
-                    <a:schemeClr val="bg1">
-                      <a:lumMod val="75000"/>
-                      <a:lumOff val="25000"/>
-                      <a:alpha val="10000"/>
-                    </a:schemeClr>
-                  </a:solidFill>
-                </a:ln>
-                <a:solidFill>
-                  <a:schemeClr val="tx2"/>
-                </a:solidFill>
-                <a:effectLst>
-                  <a:outerShdw blurRad="9525" dist="25400" dir="14640000" algn="tl" rotWithShape="0">
-                    <a:schemeClr val="bg1">
-                      <a:alpha val="30000"/>
-                    </a:schemeClr>
-                  </a:outerShdw>
-                </a:effectLst>
-                <a:latin typeface="+mn-lt"/>
-                <a:ea typeface="+mn-ea"/>
-                <a:cs typeface="+mn-cs"/>
-              </a:defRPr>
-            </a:lvl4pPr>
-            <a:lvl5pPr marL="1674000" indent="-216000" algn="l" defTabSz="457200" rtl="0" eaLnBrk="1" latinLnBrk="0" hangingPunct="1">
-              <a:spcBef>
-                <a:spcPct val="20000"/>
-              </a:spcBef>
-              <a:spcAft>
-                <a:spcPts val="600"/>
-              </a:spcAft>
-              <a:buClr>
-                <a:schemeClr val="tx2"/>
-              </a:buClr>
-              <a:buSzPct val="70000"/>
-              <a:buFont typeface="Wingdings 2" charset="2"/>
-              <a:buChar char=""/>
-              <a:defRPr sz="1400" kern="1200">
-                <a:ln>
-                  <a:solidFill>
-                    <a:schemeClr val="bg1">
-                      <a:lumMod val="75000"/>
-                      <a:lumOff val="25000"/>
-                      <a:alpha val="10000"/>
-                    </a:schemeClr>
-                  </a:solidFill>
-                </a:ln>
-                <a:solidFill>
-                  <a:schemeClr val="tx2"/>
-                </a:solidFill>
-                <a:effectLst>
-                  <a:outerShdw blurRad="9525" dist="25400" dir="14640000" algn="tl" rotWithShape="0">
-                    <a:schemeClr val="bg1">
-                      <a:alpha val="30000"/>
-                    </a:schemeClr>
-                  </a:outerShdw>
-                </a:effectLst>
-                <a:latin typeface="+mn-lt"/>
-                <a:ea typeface="+mn-ea"/>
-                <a:cs typeface="+mn-cs"/>
-              </a:defRPr>
-            </a:lvl5pPr>
-            <a:lvl6pPr marL="2014600" indent="-228600" algn="l" defTabSz="457200" rtl="0" eaLnBrk="1" latinLnBrk="0" hangingPunct="1">
-              <a:spcBef>
-                <a:spcPct val="20000"/>
-              </a:spcBef>
-              <a:spcAft>
-                <a:spcPts val="600"/>
-              </a:spcAft>
-              <a:buClr>
-                <a:schemeClr val="tx2"/>
-              </a:buClr>
-              <a:buSzPct val="70000"/>
-              <a:buFont typeface="Wingdings 2" charset="2"/>
-              <a:buChar char=""/>
-              <a:defRPr sz="1400" kern="1200">
-                <a:ln>
-                  <a:solidFill>
-                    <a:schemeClr val="bg1">
-                      <a:lumMod val="75000"/>
-                      <a:lumOff val="25000"/>
-                      <a:alpha val="10000"/>
-                    </a:schemeClr>
-                  </a:solidFill>
-                </a:ln>
-                <a:solidFill>
-                  <a:schemeClr val="tx2"/>
-                </a:solidFill>
-                <a:effectLst>
-                  <a:outerShdw blurRad="9525" dist="25400" dir="14640000" algn="tl" rotWithShape="0">
-                    <a:schemeClr val="bg1">
-                      <a:alpha val="30000"/>
-                    </a:schemeClr>
-                  </a:outerShdw>
-                </a:effectLst>
-                <a:latin typeface="+mn-lt"/>
-                <a:ea typeface="+mn-ea"/>
-                <a:cs typeface="+mn-cs"/>
-              </a:defRPr>
-            </a:lvl6pPr>
-            <a:lvl7pPr marL="2401800" indent="-228600" algn="l" defTabSz="457200" rtl="0" eaLnBrk="1" latinLnBrk="0" hangingPunct="1">
-              <a:spcBef>
-                <a:spcPct val="20000"/>
-              </a:spcBef>
-              <a:spcAft>
-                <a:spcPts val="600"/>
-              </a:spcAft>
-              <a:buClr>
-                <a:schemeClr val="tx2"/>
-              </a:buClr>
-              <a:buSzPct val="70000"/>
-              <a:buFont typeface="Wingdings 2" charset="2"/>
-              <a:buChar char=""/>
-              <a:defRPr sz="1400" kern="1200">
-                <a:ln>
-                  <a:solidFill>
-                    <a:schemeClr val="bg1">
-                      <a:lumMod val="75000"/>
-                      <a:lumOff val="25000"/>
-                      <a:alpha val="10000"/>
-                    </a:schemeClr>
-                  </a:solidFill>
-                </a:ln>
-                <a:solidFill>
-                  <a:schemeClr val="tx2"/>
-                </a:solidFill>
-                <a:effectLst>
-                  <a:outerShdw blurRad="9525" dist="25400" dir="14640000" algn="tl" rotWithShape="0">
-                    <a:schemeClr val="bg1">
-                      <a:alpha val="30000"/>
-                    </a:schemeClr>
-                  </a:outerShdw>
-                </a:effectLst>
-                <a:latin typeface="+mn-lt"/>
-                <a:ea typeface="+mn-ea"/>
-                <a:cs typeface="+mn-cs"/>
-              </a:defRPr>
-            </a:lvl7pPr>
-            <a:lvl8pPr marL="2789000" indent="-228600" algn="l" defTabSz="457200" rtl="0" eaLnBrk="1" latinLnBrk="0" hangingPunct="1">
-              <a:spcBef>
-                <a:spcPct val="20000"/>
-              </a:spcBef>
-              <a:spcAft>
-                <a:spcPts val="600"/>
-              </a:spcAft>
-              <a:buClr>
-                <a:schemeClr val="tx2"/>
-              </a:buClr>
-              <a:buSzPct val="70000"/>
-              <a:buFont typeface="Wingdings 2" charset="2"/>
-              <a:buChar char=""/>
-              <a:defRPr sz="1400" kern="1200">
-                <a:ln>
-                  <a:solidFill>
-                    <a:schemeClr val="bg1">
-                      <a:lumMod val="75000"/>
-                      <a:lumOff val="25000"/>
-                      <a:alpha val="10000"/>
-                    </a:schemeClr>
-                  </a:solidFill>
-                </a:ln>
-                <a:solidFill>
-                  <a:schemeClr val="tx2"/>
-                </a:solidFill>
-                <a:effectLst>
-                  <a:outerShdw blurRad="9525" dist="25400" dir="14640000" algn="tl" rotWithShape="0">
-                    <a:schemeClr val="bg1">
-                      <a:alpha val="30000"/>
-                    </a:schemeClr>
-                  </a:outerShdw>
-                </a:effectLst>
-                <a:latin typeface="+mn-lt"/>
-                <a:ea typeface="+mn-ea"/>
-                <a:cs typeface="+mn-cs"/>
-              </a:defRPr>
-            </a:lvl8pPr>
-            <a:lvl9pPr marL="3106200" indent="-228600" algn="l" defTabSz="457200" rtl="0" eaLnBrk="1" latinLnBrk="0" hangingPunct="1">
-              <a:spcBef>
-                <a:spcPct val="20000"/>
-              </a:spcBef>
-              <a:spcAft>
-                <a:spcPts val="600"/>
-              </a:spcAft>
-              <a:buClr>
-                <a:schemeClr val="tx2"/>
-              </a:buClr>
-              <a:buSzPct val="70000"/>
-              <a:buFont typeface="Wingdings 2" charset="2"/>
-              <a:buChar char=""/>
-              <a:defRPr sz="1400" kern="1200">
-                <a:ln>
-                  <a:solidFill>
-                    <a:schemeClr val="bg1">
-                      <a:lumMod val="75000"/>
-                      <a:lumOff val="25000"/>
-                      <a:alpha val="10000"/>
-                    </a:schemeClr>
-                  </a:solidFill>
-                </a:ln>
-                <a:solidFill>
-                  <a:schemeClr val="tx2"/>
-                </a:solidFill>
-                <a:effectLst>
-                  <a:outerShdw blurRad="9525" dist="25400" dir="14640000" algn="tl" rotWithShape="0">
-                    <a:schemeClr val="bg1">
-                      <a:alpha val="30000"/>
-                    </a:schemeClr>
-                  </a:outerShdw>
-                </a:effectLst>
-                <a:latin typeface="+mn-lt"/>
-                <a:ea typeface="+mn-ea"/>
-                <a:cs typeface="+mn-cs"/>
-              </a:defRPr>
-            </a:lvl9pPr>
-          </a:lstStyle>
-          <a:p>
-            <a:r>
-              <a:rPr lang="fr-FR" dirty="0" smtClean="0"/>
-              <a:t>Faussement de l’odométrie si:</a:t>
-            </a:r>
-          </a:p>
-          <a:p>
-            <a:pPr lvl="1">
-              <a:buFontTx/>
-              <a:buChar char="-"/>
-            </a:pPr>
-            <a:r>
-              <a:rPr lang="fr-FR" dirty="0" smtClean="0"/>
-              <a:t>déplacement du robot à la main	</a:t>
-            </a:r>
-            <a:endParaRPr lang="fr-FR" dirty="0"/>
-          </a:p>
-          <a:p>
-            <a:pPr lvl="1">
-              <a:buFontTx/>
-              <a:buChar char="-"/>
-            </a:pPr>
-            <a:r>
-              <a:rPr lang="fr-FR" dirty="0" smtClean="0"/>
-              <a:t> collision avec un obstacle retenant le robot</a:t>
-            </a:r>
-          </a:p>
-          <a:p>
-            <a:pPr marL="450000" lvl="1" indent="0">
-              <a:buFont typeface="Wingdings 2" charset="2"/>
-              <a:buNone/>
-            </a:pPr>
-            <a:endParaRPr lang="fr-FR" dirty="0"/>
-          </a:p>
-        </p:txBody>
-      </p:sp>
+        </p:nvGraphicFramePr>
+        <p:xfrm>
+          <a:off x="1382004" y="1733218"/>
+          <a:ext cx="8128000" cy="1859280"/>
+        </p:xfrm>
+        <a:graphic>
+          <a:graphicData uri="http://schemas.openxmlformats.org/drawingml/2006/table">
+            <a:tbl>
+              <a:tblPr firstRow="1" bandRow="1">
+                <a:tableStyleId>{5C22544A-7EE6-4342-B048-85BDC9FD1C3A}</a:tableStyleId>
+              </a:tblPr>
+              <a:tblGrid>
+                <a:gridCol w="4064000"/>
+                <a:gridCol w="4064000"/>
+              </a:tblGrid>
+              <a:tr h="237180">
+                <a:tc gridSpan="2">
+                  <a:txBody>
+                    <a:bodyPr/>
+                    <a:lstStyle/>
+                    <a:p>
+                      <a:pPr algn="ctr"/>
+                      <a:r>
+                        <a:rPr lang="fr-FR" sz="1800" b="0" dirty="0" smtClean="0"/>
+                        <a:t>Accumulation des imprécisions</a:t>
+                      </a:r>
+                      <a:endParaRPr lang="fr-FR" sz="1800" b="0" dirty="0"/>
+                    </a:p>
+                  </a:txBody>
+                  <a:tcPr/>
+                </a:tc>
+                <a:tc hMerge="1">
+                  <a:txBody>
+                    <a:bodyPr/>
+                    <a:lstStyle/>
+                    <a:p>
+                      <a:endParaRPr lang="fr-FR" dirty="0"/>
+                    </a:p>
+                  </a:txBody>
+                  <a:tcPr/>
+                </a:tc>
+              </a:tr>
+              <a:tr h="200691">
+                <a:tc>
+                  <a:txBody>
+                    <a:bodyPr/>
+                    <a:lstStyle/>
+                    <a:p>
+                      <a:pPr algn="ctr"/>
+                      <a:r>
+                        <a:rPr lang="fr-FR" sz="1600" dirty="0" smtClean="0"/>
+                        <a:t>Causes</a:t>
+                      </a:r>
+                      <a:endParaRPr lang="fr-FR" sz="1600" dirty="0"/>
+                    </a:p>
+                  </a:txBody>
+                  <a:tcPr/>
+                </a:tc>
+                <a:tc>
+                  <a:txBody>
+                    <a:bodyPr/>
+                    <a:lstStyle/>
+                    <a:p>
+                      <a:pPr algn="ctr"/>
+                      <a:r>
+                        <a:rPr lang="fr-FR" sz="1600" dirty="0" smtClean="0"/>
+                        <a:t>Possibilité</a:t>
+                      </a:r>
+                      <a:r>
+                        <a:rPr lang="fr-FR" sz="1600" baseline="0" dirty="0" smtClean="0"/>
+                        <a:t>s / Solution</a:t>
+                      </a:r>
+                      <a:endParaRPr lang="fr-FR" sz="1600" dirty="0"/>
+                    </a:p>
+                  </a:txBody>
+                  <a:tcPr/>
+                </a:tc>
+              </a:tr>
+              <a:tr h="346648">
+                <a:tc>
+                  <a:txBody>
+                    <a:bodyPr/>
+                    <a:lstStyle/>
+                    <a:p>
+                      <a:pPr marL="0" marR="0" lvl="1" indent="0" algn="l" defTabSz="457200" rtl="0" eaLnBrk="1" fontAlgn="auto" latinLnBrk="0" hangingPunct="1">
+                        <a:lnSpc>
+                          <a:spcPct val="100000"/>
+                        </a:lnSpc>
+                        <a:spcBef>
+                          <a:spcPts val="0"/>
+                        </a:spcBef>
+                        <a:spcAft>
+                          <a:spcPts val="0"/>
+                        </a:spcAft>
+                        <a:buClrTx/>
+                        <a:buSzTx/>
+                        <a:buFontTx/>
+                        <a:buNone/>
+                        <a:tabLst/>
+                        <a:defRPr/>
+                      </a:pPr>
+                      <a:r>
+                        <a:rPr lang="fr-FR" sz="1600" dirty="0" smtClean="0"/>
+                        <a:t>frottement mécanique </a:t>
+                      </a:r>
+                    </a:p>
+                    <a:p>
+                      <a:endParaRPr lang="fr-FR" sz="1600" dirty="0"/>
+                    </a:p>
+                  </a:txBody>
+                  <a:tcPr/>
+                </a:tc>
+                <a:tc>
+                  <a:txBody>
+                    <a:bodyPr/>
+                    <a:lstStyle/>
+                    <a:p>
+                      <a:r>
+                        <a:rPr lang="fr-FR" sz="1600" dirty="0" smtClean="0"/>
+                        <a:t>tester différentes roues / </a:t>
+                      </a:r>
+                    </a:p>
+                    <a:p>
+                      <a:r>
+                        <a:rPr lang="fr-FR" sz="1600" dirty="0" smtClean="0"/>
+                        <a:t>changer la surface du </a:t>
+                      </a:r>
+                      <a:r>
+                        <a:rPr lang="fr-FR" sz="1600" baseline="0" dirty="0" smtClean="0"/>
+                        <a:t>terrain</a:t>
+                      </a:r>
+                      <a:endParaRPr lang="fr-FR" sz="1600" dirty="0"/>
+                    </a:p>
+                  </a:txBody>
+                  <a:tcPr/>
+                </a:tc>
+              </a:tr>
+              <a:tr h="346648">
+                <a:tc>
+                  <a:txBody>
+                    <a:bodyPr/>
+                    <a:lstStyle/>
+                    <a:p>
+                      <a:pPr marL="0" marR="0" lvl="1" indent="0" algn="l" defTabSz="457200" rtl="0" eaLnBrk="1" fontAlgn="auto" latinLnBrk="0" hangingPunct="1">
+                        <a:lnSpc>
+                          <a:spcPct val="100000"/>
+                        </a:lnSpc>
+                        <a:spcBef>
+                          <a:spcPts val="0"/>
+                        </a:spcBef>
+                        <a:spcAft>
+                          <a:spcPts val="0"/>
+                        </a:spcAft>
+                        <a:buClrTx/>
+                        <a:buSzTx/>
+                        <a:buFontTx/>
+                        <a:buNone/>
+                        <a:tabLst/>
+                        <a:defRPr/>
+                      </a:pPr>
+                      <a:r>
+                        <a:rPr lang="fr-FR" sz="1600" dirty="0" smtClean="0"/>
+                        <a:t>imprécision du capteur infrarouge </a:t>
+                      </a:r>
+                    </a:p>
+                    <a:p>
+                      <a:endParaRPr lang="fr-FR" sz="1600" dirty="0"/>
+                    </a:p>
+                  </a:txBody>
+                  <a:tcPr>
+                    <a:solidFill>
+                      <a:schemeClr val="accent4">
+                        <a:lumMod val="20000"/>
+                        <a:lumOff val="80000"/>
+                      </a:schemeClr>
+                    </a:solidFill>
+                  </a:tcPr>
+                </a:tc>
+                <a:tc>
+                  <a:txBody>
+                    <a:bodyPr/>
+                    <a:lstStyle/>
+                    <a:p>
+                      <a:r>
+                        <a:rPr lang="fr-FR" sz="1600" dirty="0" smtClean="0"/>
+                        <a:t>tester différents capteurs</a:t>
+                      </a:r>
+                    </a:p>
+                    <a:p>
+                      <a:r>
+                        <a:rPr lang="fr-FR" sz="1600" baseline="0" dirty="0" smtClean="0"/>
+                        <a:t>ajout capteur de courte proximité</a:t>
+                      </a:r>
+                      <a:endParaRPr lang="fr-FR" sz="1600" dirty="0"/>
+                    </a:p>
+                  </a:txBody>
+                  <a:tcPr>
+                    <a:solidFill>
+                      <a:schemeClr val="accent4">
+                        <a:lumMod val="20000"/>
+                        <a:lumOff val="80000"/>
+                      </a:schemeClr>
+                    </a:solidFill>
+                  </a:tcPr>
+                </a:tc>
+              </a:tr>
+            </a:tbl>
+          </a:graphicData>
+        </a:graphic>
+      </p:graphicFrame>
+      <p:graphicFrame>
+        <p:nvGraphicFramePr>
+          <p:cNvPr id="7" name="Tableau 6"/>
+          <p:cNvGraphicFramePr>
+            <a:graphicFrameLocks noGrp="1"/>
+          </p:cNvGraphicFramePr>
+          <p:nvPr>
+            <p:extLst/>
+          </p:nvPr>
+        </p:nvGraphicFramePr>
+        <p:xfrm>
+          <a:off x="1384110" y="3875024"/>
+          <a:ext cx="8101412" cy="2194560"/>
+        </p:xfrm>
+        <a:graphic>
+          <a:graphicData uri="http://schemas.openxmlformats.org/drawingml/2006/table">
+            <a:tbl>
+              <a:tblPr firstRow="1" bandRow="1">
+                <a:tableStyleId>{5C22544A-7EE6-4342-B048-85BDC9FD1C3A}</a:tableStyleId>
+              </a:tblPr>
+              <a:tblGrid>
+                <a:gridCol w="4050706"/>
+                <a:gridCol w="4050706"/>
+              </a:tblGrid>
+              <a:tr h="327319">
+                <a:tc gridSpan="2">
+                  <a:txBody>
+                    <a:bodyPr/>
+                    <a:lstStyle/>
+                    <a:p>
+                      <a:pPr algn="ctr"/>
+                      <a:r>
+                        <a:rPr lang="fr-FR" sz="1800" b="0" dirty="0" smtClean="0"/>
+                        <a:t>Faussement</a:t>
+                      </a:r>
+                      <a:r>
+                        <a:rPr lang="fr-FR" sz="1800" b="0" baseline="0" dirty="0" smtClean="0"/>
+                        <a:t> de l’odométrie</a:t>
+                      </a:r>
+                      <a:endParaRPr lang="fr-FR" sz="2000" b="0" dirty="0"/>
+                    </a:p>
+                  </a:txBody>
+                  <a:tcPr/>
+                </a:tc>
+                <a:tc hMerge="1">
+                  <a:txBody>
+                    <a:bodyPr/>
+                    <a:lstStyle/>
+                    <a:p>
+                      <a:endParaRPr lang="fr-FR" dirty="0"/>
+                    </a:p>
+                  </a:txBody>
+                  <a:tcPr/>
+                </a:tc>
+              </a:tr>
+              <a:tr h="300043">
+                <a:tc>
+                  <a:txBody>
+                    <a:bodyPr/>
+                    <a:lstStyle/>
+                    <a:p>
+                      <a:pPr algn="ctr"/>
+                      <a:r>
+                        <a:rPr lang="fr-FR" sz="1600" dirty="0" smtClean="0"/>
+                        <a:t>Causes</a:t>
+                      </a:r>
+                      <a:endParaRPr lang="fr-FR" sz="1600" dirty="0"/>
+                    </a:p>
+                  </a:txBody>
+                  <a:tcPr/>
+                </a:tc>
+                <a:tc>
+                  <a:txBody>
+                    <a:bodyPr/>
+                    <a:lstStyle/>
+                    <a:p>
+                      <a:pPr algn="ctr"/>
+                      <a:r>
+                        <a:rPr lang="fr-FR" sz="1600" dirty="0" smtClean="0"/>
+                        <a:t>Possibilité</a:t>
+                      </a:r>
+                      <a:r>
+                        <a:rPr lang="fr-FR" sz="1600" baseline="0" dirty="0" smtClean="0"/>
+                        <a:t>s / Solution</a:t>
+                      </a:r>
+                      <a:endParaRPr lang="fr-FR" sz="1600" dirty="0"/>
+                    </a:p>
+                  </a:txBody>
+                  <a:tcPr/>
+                </a:tc>
+              </a:tr>
+              <a:tr h="300043">
+                <a:tc>
+                  <a:txBody>
+                    <a:bodyPr/>
+                    <a:lstStyle/>
+                    <a:p>
+                      <a:pPr marL="0" marR="0" lvl="1" indent="0" algn="l" defTabSz="457200" rtl="0" eaLnBrk="1" fontAlgn="auto" latinLnBrk="0" hangingPunct="1">
+                        <a:lnSpc>
+                          <a:spcPct val="100000"/>
+                        </a:lnSpc>
+                        <a:spcBef>
+                          <a:spcPts val="0"/>
+                        </a:spcBef>
+                        <a:spcAft>
+                          <a:spcPts val="0"/>
+                        </a:spcAft>
+                        <a:buClrTx/>
+                        <a:buSzTx/>
+                        <a:buFontTx/>
+                        <a:buNone/>
+                        <a:tabLst/>
+                        <a:defRPr/>
+                      </a:pPr>
+                      <a:r>
+                        <a:rPr lang="fr-FR" sz="1600" dirty="0" smtClean="0"/>
+                        <a:t>déplacement du robot à la main</a:t>
+                      </a:r>
+                      <a:endParaRPr lang="fr-FR" sz="1600" dirty="0"/>
+                    </a:p>
+                  </a:txBody>
+                  <a:tcPr anchor="ctr"/>
+                </a:tc>
+                <a:tc>
+                  <a:txBody>
+                    <a:bodyPr/>
+                    <a:lstStyle/>
+                    <a:p>
+                      <a:r>
+                        <a:rPr lang="fr-FR" sz="1600" dirty="0" smtClean="0"/>
+                        <a:t>                                 //</a:t>
+                      </a:r>
+                      <a:endParaRPr lang="fr-FR" sz="1600" dirty="0"/>
+                    </a:p>
+                  </a:txBody>
+                  <a:tcPr anchor="ctr"/>
+                </a:tc>
+              </a:tr>
+              <a:tr h="475904">
+                <a:tc>
+                  <a:txBody>
+                    <a:bodyPr/>
+                    <a:lstStyle/>
+                    <a:p>
+                      <a:pPr marL="0" marR="0" lvl="1" indent="0" algn="l" defTabSz="457200" rtl="0" eaLnBrk="1" fontAlgn="auto" latinLnBrk="0" hangingPunct="1">
+                        <a:lnSpc>
+                          <a:spcPct val="100000"/>
+                        </a:lnSpc>
+                        <a:spcBef>
+                          <a:spcPts val="0"/>
+                        </a:spcBef>
+                        <a:spcAft>
+                          <a:spcPts val="0"/>
+                        </a:spcAft>
+                        <a:buClrTx/>
+                        <a:buSzTx/>
+                        <a:buFontTx/>
+                        <a:buNone/>
+                        <a:tabLst/>
+                        <a:defRPr/>
+                      </a:pPr>
+                      <a:r>
+                        <a:rPr lang="fr-FR" sz="1600" dirty="0" smtClean="0"/>
+                        <a:t>collision avec un obstacle retenant le robot</a:t>
+                      </a:r>
+                    </a:p>
+                    <a:p>
+                      <a:endParaRPr lang="fr-FR" sz="1600" dirty="0"/>
+                    </a:p>
+                  </a:txBody>
+                  <a:tcPr anchor="ctr">
+                    <a:solidFill>
+                      <a:schemeClr val="accent4">
+                        <a:lumMod val="20000"/>
+                        <a:lumOff val="80000"/>
+                      </a:schemeClr>
+                    </a:solidFill>
+                  </a:tcPr>
+                </a:tc>
+                <a:tc>
+                  <a:txBody>
+                    <a:bodyPr/>
+                    <a:lstStyle/>
+                    <a:p>
+                      <a:r>
+                        <a:rPr lang="fr-FR" sz="1600" dirty="0" smtClean="0"/>
+                        <a:t>si</a:t>
+                      </a:r>
+                      <a:r>
+                        <a:rPr lang="fr-FR" sz="1600" baseline="0" dirty="0" smtClean="0"/>
+                        <a:t> la distance avec le capteur IR ne change pas c’est que le robot n’a pas avancé.</a:t>
+                      </a:r>
+                      <a:endParaRPr lang="fr-FR" sz="1600" dirty="0"/>
+                    </a:p>
+                  </a:txBody>
+                  <a:tcPr anchor="ctr">
+                    <a:solidFill>
+                      <a:schemeClr val="accent4">
+                        <a:lumMod val="20000"/>
+                        <a:lumOff val="80000"/>
+                      </a:schemeClr>
+                    </a:solidFill>
+                  </a:tcPr>
+                </a:tc>
+              </a:tr>
+              <a:tr h="518256">
+                <a:tc>
+                  <a:txBody>
+                    <a:bodyPr/>
+                    <a:lstStyle/>
+                    <a:p>
+                      <a:r>
+                        <a:rPr lang="fr-FR" sz="1600" dirty="0" smtClean="0"/>
+                        <a:t>détection  d’un obstacle dans la zone morte du capteur </a:t>
+                      </a:r>
+                      <a:endParaRPr lang="fr-FR" sz="1600" dirty="0"/>
+                    </a:p>
+                  </a:txBody>
+                  <a:tcPr anchor="ctr">
+                    <a:solidFill>
+                      <a:schemeClr val="accent4">
+                        <a:lumMod val="20000"/>
+                        <a:lumOff val="80000"/>
+                      </a:schemeClr>
+                    </a:solidFill>
+                  </a:tcPr>
+                </a:tc>
+                <a:tc>
+                  <a:txBody>
+                    <a:bodyPr/>
+                    <a:lstStyle/>
+                    <a:p>
+                      <a:r>
+                        <a:rPr lang="fr-FR" sz="1600" dirty="0" smtClean="0"/>
+                        <a:t>ajout d’un capteur de courte proximité</a:t>
+                      </a:r>
+                      <a:endParaRPr lang="fr-FR" sz="1600" dirty="0"/>
+                    </a:p>
+                  </a:txBody>
+                  <a:tcPr anchor="ctr">
+                    <a:solidFill>
+                      <a:schemeClr val="accent4">
+                        <a:lumMod val="20000"/>
+                        <a:lumOff val="80000"/>
+                      </a:schemeClr>
+                    </a:solidFill>
+                  </a:tcPr>
+                </a:tc>
+              </a:tr>
+            </a:tbl>
+          </a:graphicData>
+        </a:graphic>
+      </p:graphicFrame>
     </p:spTree>
     <p:extLst>
       <p:ext uri="{BB962C8B-B14F-4D97-AF65-F5344CB8AC3E}">
-        <p14:creationId xmlns:p14="http://schemas.microsoft.com/office/powerpoint/2010/main" val="1256548629"/>
+        <p14:creationId xmlns:p14="http://schemas.microsoft.com/office/powerpoint/2010/main" val="3475904972"/>
       </p:ext>
     </p:extLst>
   </p:cSld>
@@ -20919,11 +19204,7 @@
             <a:pPr algn="l"/>
             <a:r>
               <a:rPr lang="fr-FR" dirty="0" smtClean="0"/>
-              <a:t>Serveur </a:t>
-            </a:r>
-            <a:r>
-              <a:rPr lang="fr-FR" dirty="0" smtClean="0"/>
-              <a:t>Intermédiaire</a:t>
+              <a:t>Serveur Intermédiaire</a:t>
             </a:r>
             <a:endParaRPr lang="fr-FR" dirty="0"/>
           </a:p>

</xml_diff>